<commit_message>
Update finale des schémas
Ajout des derniers changements sur les symboles des variables + modifications du modèles.
</commit_message>
<xml_diff>
--- a/Schéma MEPI modifications.pptx
+++ b/Schéma MEPI modifications.pptx
@@ -197,7 +197,7 @@
           <a:p>
             <a:fld id="{A63BCDBA-15DF-4AE0-9D6F-BF720B3E0252}" type="datetimeFigureOut">
               <a:rPr lang="en-US" smtClean="0"/>
-              <a:t>10/10/2023</a:t>
+              <a:t>10/11/2023</a:t>
             </a:fld>
             <a:endParaRPr lang="en-US"/>
           </a:p>
@@ -596,7 +596,7 @@
           <a:p>
             <a:fld id="{A5AF9A6A-1F81-4236-8DE6-52D7EE79203B}" type="datetimeFigureOut">
               <a:rPr lang="en-US" smtClean="0"/>
-              <a:t>10/10/2023</a:t>
+              <a:t>10/11/2023</a:t>
             </a:fld>
             <a:endParaRPr lang="en-US"/>
           </a:p>
@@ -766,7 +766,7 @@
           <a:p>
             <a:fld id="{A5AF9A6A-1F81-4236-8DE6-52D7EE79203B}" type="datetimeFigureOut">
               <a:rPr lang="en-US" smtClean="0"/>
-              <a:t>10/10/2023</a:t>
+              <a:t>10/11/2023</a:t>
             </a:fld>
             <a:endParaRPr lang="en-US"/>
           </a:p>
@@ -946,7 +946,7 @@
           <a:p>
             <a:fld id="{A5AF9A6A-1F81-4236-8DE6-52D7EE79203B}" type="datetimeFigureOut">
               <a:rPr lang="en-US" smtClean="0"/>
-              <a:t>10/10/2023</a:t>
+              <a:t>10/11/2023</a:t>
             </a:fld>
             <a:endParaRPr lang="en-US"/>
           </a:p>
@@ -1116,7 +1116,7 @@
           <a:p>
             <a:fld id="{A5AF9A6A-1F81-4236-8DE6-52D7EE79203B}" type="datetimeFigureOut">
               <a:rPr lang="en-US" smtClean="0"/>
-              <a:t>10/10/2023</a:t>
+              <a:t>10/11/2023</a:t>
             </a:fld>
             <a:endParaRPr lang="en-US"/>
           </a:p>
@@ -1360,7 +1360,7 @@
           <a:p>
             <a:fld id="{A5AF9A6A-1F81-4236-8DE6-52D7EE79203B}" type="datetimeFigureOut">
               <a:rPr lang="en-US" smtClean="0"/>
-              <a:t>10/10/2023</a:t>
+              <a:t>10/11/2023</a:t>
             </a:fld>
             <a:endParaRPr lang="en-US"/>
           </a:p>
@@ -1592,7 +1592,7 @@
           <a:p>
             <a:fld id="{A5AF9A6A-1F81-4236-8DE6-52D7EE79203B}" type="datetimeFigureOut">
               <a:rPr lang="en-US" smtClean="0"/>
-              <a:t>10/10/2023</a:t>
+              <a:t>10/11/2023</a:t>
             </a:fld>
             <a:endParaRPr lang="en-US"/>
           </a:p>
@@ -1959,7 +1959,7 @@
           <a:p>
             <a:fld id="{A5AF9A6A-1F81-4236-8DE6-52D7EE79203B}" type="datetimeFigureOut">
               <a:rPr lang="en-US" smtClean="0"/>
-              <a:t>10/10/2023</a:t>
+              <a:t>10/11/2023</a:t>
             </a:fld>
             <a:endParaRPr lang="en-US"/>
           </a:p>
@@ -2077,7 +2077,7 @@
           <a:p>
             <a:fld id="{A5AF9A6A-1F81-4236-8DE6-52D7EE79203B}" type="datetimeFigureOut">
               <a:rPr lang="en-US" smtClean="0"/>
-              <a:t>10/10/2023</a:t>
+              <a:t>10/11/2023</a:t>
             </a:fld>
             <a:endParaRPr lang="en-US"/>
           </a:p>
@@ -2172,7 +2172,7 @@
           <a:p>
             <a:fld id="{A5AF9A6A-1F81-4236-8DE6-52D7EE79203B}" type="datetimeFigureOut">
               <a:rPr lang="en-US" smtClean="0"/>
-              <a:t>10/10/2023</a:t>
+              <a:t>10/11/2023</a:t>
             </a:fld>
             <a:endParaRPr lang="en-US"/>
           </a:p>
@@ -2449,7 +2449,7 @@
           <a:p>
             <a:fld id="{A5AF9A6A-1F81-4236-8DE6-52D7EE79203B}" type="datetimeFigureOut">
               <a:rPr lang="en-US" smtClean="0"/>
-              <a:t>10/10/2023</a:t>
+              <a:t>10/11/2023</a:t>
             </a:fld>
             <a:endParaRPr lang="en-US"/>
           </a:p>
@@ -2706,7 +2706,7 @@
           <a:p>
             <a:fld id="{A5AF9A6A-1F81-4236-8DE6-52D7EE79203B}" type="datetimeFigureOut">
               <a:rPr lang="en-US" smtClean="0"/>
-              <a:t>10/10/2023</a:t>
+              <a:t>10/11/2023</a:t>
             </a:fld>
             <a:endParaRPr lang="en-US"/>
           </a:p>
@@ -2919,7 +2919,7 @@
           <a:p>
             <a:fld id="{A5AF9A6A-1F81-4236-8DE6-52D7EE79203B}" type="datetimeFigureOut">
               <a:rPr lang="en-US" smtClean="0"/>
-              <a:t>10/10/2023</a:t>
+              <a:t>10/11/2023</a:t>
             </a:fld>
             <a:endParaRPr lang="en-US"/>
           </a:p>
@@ -4653,17 +4653,17 @@
                       <m:sSub>
                         <m:sSubPr>
                           <m:ctrlPr>
-                            <a:rPr lang="fr-FR" sz="2400" i="1" dirty="0">
+                            <a:rPr lang="fr-FR" sz="2400" i="1" dirty="0" smtClean="0">
                               <a:latin typeface="Cambria Math" panose="02040503050406030204" pitchFamily="18" charset="0"/>
                             </a:rPr>
                           </m:ctrlPr>
                         </m:sSubPr>
                         <m:e>
                           <m:r>
-                            <a:rPr lang="fr-FR" sz="2400" i="1" dirty="0">
-                              <a:latin typeface="Cambria Math" panose="02040503050406030204" pitchFamily="18" charset="0"/>
-                            </a:rPr>
-                            <m:t>𝐽</m:t>
+                            <a:rPr lang="fr-FR" sz="2400" b="0" i="1" dirty="0" smtClean="0">
+                              <a:latin typeface="Cambria Math" panose="02040503050406030204" pitchFamily="18" charset="0"/>
+                            </a:rPr>
+                            <m:t>𝐿</m:t>
                           </m:r>
                         </m:e>
                         <m:sub>
@@ -4709,7 +4709,7 @@
               <a:blipFill>
                 <a:blip r:embed="rId2"/>
                 <a:stretch>
-                  <a:fillRect b="-11842"/>
+                  <a:fillRect b="-1316"/>
                 </a:stretch>
               </a:blipFill>
             </p:spPr>
@@ -4744,7 +4744,7 @@
             </p:nvSpPr>
             <p:spPr>
               <a:xfrm>
-                <a:off x="2490758" y="3248588"/>
+                <a:off x="2582198" y="3228268"/>
                 <a:ext cx="535419" cy="461665"/>
               </a:xfrm>
               <a:prstGeom prst="rect">
@@ -4768,23 +4768,17 @@
                       <m:sSub>
                         <m:sSubPr>
                           <m:ctrlPr>
-                            <a:rPr lang="fr-FR" sz="2400" i="1" dirty="0">
+                            <a:rPr lang="fr-FR" sz="2400" i="1" dirty="0" smtClean="0">
                               <a:latin typeface="Cambria Math" panose="02040503050406030204" pitchFamily="18" charset="0"/>
                             </a:rPr>
                           </m:ctrlPr>
                         </m:sSubPr>
                         <m:e>
                           <m:r>
-                            <a:rPr lang="fr-FR" sz="2400" i="1" dirty="0">
-                              <a:latin typeface="Cambria Math" panose="02040503050406030204" pitchFamily="18" charset="0"/>
-                            </a:rPr>
-                            <m:t>𝐴</m:t>
-                          </m:r>
-                          <m:r>
-                            <a:rPr lang="fr-FR" sz="2400" i="1" dirty="0">
-                              <a:latin typeface="Cambria Math" panose="02040503050406030204" pitchFamily="18" charset="0"/>
-                            </a:rPr>
-                            <m:t>1</m:t>
+                            <a:rPr lang="fr-FR" sz="2400" b="0" i="1" dirty="0" smtClean="0">
+                              <a:latin typeface="Cambria Math" panose="02040503050406030204" pitchFamily="18" charset="0"/>
+                            </a:rPr>
+                            <m:t>𝐽</m:t>
                           </m:r>
                         </m:e>
                         <m:sub>
@@ -4821,7 +4815,7 @@
             </p:nvSpPr>
             <p:spPr>
               <a:xfrm>
-                <a:off x="2490758" y="3248588"/>
+                <a:off x="2582198" y="3228268"/>
                 <a:ext cx="535419" cy="461665"/>
               </a:xfrm>
               <a:prstGeom prst="rect">
@@ -4830,7 +4824,7 @@
               <a:blipFill>
                 <a:blip r:embed="rId3"/>
                 <a:stretch>
-                  <a:fillRect l="-3448" r="-21839" b="-1316"/>
+                  <a:fillRect b="-13333"/>
                 </a:stretch>
               </a:blipFill>
             </p:spPr>
@@ -4865,7 +4859,7 @@
             </p:nvSpPr>
             <p:spPr>
               <a:xfrm>
-                <a:off x="2490758" y="5251143"/>
+                <a:off x="2561878" y="5220663"/>
                 <a:ext cx="535419" cy="461665"/>
               </a:xfrm>
               <a:prstGeom prst="rect">
@@ -4889,23 +4883,17 @@
                       <m:sSub>
                         <m:sSubPr>
                           <m:ctrlPr>
-                            <a:rPr lang="fr-FR" sz="2400" i="1" dirty="0">
+                            <a:rPr lang="fr-FR" sz="2400" i="1" dirty="0" smtClean="0">
                               <a:latin typeface="Cambria Math" panose="02040503050406030204" pitchFamily="18" charset="0"/>
                             </a:rPr>
                           </m:ctrlPr>
                         </m:sSubPr>
                         <m:e>
                           <m:r>
-                            <a:rPr lang="fr-FR" sz="2400" i="1" dirty="0">
+                            <a:rPr lang="fr-FR" sz="2400" b="0" i="1" dirty="0" smtClean="0">
                               <a:latin typeface="Cambria Math" panose="02040503050406030204" pitchFamily="18" charset="0"/>
                             </a:rPr>
                             <m:t>𝐴</m:t>
-                          </m:r>
-                          <m:r>
-                            <a:rPr lang="fr-FR" sz="2400" i="1" dirty="0">
-                              <a:latin typeface="Cambria Math" panose="02040503050406030204" pitchFamily="18" charset="0"/>
-                            </a:rPr>
-                            <m:t>2</m:t>
                           </m:r>
                         </m:e>
                         <m:sub>
@@ -4942,7 +4930,7 @@
             </p:nvSpPr>
             <p:spPr>
               <a:xfrm>
-                <a:off x="2490758" y="5251143"/>
+                <a:off x="2561878" y="5220663"/>
                 <a:ext cx="535419" cy="461665"/>
               </a:xfrm>
               <a:prstGeom prst="rect">
@@ -4951,7 +4939,7 @@
               <a:blipFill>
                 <a:blip r:embed="rId4"/>
                 <a:stretch>
-                  <a:fillRect l="-3448" r="-21839" b="-1316"/>
+                  <a:fillRect b="-1316"/>
                 </a:stretch>
               </a:blipFill>
             </p:spPr>
@@ -4986,7 +4974,7 @@
             </p:nvSpPr>
             <p:spPr>
               <a:xfrm>
-                <a:off x="5492866" y="5245733"/>
+                <a:off x="5563986" y="5215253"/>
                 <a:ext cx="535419" cy="461665"/>
               </a:xfrm>
               <a:prstGeom prst="rect">
@@ -5010,7 +4998,7 @@
                       <m:sSub>
                         <m:sSubPr>
                           <m:ctrlPr>
-                            <a:rPr lang="fr-FR" sz="2400" i="1" dirty="0">
+                            <a:rPr lang="fr-FR" sz="2400" i="1" dirty="0" smtClean="0">
                               <a:latin typeface="Cambria Math" panose="02040503050406030204" pitchFamily="18" charset="0"/>
                             </a:rPr>
                           </m:ctrlPr>
@@ -5021,12 +5009,6 @@
                               <a:latin typeface="Cambria Math" panose="02040503050406030204" pitchFamily="18" charset="0"/>
                             </a:rPr>
                             <m:t>𝐴</m:t>
-                          </m:r>
-                          <m:r>
-                            <a:rPr lang="fr-FR" sz="2400" i="1" dirty="0">
-                              <a:latin typeface="Cambria Math" panose="02040503050406030204" pitchFamily="18" charset="0"/>
-                            </a:rPr>
-                            <m:t>2</m:t>
                           </m:r>
                         </m:e>
                         <m:sub>
@@ -5063,7 +5045,7 @@
             </p:nvSpPr>
             <p:spPr>
               <a:xfrm>
-                <a:off x="5492866" y="5245733"/>
+                <a:off x="5563986" y="5215253"/>
                 <a:ext cx="535419" cy="461665"/>
               </a:xfrm>
               <a:prstGeom prst="rect">
@@ -5072,7 +5054,7 @@
               <a:blipFill>
                 <a:blip r:embed="rId5"/>
                 <a:stretch>
-                  <a:fillRect l="-2273" r="-26136" b="-1333"/>
+                  <a:fillRect l="-3409" b="-1333"/>
                 </a:stretch>
               </a:blipFill>
             </p:spPr>
@@ -5107,7 +5089,7 @@
             </p:nvSpPr>
             <p:spPr>
               <a:xfrm>
-                <a:off x="8517195" y="5255545"/>
+                <a:off x="8557835" y="5225065"/>
                 <a:ext cx="535419" cy="461665"/>
               </a:xfrm>
               <a:prstGeom prst="rect">
@@ -5142,12 +5124,6 @@
                               <a:latin typeface="Cambria Math" panose="02040503050406030204" pitchFamily="18" charset="0"/>
                             </a:rPr>
                             <m:t>𝐴</m:t>
-                          </m:r>
-                          <m:r>
-                            <a:rPr lang="fr-FR" sz="2400" i="1" dirty="0">
-                              <a:latin typeface="Cambria Math" panose="02040503050406030204" pitchFamily="18" charset="0"/>
-                            </a:rPr>
-                            <m:t>2</m:t>
                           </m:r>
                         </m:e>
                         <m:sub>
@@ -5184,7 +5160,7 @@
             </p:nvSpPr>
             <p:spPr>
               <a:xfrm>
-                <a:off x="8517195" y="5255545"/>
+                <a:off x="8557835" y="5225065"/>
                 <a:ext cx="535419" cy="461665"/>
               </a:xfrm>
               <a:prstGeom prst="rect">
@@ -5193,7 +5169,7 @@
               <a:blipFill>
                 <a:blip r:embed="rId6"/>
                 <a:stretch>
-                  <a:fillRect l="-2273" r="-14773" b="-1316"/>
+                  <a:fillRect b="-1316"/>
                 </a:stretch>
               </a:blipFill>
             </p:spPr>
@@ -5228,7 +5204,7 @@
             </p:nvSpPr>
             <p:spPr>
               <a:xfrm>
-                <a:off x="11478894" y="5255544"/>
+                <a:off x="11550014" y="5225064"/>
                 <a:ext cx="535419" cy="461665"/>
               </a:xfrm>
               <a:prstGeom prst="rect">
@@ -5263,12 +5239,6 @@
                               <a:latin typeface="Cambria Math" panose="02040503050406030204" pitchFamily="18" charset="0"/>
                             </a:rPr>
                             <m:t>𝐴</m:t>
-                          </m:r>
-                          <m:r>
-                            <a:rPr lang="fr-FR" sz="2400" i="1" dirty="0">
-                              <a:latin typeface="Cambria Math" panose="02040503050406030204" pitchFamily="18" charset="0"/>
-                            </a:rPr>
-                            <m:t>2</m:t>
                           </m:r>
                         </m:e>
                         <m:sub>
@@ -5305,7 +5275,7 @@
             </p:nvSpPr>
             <p:spPr>
               <a:xfrm>
-                <a:off x="11478894" y="5255544"/>
+                <a:off x="11550014" y="5225064"/>
                 <a:ext cx="535419" cy="461665"/>
               </a:xfrm>
               <a:prstGeom prst="rect">
@@ -5314,7 +5284,7 @@
               <a:blipFill>
                 <a:blip r:embed="rId7"/>
                 <a:stretch>
-                  <a:fillRect l="-2273" r="-26136" b="-1316"/>
+                  <a:fillRect l="-3409" b="-1316"/>
                 </a:stretch>
               </a:blipFill>
             </p:spPr>
@@ -5349,7 +5319,7 @@
             </p:nvSpPr>
             <p:spPr>
               <a:xfrm>
-                <a:off x="5492865" y="3248588"/>
+                <a:off x="5584305" y="3228268"/>
                 <a:ext cx="535419" cy="461665"/>
               </a:xfrm>
               <a:prstGeom prst="rect">
@@ -5373,23 +5343,17 @@
                       <m:sSub>
                         <m:sSubPr>
                           <m:ctrlPr>
-                            <a:rPr lang="fr-FR" sz="2400" i="1" dirty="0">
+                            <a:rPr lang="fr-FR" sz="2400" i="1" dirty="0" smtClean="0">
                               <a:latin typeface="Cambria Math" panose="02040503050406030204" pitchFamily="18" charset="0"/>
                             </a:rPr>
                           </m:ctrlPr>
                         </m:sSubPr>
                         <m:e>
                           <m:r>
-                            <a:rPr lang="fr-FR" sz="2400" i="1" dirty="0">
-                              <a:latin typeface="Cambria Math" panose="02040503050406030204" pitchFamily="18" charset="0"/>
-                            </a:rPr>
-                            <m:t>𝐴</m:t>
-                          </m:r>
-                          <m:r>
-                            <a:rPr lang="fr-FR" sz="2400" i="1" dirty="0">
-                              <a:latin typeface="Cambria Math" panose="02040503050406030204" pitchFamily="18" charset="0"/>
-                            </a:rPr>
-                            <m:t>1</m:t>
+                            <a:rPr lang="fr-FR" sz="2400" b="0" i="1" dirty="0" smtClean="0">
+                              <a:latin typeface="Cambria Math" panose="02040503050406030204" pitchFamily="18" charset="0"/>
+                            </a:rPr>
+                            <m:t>𝐽</m:t>
                           </m:r>
                         </m:e>
                         <m:sub>
@@ -5426,7 +5390,7 @@
             </p:nvSpPr>
             <p:spPr>
               <a:xfrm>
-                <a:off x="5492865" y="3248588"/>
+                <a:off x="5584305" y="3228268"/>
                 <a:ext cx="535419" cy="461665"/>
               </a:xfrm>
               <a:prstGeom prst="rect">
@@ -5435,7 +5399,7 @@
               <a:blipFill>
                 <a:blip r:embed="rId8"/>
                 <a:stretch>
-                  <a:fillRect l="-2273" r="-26136"/>
+                  <a:fillRect b="-13333"/>
                 </a:stretch>
               </a:blipFill>
             </p:spPr>
@@ -5470,7 +5434,7 @@
             </p:nvSpPr>
             <p:spPr>
               <a:xfrm>
-                <a:off x="8517194" y="3248587"/>
+                <a:off x="8608634" y="3228267"/>
                 <a:ext cx="535419" cy="461665"/>
               </a:xfrm>
               <a:prstGeom prst="rect">
@@ -5494,23 +5458,17 @@
                       <m:sSub>
                         <m:sSubPr>
                           <m:ctrlPr>
-                            <a:rPr lang="fr-FR" sz="2400" i="1" dirty="0">
+                            <a:rPr lang="fr-FR" sz="2400" i="1" dirty="0" smtClean="0">
                               <a:latin typeface="Cambria Math" panose="02040503050406030204" pitchFamily="18" charset="0"/>
                             </a:rPr>
                           </m:ctrlPr>
                         </m:sSubPr>
                         <m:e>
                           <m:r>
-                            <a:rPr lang="fr-FR" sz="2400" i="1" dirty="0">
-                              <a:latin typeface="Cambria Math" panose="02040503050406030204" pitchFamily="18" charset="0"/>
-                            </a:rPr>
-                            <m:t>𝐴</m:t>
-                          </m:r>
-                          <m:r>
-                            <a:rPr lang="fr-FR" sz="2400" i="1" dirty="0">
-                              <a:latin typeface="Cambria Math" panose="02040503050406030204" pitchFamily="18" charset="0"/>
-                            </a:rPr>
-                            <m:t>1</m:t>
+                            <a:rPr lang="fr-FR" sz="2400" b="0" i="1" dirty="0" smtClean="0">
+                              <a:latin typeface="Cambria Math" panose="02040503050406030204" pitchFamily="18" charset="0"/>
+                            </a:rPr>
+                            <m:t>𝐽</m:t>
                           </m:r>
                         </m:e>
                         <m:sub>
@@ -5547,7 +5505,7 @@
             </p:nvSpPr>
             <p:spPr>
               <a:xfrm>
-                <a:off x="8517194" y="3248587"/>
+                <a:off x="8608634" y="3228267"/>
                 <a:ext cx="535419" cy="461665"/>
               </a:xfrm>
               <a:prstGeom prst="rect">
@@ -5556,7 +5514,7 @@
               <a:blipFill>
                 <a:blip r:embed="rId9"/>
                 <a:stretch>
-                  <a:fillRect l="-2273" r="-14773"/>
+                  <a:fillRect b="-13333"/>
                 </a:stretch>
               </a:blipFill>
             </p:spPr>
@@ -5591,7 +5549,7 @@
             </p:nvSpPr>
             <p:spPr>
               <a:xfrm>
-                <a:off x="11478894" y="3236250"/>
+                <a:off x="11570334" y="3215930"/>
                 <a:ext cx="535419" cy="461665"/>
               </a:xfrm>
               <a:prstGeom prst="rect">
@@ -5615,23 +5573,17 @@
                       <m:sSub>
                         <m:sSubPr>
                           <m:ctrlPr>
-                            <a:rPr lang="fr-FR" sz="2400" i="1" dirty="0">
+                            <a:rPr lang="fr-FR" sz="2400" i="1" dirty="0" smtClean="0">
                               <a:latin typeface="Cambria Math" panose="02040503050406030204" pitchFamily="18" charset="0"/>
                             </a:rPr>
                           </m:ctrlPr>
                         </m:sSubPr>
                         <m:e>
                           <m:r>
-                            <a:rPr lang="fr-FR" sz="2400" i="1" dirty="0">
-                              <a:latin typeface="Cambria Math" panose="02040503050406030204" pitchFamily="18" charset="0"/>
-                            </a:rPr>
-                            <m:t>𝐴</m:t>
-                          </m:r>
-                          <m:r>
-                            <a:rPr lang="fr-FR" sz="2400" i="1" dirty="0">
-                              <a:latin typeface="Cambria Math" panose="02040503050406030204" pitchFamily="18" charset="0"/>
-                            </a:rPr>
-                            <m:t>1</m:t>
+                            <a:rPr lang="fr-FR" sz="2400" b="0" i="1" dirty="0" smtClean="0">
+                              <a:latin typeface="Cambria Math" panose="02040503050406030204" pitchFamily="18" charset="0"/>
+                            </a:rPr>
+                            <m:t>𝐽</m:t>
                           </m:r>
                         </m:e>
                         <m:sub>
@@ -5668,7 +5620,7 @@
             </p:nvSpPr>
             <p:spPr>
               <a:xfrm>
-                <a:off x="11478894" y="3236250"/>
+                <a:off x="11570334" y="3215930"/>
                 <a:ext cx="535419" cy="461665"/>
               </a:xfrm>
               <a:prstGeom prst="rect">
@@ -5677,7 +5629,7 @@
               <a:blipFill>
                 <a:blip r:embed="rId10"/>
                 <a:stretch>
-                  <a:fillRect l="-2273" r="-26136"/>
+                  <a:fillRect b="-13333"/>
                 </a:stretch>
               </a:blipFill>
             </p:spPr>
@@ -5736,17 +5688,17 @@
                       <m:sSub>
                         <m:sSubPr>
                           <m:ctrlPr>
-                            <a:rPr lang="fr-FR" sz="2400" i="1" dirty="0">
+                            <a:rPr lang="fr-FR" sz="2400" i="1" dirty="0" smtClean="0">
                               <a:latin typeface="Cambria Math" panose="02040503050406030204" pitchFamily="18" charset="0"/>
                             </a:rPr>
                           </m:ctrlPr>
                         </m:sSubPr>
                         <m:e>
                           <m:r>
-                            <a:rPr lang="fr-FR" sz="2400" i="1" dirty="0">
-                              <a:latin typeface="Cambria Math" panose="02040503050406030204" pitchFamily="18" charset="0"/>
-                            </a:rPr>
-                            <m:t>𝐽</m:t>
+                            <a:rPr lang="fr-FR" sz="2400" b="0" i="1" dirty="0" smtClean="0">
+                              <a:latin typeface="Cambria Math" panose="02040503050406030204" pitchFamily="18" charset="0"/>
+                            </a:rPr>
+                            <m:t>𝐿</m:t>
                           </m:r>
                         </m:e>
                         <m:sub>
@@ -5792,7 +5744,7 @@
               <a:blipFill>
                 <a:blip r:embed="rId11"/>
                 <a:stretch>
-                  <a:fillRect b="-13333"/>
+                  <a:fillRect l="-1149" b="-1333"/>
                 </a:stretch>
               </a:blipFill>
             </p:spPr>
@@ -5851,17 +5803,17 @@
                       <m:sSub>
                         <m:sSubPr>
                           <m:ctrlPr>
-                            <a:rPr lang="fr-FR" sz="2400" i="1" dirty="0">
+                            <a:rPr lang="fr-FR" sz="2400" i="1" dirty="0" smtClean="0">
                               <a:latin typeface="Cambria Math" panose="02040503050406030204" pitchFamily="18" charset="0"/>
                             </a:rPr>
                           </m:ctrlPr>
                         </m:sSubPr>
                         <m:e>
                           <m:r>
-                            <a:rPr lang="fr-FR" sz="2400" i="1" dirty="0">
-                              <a:latin typeface="Cambria Math" panose="02040503050406030204" pitchFamily="18" charset="0"/>
-                            </a:rPr>
-                            <m:t>𝐽</m:t>
+                            <a:rPr lang="fr-FR" sz="2400" b="0" i="1" dirty="0" smtClean="0">
+                              <a:latin typeface="Cambria Math" panose="02040503050406030204" pitchFamily="18" charset="0"/>
+                            </a:rPr>
+                            <m:t>𝐿</m:t>
                           </m:r>
                         </m:e>
                         <m:sub>
@@ -5907,7 +5859,7 @@
               <a:blipFill>
                 <a:blip r:embed="rId12"/>
                 <a:stretch>
-                  <a:fillRect b="-13333"/>
+                  <a:fillRect b="-1333"/>
                 </a:stretch>
               </a:blipFill>
             </p:spPr>
@@ -5966,17 +5918,17 @@
                       <m:sSub>
                         <m:sSubPr>
                           <m:ctrlPr>
-                            <a:rPr lang="fr-FR" sz="2400" i="1" dirty="0">
+                            <a:rPr lang="fr-FR" sz="2400" i="1" dirty="0" smtClean="0">
                               <a:latin typeface="Cambria Math" panose="02040503050406030204" pitchFamily="18" charset="0"/>
                             </a:rPr>
                           </m:ctrlPr>
                         </m:sSubPr>
                         <m:e>
                           <m:r>
-                            <a:rPr lang="fr-FR" sz="2400" i="1" dirty="0">
-                              <a:latin typeface="Cambria Math" panose="02040503050406030204" pitchFamily="18" charset="0"/>
-                            </a:rPr>
-                            <m:t>𝐽</m:t>
+                            <a:rPr lang="fr-FR" sz="2400" b="0" i="1" dirty="0" smtClean="0">
+                              <a:latin typeface="Cambria Math" panose="02040503050406030204" pitchFamily="18" charset="0"/>
+                            </a:rPr>
+                            <m:t>𝐿</m:t>
                           </m:r>
                         </m:e>
                         <m:sub>
@@ -6022,7 +5974,7 @@
               <a:blipFill>
                 <a:blip r:embed="rId13"/>
                 <a:stretch>
-                  <a:fillRect b="-13333"/>
+                  <a:fillRect b="-1333"/>
                 </a:stretch>
               </a:blipFill>
             </p:spPr>
@@ -6057,8 +6009,8 @@
             </p:nvSpPr>
             <p:spPr>
               <a:xfrm>
-                <a:off x="3739243" y="1559390"/>
-                <a:ext cx="758156" cy="459421"/>
+                <a:off x="3502272" y="1566463"/>
+                <a:ext cx="1739835" cy="459421"/>
               </a:xfrm>
               <a:prstGeom prst="rect">
                 <a:avLst/>
@@ -6078,13 +6030,34 @@
                       <m:jc m:val="centerGroup"/>
                     </m:oMathParaPr>
                     <m:oMath xmlns:m="http://schemas.openxmlformats.org/officeDocument/2006/math">
-                      <m:r>
-                        <a:rPr lang="fr-FR" sz="1600" i="1">
-                          <a:latin typeface="Cambria Math" panose="02040503050406030204" pitchFamily="18" charset="0"/>
-                          <a:ea typeface="Cambria Math" panose="02040503050406030204" pitchFamily="18" charset="0"/>
-                        </a:rPr>
-                        <m:t>𝛽</m:t>
-                      </m:r>
+                      <m:sSub>
+                        <m:sSubPr>
+                          <m:ctrlPr>
+                            <a:rPr lang="fr-FR" sz="1600" b="0" i="1" smtClean="0">
+                              <a:latin typeface="Cambria Math" panose="02040503050406030204" pitchFamily="18" charset="0"/>
+                              <a:ea typeface="Cambria Math" panose="02040503050406030204" pitchFamily="18" charset="0"/>
+                            </a:rPr>
+                          </m:ctrlPr>
+                        </m:sSubPr>
+                        <m:e>
+                          <m:r>
+                            <a:rPr lang="fr-FR" sz="1600" i="1" smtClean="0">
+                              <a:latin typeface="Cambria Math" panose="02040503050406030204" pitchFamily="18" charset="0"/>
+                              <a:ea typeface="Cambria Math" panose="02040503050406030204" pitchFamily="18" charset="0"/>
+                            </a:rPr>
+                            <m:t>𝛽</m:t>
+                          </m:r>
+                        </m:e>
+                        <m:sub>
+                          <m:r>
+                            <a:rPr lang="fr-FR" sz="1600" b="0" i="1" smtClean="0">
+                              <a:latin typeface="Cambria Math" panose="02040503050406030204" pitchFamily="18" charset="0"/>
+                              <a:ea typeface="Cambria Math" panose="02040503050406030204" pitchFamily="18" charset="0"/>
+                            </a:rPr>
+                            <m:t>1</m:t>
+                          </m:r>
+                        </m:sub>
+                      </m:sSub>
                       <m:r>
                         <a:rPr lang="fr-FR" sz="1600" i="1">
                           <a:latin typeface="Cambria Math" panose="02040503050406030204" pitchFamily="18" charset="0"/>
@@ -6148,6 +6121,100 @@
                           </m:r>
                         </m:den>
                       </m:f>
+                      <m:r>
+                        <a:rPr lang="fr-FR" sz="1600" b="0" i="1" smtClean="0">
+                          <a:solidFill>
+                            <a:srgbClr val="C00000"/>
+                          </a:solidFill>
+                          <a:latin typeface="Cambria Math" panose="02040503050406030204" pitchFamily="18" charset="0"/>
+                          <a:ea typeface="Cambria Math" panose="02040503050406030204" pitchFamily="18" charset="0"/>
+                        </a:rPr>
+                        <m:t>+</m:t>
+                      </m:r>
+                      <m:sSub>
+                        <m:sSubPr>
+                          <m:ctrlPr>
+                            <a:rPr lang="fr-FR" sz="1600" b="0" i="1" smtClean="0">
+                              <a:solidFill>
+                                <a:srgbClr val="C00000"/>
+                              </a:solidFill>
+                              <a:latin typeface="Cambria Math" panose="02040503050406030204" pitchFamily="18" charset="0"/>
+                              <a:ea typeface="Cambria Math" panose="02040503050406030204" pitchFamily="18" charset="0"/>
+                            </a:rPr>
+                          </m:ctrlPr>
+                        </m:sSubPr>
+                        <m:e>
+                          <m:r>
+                            <a:rPr lang="fr-FR" sz="1600" b="0" i="1" smtClean="0">
+                              <a:solidFill>
+                                <a:srgbClr val="C00000"/>
+                              </a:solidFill>
+                              <a:latin typeface="Cambria Math" panose="02040503050406030204" pitchFamily="18" charset="0"/>
+                              <a:ea typeface="Cambria Math" panose="02040503050406030204" pitchFamily="18" charset="0"/>
+                            </a:rPr>
+                            <m:t>𝛼</m:t>
+                          </m:r>
+                        </m:e>
+                        <m:sub>
+                          <m:r>
+                            <a:rPr lang="fr-FR" sz="1600" b="0" i="1" smtClean="0">
+                              <a:solidFill>
+                                <a:srgbClr val="C00000"/>
+                              </a:solidFill>
+                              <a:latin typeface="Cambria Math" panose="02040503050406030204" pitchFamily="18" charset="0"/>
+                              <a:ea typeface="Cambria Math" panose="02040503050406030204" pitchFamily="18" charset="0"/>
+                            </a:rPr>
+                            <m:t>𝐿</m:t>
+                          </m:r>
+                        </m:sub>
+                      </m:sSub>
+                      <m:sSub>
+                        <m:sSubPr>
+                          <m:ctrlPr>
+                            <a:rPr lang="fr-FR" sz="1600" b="0" i="1" smtClean="0">
+                              <a:solidFill>
+                                <a:srgbClr val="C00000"/>
+                              </a:solidFill>
+                              <a:latin typeface="Cambria Math" panose="02040503050406030204" pitchFamily="18" charset="0"/>
+                              <a:ea typeface="Cambria Math" panose="02040503050406030204" pitchFamily="18" charset="0"/>
+                            </a:rPr>
+                          </m:ctrlPr>
+                        </m:sSubPr>
+                        <m:e>
+                          <m:r>
+                            <a:rPr lang="fr-FR" sz="1600" b="0" i="1" smtClean="0">
+                              <a:solidFill>
+                                <a:srgbClr val="C00000"/>
+                              </a:solidFill>
+                              <a:latin typeface="Cambria Math" panose="02040503050406030204" pitchFamily="18" charset="0"/>
+                              <a:ea typeface="Cambria Math" panose="02040503050406030204" pitchFamily="18" charset="0"/>
+                            </a:rPr>
+                            <m:t>𝛽</m:t>
+                          </m:r>
+                        </m:e>
+                        <m:sub>
+                          <m:r>
+                            <a:rPr lang="fr-FR" sz="1600" b="0" i="1" smtClean="0">
+                              <a:solidFill>
+                                <a:srgbClr val="C00000"/>
+                              </a:solidFill>
+                              <a:latin typeface="Cambria Math" panose="02040503050406030204" pitchFamily="18" charset="0"/>
+                              <a:ea typeface="Cambria Math" panose="02040503050406030204" pitchFamily="18" charset="0"/>
+                            </a:rPr>
+                            <m:t>2</m:t>
+                          </m:r>
+                        </m:sub>
+                      </m:sSub>
+                      <m:r>
+                        <a:rPr lang="fr-FR" sz="1600" b="0" i="1" smtClean="0">
+                          <a:solidFill>
+                            <a:srgbClr val="C00000"/>
+                          </a:solidFill>
+                          <a:latin typeface="Cambria Math" panose="02040503050406030204" pitchFamily="18" charset="0"/>
+                          <a:ea typeface="Cambria Math" panose="02040503050406030204" pitchFamily="18" charset="0"/>
+                        </a:rPr>
+                        <m:t>𝑆𝑃</m:t>
+                      </m:r>
                     </m:oMath>
                   </m:oMathPara>
                 </a14:m>
@@ -6173,8 +6240,8 @@
             </p:nvSpPr>
             <p:spPr>
               <a:xfrm>
-                <a:off x="3739243" y="1559390"/>
-                <a:ext cx="758156" cy="459421"/>
+                <a:off x="3502272" y="1566463"/>
+                <a:ext cx="1739835" cy="459421"/>
               </a:xfrm>
               <a:prstGeom prst="rect">
                 <a:avLst/>
@@ -6201,328 +6268,8 @@
           </p:sp>
         </mc:Fallback>
       </mc:AlternateContent>
-      <mc:AlternateContent xmlns:mc="http://schemas.openxmlformats.org/markup-compatibility/2006">
-        <mc:Choice xmlns:a14="http://schemas.microsoft.com/office/drawing/2010/main" Requires="a14">
-          <p:sp>
-            <p:nvSpPr>
-              <p:cNvPr id="95" name="TextBox 94">
-                <a:extLst>
-                  <a:ext uri="{FF2B5EF4-FFF2-40B4-BE49-F238E27FC236}">
-                    <a16:creationId xmlns:a16="http://schemas.microsoft.com/office/drawing/2014/main" id="{63BA9A5E-C636-BC83-B072-69ED59471F05}"/>
-                  </a:ext>
-                </a:extLst>
-              </p:cNvPr>
-              <p:cNvSpPr txBox="1"/>
-              <p:nvPr/>
-            </p:nvSpPr>
-            <p:spPr>
-              <a:xfrm>
-                <a:off x="3739243" y="3580022"/>
-                <a:ext cx="758156" cy="459421"/>
-              </a:xfrm>
-              <a:prstGeom prst="rect">
-                <a:avLst/>
-              </a:prstGeom>
-              <a:noFill/>
-            </p:spPr>
-            <p:txBody>
-              <a:bodyPr wrap="none" lIns="0" tIns="0" rIns="0" bIns="0" rtlCol="0">
-                <a:spAutoFit/>
-              </a:bodyPr>
-              <a:lstStyle/>
-              <a:p>
-                <a:pPr/>
-                <a14:m>
-                  <m:oMathPara xmlns:m="http://schemas.openxmlformats.org/officeDocument/2006/math">
-                    <m:oMathParaPr>
-                      <m:jc m:val="centerGroup"/>
-                    </m:oMathParaPr>
-                    <m:oMath xmlns:m="http://schemas.openxmlformats.org/officeDocument/2006/math">
-                      <m:r>
-                        <a:rPr lang="fr-FR" sz="1600" i="1">
-                          <a:latin typeface="Cambria Math" panose="02040503050406030204" pitchFamily="18" charset="0"/>
-                          <a:ea typeface="Cambria Math" panose="02040503050406030204" pitchFamily="18" charset="0"/>
-                        </a:rPr>
-                        <m:t>𝛽</m:t>
-                      </m:r>
-                      <m:r>
-                        <a:rPr lang="fr-FR" sz="1600" i="1">
-                          <a:latin typeface="Cambria Math" panose="02040503050406030204" pitchFamily="18" charset="0"/>
-                          <a:ea typeface="Cambria Math" panose="02040503050406030204" pitchFamily="18" charset="0"/>
-                        </a:rPr>
-                        <m:t>∙ </m:t>
-                      </m:r>
-                      <m:f>
-                        <m:fPr>
-                          <m:ctrlPr>
-                            <a:rPr lang="fr-FR" sz="1600" i="1">
-                              <a:latin typeface="Cambria Math" panose="02040503050406030204" pitchFamily="18" charset="0"/>
-                              <a:ea typeface="Cambria Math" panose="02040503050406030204" pitchFamily="18" charset="0"/>
-                            </a:rPr>
-                          </m:ctrlPr>
-                        </m:fPr>
-                        <m:num>
-                          <m:r>
-                            <a:rPr lang="fr-FR" sz="1600" i="1">
-                              <a:latin typeface="Cambria Math" panose="02040503050406030204" pitchFamily="18" charset="0"/>
-                              <a:ea typeface="Cambria Math" panose="02040503050406030204" pitchFamily="18" charset="0"/>
-                            </a:rPr>
-                            <m:t>𝑇𝑜</m:t>
-                          </m:r>
-                          <m:sSub>
-                            <m:sSubPr>
-                              <m:ctrlPr>
-                                <a:rPr lang="fr-FR" sz="1600" i="1">
-                                  <a:latin typeface="Cambria Math" panose="02040503050406030204" pitchFamily="18" charset="0"/>
-                                  <a:ea typeface="Cambria Math" panose="02040503050406030204" pitchFamily="18" charset="0"/>
-                                </a:rPr>
-                              </m:ctrlPr>
-                            </m:sSubPr>
-                            <m:e>
-                              <m:r>
-                                <a:rPr lang="fr-FR" sz="1600" i="1">
-                                  <a:latin typeface="Cambria Math" panose="02040503050406030204" pitchFamily="18" charset="0"/>
-                                  <a:ea typeface="Cambria Math" panose="02040503050406030204" pitchFamily="18" charset="0"/>
-                                </a:rPr>
-                                <m:t>𝑡</m:t>
-                              </m:r>
-                            </m:e>
-                            <m:sub>
-                              <m:r>
-                                <a:rPr lang="fr-FR" sz="1600" i="1">
-                                  <a:latin typeface="Cambria Math" panose="02040503050406030204" pitchFamily="18" charset="0"/>
-                                  <a:ea typeface="Cambria Math" panose="02040503050406030204" pitchFamily="18" charset="0"/>
-                                </a:rPr>
-                                <m:t>𝐼</m:t>
-                              </m:r>
-                            </m:sub>
-                          </m:sSub>
-                        </m:num>
-                        <m:den>
-                          <m:r>
-                            <a:rPr lang="fr-FR" sz="1600" i="1">
-                              <a:latin typeface="Cambria Math" panose="02040503050406030204" pitchFamily="18" charset="0"/>
-                              <a:ea typeface="Cambria Math" panose="02040503050406030204" pitchFamily="18" charset="0"/>
-                            </a:rPr>
-                            <m:t>𝑁</m:t>
-                          </m:r>
-                        </m:den>
-                      </m:f>
-                    </m:oMath>
-                  </m:oMathPara>
-                </a14:m>
-                <a:endParaRPr lang="en-US" sz="1600" dirty="0"/>
-              </a:p>
-            </p:txBody>
-          </p:sp>
-        </mc:Choice>
-        <mc:Fallback>
-          <p:sp>
-            <p:nvSpPr>
-              <p:cNvPr id="95" name="TextBox 94">
-                <a:extLst>
-                  <a:ext uri="{FF2B5EF4-FFF2-40B4-BE49-F238E27FC236}">
-                    <a16:creationId xmlns:a16="http://schemas.microsoft.com/office/drawing/2014/main" id="{63BA9A5E-C636-BC83-B072-69ED59471F05}"/>
-                  </a:ext>
-                </a:extLst>
-              </p:cNvPr>
-              <p:cNvSpPr txBox="1">
-                <a:spLocks noRot="1" noChangeAspect="1" noMove="1" noResize="1" noEditPoints="1" noAdjustHandles="1" noChangeArrowheads="1" noChangeShapeType="1" noTextEdit="1"/>
-              </p:cNvSpPr>
-              <p:nvPr/>
-            </p:nvSpPr>
-            <p:spPr>
-              <a:xfrm>
-                <a:off x="3739243" y="3580022"/>
-                <a:ext cx="758156" cy="459421"/>
-              </a:xfrm>
-              <a:prstGeom prst="rect">
-                <a:avLst/>
-              </a:prstGeom>
-              <a:blipFill>
-                <a:blip r:embed="rId15"/>
-                <a:stretch>
-                  <a:fillRect/>
-                </a:stretch>
-              </a:blipFill>
-            </p:spPr>
-            <p:txBody>
-              <a:bodyPr/>
-              <a:lstStyle/>
-              <a:p>
-                <a:r>
-                  <a:rPr lang="en-US">
-                    <a:noFill/>
-                  </a:rPr>
-                  <a:t> </a:t>
-                </a:r>
-              </a:p>
-            </p:txBody>
-          </p:sp>
-        </mc:Fallback>
-      </mc:AlternateContent>
-      <mc:AlternateContent xmlns:mc="http://schemas.openxmlformats.org/markup-compatibility/2006">
-        <mc:Choice xmlns:a14="http://schemas.microsoft.com/office/drawing/2010/main" Requires="a14">
-          <p:sp>
-            <p:nvSpPr>
-              <p:cNvPr id="96" name="TextBox 95">
-                <a:extLst>
-                  <a:ext uri="{FF2B5EF4-FFF2-40B4-BE49-F238E27FC236}">
-                    <a16:creationId xmlns:a16="http://schemas.microsoft.com/office/drawing/2014/main" id="{D92E8D63-D894-CA35-0632-660138D18BC0}"/>
-                  </a:ext>
-                </a:extLst>
-              </p:cNvPr>
-              <p:cNvSpPr txBox="1"/>
-              <p:nvPr/>
-            </p:nvSpPr>
-            <p:spPr>
-              <a:xfrm>
-                <a:off x="3739243" y="4963697"/>
-                <a:ext cx="758156" cy="459421"/>
-              </a:xfrm>
-              <a:prstGeom prst="rect">
-                <a:avLst/>
-              </a:prstGeom>
-              <a:noFill/>
-            </p:spPr>
-            <p:txBody>
-              <a:bodyPr wrap="none" lIns="0" tIns="0" rIns="0" bIns="0" rtlCol="0">
-                <a:spAutoFit/>
-              </a:bodyPr>
-              <a:lstStyle/>
-              <a:p>
-                <a:pPr/>
-                <a14:m>
-                  <m:oMathPara xmlns:m="http://schemas.openxmlformats.org/officeDocument/2006/math">
-                    <m:oMathParaPr>
-                      <m:jc m:val="centerGroup"/>
-                    </m:oMathParaPr>
-                    <m:oMath xmlns:m="http://schemas.openxmlformats.org/officeDocument/2006/math">
-                      <m:r>
-                        <a:rPr lang="fr-FR" sz="1600" i="1">
-                          <a:latin typeface="Cambria Math" panose="02040503050406030204" pitchFamily="18" charset="0"/>
-                          <a:ea typeface="Cambria Math" panose="02040503050406030204" pitchFamily="18" charset="0"/>
-                        </a:rPr>
-                        <m:t>𝛽</m:t>
-                      </m:r>
-                      <m:r>
-                        <a:rPr lang="fr-FR" sz="1600" i="1">
-                          <a:latin typeface="Cambria Math" panose="02040503050406030204" pitchFamily="18" charset="0"/>
-                          <a:ea typeface="Cambria Math" panose="02040503050406030204" pitchFamily="18" charset="0"/>
-                        </a:rPr>
-                        <m:t>∙ </m:t>
-                      </m:r>
-                      <m:f>
-                        <m:fPr>
-                          <m:ctrlPr>
-                            <a:rPr lang="fr-FR" sz="1600" i="1">
-                              <a:latin typeface="Cambria Math" panose="02040503050406030204" pitchFamily="18" charset="0"/>
-                              <a:ea typeface="Cambria Math" panose="02040503050406030204" pitchFamily="18" charset="0"/>
-                            </a:rPr>
-                          </m:ctrlPr>
-                        </m:fPr>
-                        <m:num>
-                          <m:r>
-                            <a:rPr lang="fr-FR" sz="1600" i="1">
-                              <a:latin typeface="Cambria Math" panose="02040503050406030204" pitchFamily="18" charset="0"/>
-                              <a:ea typeface="Cambria Math" panose="02040503050406030204" pitchFamily="18" charset="0"/>
-                            </a:rPr>
-                            <m:t>𝑇𝑜</m:t>
-                          </m:r>
-                          <m:sSub>
-                            <m:sSubPr>
-                              <m:ctrlPr>
-                                <a:rPr lang="fr-FR" sz="1600" i="1">
-                                  <a:latin typeface="Cambria Math" panose="02040503050406030204" pitchFamily="18" charset="0"/>
-                                  <a:ea typeface="Cambria Math" panose="02040503050406030204" pitchFamily="18" charset="0"/>
-                                </a:rPr>
-                              </m:ctrlPr>
-                            </m:sSubPr>
-                            <m:e>
-                              <m:r>
-                                <a:rPr lang="fr-FR" sz="1600" i="1">
-                                  <a:latin typeface="Cambria Math" panose="02040503050406030204" pitchFamily="18" charset="0"/>
-                                  <a:ea typeface="Cambria Math" panose="02040503050406030204" pitchFamily="18" charset="0"/>
-                                </a:rPr>
-                                <m:t>𝑡</m:t>
-                              </m:r>
-                            </m:e>
-                            <m:sub>
-                              <m:r>
-                                <a:rPr lang="fr-FR" sz="1600" i="1">
-                                  <a:latin typeface="Cambria Math" panose="02040503050406030204" pitchFamily="18" charset="0"/>
-                                  <a:ea typeface="Cambria Math" panose="02040503050406030204" pitchFamily="18" charset="0"/>
-                                </a:rPr>
-                                <m:t>𝐼</m:t>
-                              </m:r>
-                            </m:sub>
-                          </m:sSub>
-                        </m:num>
-                        <m:den>
-                          <m:r>
-                            <a:rPr lang="fr-FR" sz="1600" i="1">
-                              <a:latin typeface="Cambria Math" panose="02040503050406030204" pitchFamily="18" charset="0"/>
-                              <a:ea typeface="Cambria Math" panose="02040503050406030204" pitchFamily="18" charset="0"/>
-                            </a:rPr>
-                            <m:t>𝑁</m:t>
-                          </m:r>
-                        </m:den>
-                      </m:f>
-                    </m:oMath>
-                  </m:oMathPara>
-                </a14:m>
-                <a:endParaRPr lang="en-US" sz="1600" dirty="0"/>
-              </a:p>
-            </p:txBody>
-          </p:sp>
-        </mc:Choice>
-        <mc:Fallback>
-          <p:sp>
-            <p:nvSpPr>
-              <p:cNvPr id="96" name="TextBox 95">
-                <a:extLst>
-                  <a:ext uri="{FF2B5EF4-FFF2-40B4-BE49-F238E27FC236}">
-                    <a16:creationId xmlns:a16="http://schemas.microsoft.com/office/drawing/2014/main" id="{D92E8D63-D894-CA35-0632-660138D18BC0}"/>
-                  </a:ext>
-                </a:extLst>
-              </p:cNvPr>
-              <p:cNvSpPr txBox="1">
-                <a:spLocks noRot="1" noChangeAspect="1" noMove="1" noResize="1" noEditPoints="1" noAdjustHandles="1" noChangeArrowheads="1" noChangeShapeType="1" noTextEdit="1"/>
-              </p:cNvSpPr>
-              <p:nvPr/>
-            </p:nvSpPr>
-            <p:spPr>
-              <a:xfrm>
-                <a:off x="3739243" y="4963697"/>
-                <a:ext cx="758156" cy="459421"/>
-              </a:xfrm>
-              <a:prstGeom prst="rect">
-                <a:avLst/>
-              </a:prstGeom>
-              <a:blipFill>
-                <a:blip r:embed="rId16"/>
-                <a:stretch>
-                  <a:fillRect/>
-                </a:stretch>
-              </a:blipFill>
-            </p:spPr>
-            <p:txBody>
-              <a:bodyPr/>
-              <a:lstStyle/>
-              <a:p>
-                <a:r>
-                  <a:rPr lang="en-US">
-                    <a:noFill/>
-                  </a:rPr>
-                  <a:t> </a:t>
-                </a:r>
-              </a:p>
-            </p:txBody>
-          </p:sp>
-        </mc:Fallback>
-      </mc:AlternateContent>
-      <mc:AlternateContent xmlns:mc="http://schemas.openxmlformats.org/markup-compatibility/2006">
-        <mc:Choice xmlns:a14="http://schemas.microsoft.com/office/drawing/2010/main" Requires="a14">
+      <mc:AlternateContent xmlns:mc="http://schemas.openxmlformats.org/markup-compatibility/2006" xmlns:a14="http://schemas.microsoft.com/office/drawing/2010/main">
+        <mc:Choice Requires="a14">
           <p:sp>
             <p:nvSpPr>
               <p:cNvPr id="99" name="TextBox 98">
@@ -6573,7 +6320,7 @@
             </p:txBody>
           </p:sp>
         </mc:Choice>
-        <mc:Fallback>
+        <mc:Fallback xmlns="">
           <p:sp>
             <p:nvSpPr>
               <p:cNvPr id="99" name="TextBox 98">
@@ -6618,8 +6365,8 @@
           </p:sp>
         </mc:Fallback>
       </mc:AlternateContent>
-      <mc:AlternateContent xmlns:mc="http://schemas.openxmlformats.org/markup-compatibility/2006">
-        <mc:Choice xmlns:a14="http://schemas.microsoft.com/office/drawing/2010/main" Requires="a14">
+      <mc:AlternateContent xmlns:mc="http://schemas.openxmlformats.org/markup-compatibility/2006" xmlns:a14="http://schemas.microsoft.com/office/drawing/2010/main">
+        <mc:Choice Requires="a14">
           <p:sp>
             <p:nvSpPr>
               <p:cNvPr id="102" name="TextBox 101">
@@ -6670,7 +6417,7 @@
             </p:txBody>
           </p:sp>
         </mc:Choice>
-        <mc:Fallback>
+        <mc:Fallback xmlns="">
           <p:sp>
             <p:nvSpPr>
               <p:cNvPr id="102" name="TextBox 101">
@@ -6732,7 +6479,7 @@
             <p:spPr>
               <a:xfrm>
                 <a:off x="2511249" y="2255482"/>
-                <a:ext cx="260712" cy="276999"/>
+                <a:ext cx="264111" cy="276999"/>
               </a:xfrm>
               <a:prstGeom prst="rect">
                 <a:avLst/>
@@ -6755,7 +6502,7 @@
                       <m:sSub>
                         <m:sSubPr>
                           <m:ctrlPr>
-                            <a:rPr lang="fr-FR" i="1">
+                            <a:rPr lang="fr-FR" i="1" smtClean="0">
                               <a:latin typeface="Cambria Math" panose="02040503050406030204" pitchFamily="18" charset="0"/>
                             </a:rPr>
                           </m:ctrlPr>
@@ -6771,10 +6518,11 @@
                         </m:e>
                         <m:sub>
                           <m:r>
-                            <a:rPr lang="fr-FR" i="1">
-                              <a:latin typeface="Cambria Math" panose="02040503050406030204" pitchFamily="18" charset="0"/>
-                            </a:rPr>
-                            <m:t>1</m:t>
+                            <a:rPr lang="fr-FR" b="0" i="1" smtClean="0">
+                              <a:latin typeface="Cambria Math" panose="02040503050406030204" pitchFamily="18" charset="0"/>
+                              <a:ea typeface="Cambria Math" panose="02040503050406030204" pitchFamily="18" charset="0"/>
+                            </a:rPr>
+                            <m:t>𝐿</m:t>
                           </m:r>
                         </m:sub>
                       </m:sSub>
@@ -6804,7 +6552,7 @@
             <p:spPr>
               <a:xfrm>
                 <a:off x="2511249" y="2255482"/>
-                <a:ext cx="260712" cy="276999"/>
+                <a:ext cx="264111" cy="276999"/>
               </a:xfrm>
               <a:prstGeom prst="rect">
                 <a:avLst/>
@@ -6848,7 +6596,7 @@
             <p:spPr>
               <a:xfrm>
                 <a:off x="5483266" y="2255482"/>
-                <a:ext cx="260712" cy="276999"/>
+                <a:ext cx="264111" cy="276999"/>
               </a:xfrm>
               <a:prstGeom prst="rect">
                 <a:avLst/>
@@ -6871,7 +6619,7 @@
                       <m:sSub>
                         <m:sSubPr>
                           <m:ctrlPr>
-                            <a:rPr lang="fr-FR" i="1">
+                            <a:rPr lang="fr-FR" i="1" smtClean="0">
                               <a:latin typeface="Cambria Math" panose="02040503050406030204" pitchFamily="18" charset="0"/>
                             </a:rPr>
                           </m:ctrlPr>
@@ -6887,10 +6635,11 @@
                         </m:e>
                         <m:sub>
                           <m:r>
-                            <a:rPr lang="fr-FR" i="1">
-                              <a:latin typeface="Cambria Math" panose="02040503050406030204" pitchFamily="18" charset="0"/>
-                            </a:rPr>
-                            <m:t>1</m:t>
+                            <a:rPr lang="fr-FR" b="0" i="1" smtClean="0">
+                              <a:latin typeface="Cambria Math" panose="02040503050406030204" pitchFamily="18" charset="0"/>
+                              <a:ea typeface="Cambria Math" panose="02040503050406030204" pitchFamily="18" charset="0"/>
+                            </a:rPr>
+                            <m:t>𝐿</m:t>
                           </m:r>
                         </m:sub>
                       </m:sSub>
@@ -6920,7 +6669,7 @@
             <p:spPr>
               <a:xfrm>
                 <a:off x="5483266" y="2255482"/>
-                <a:ext cx="260712" cy="276999"/>
+                <a:ext cx="264111" cy="276999"/>
               </a:xfrm>
               <a:prstGeom prst="rect">
                 <a:avLst/>
@@ -6928,7 +6677,7 @@
               <a:blipFill>
                 <a:blip r:embed="rId20"/>
                 <a:stretch>
-                  <a:fillRect l="-13953" r="-6977" b="-15556"/>
+                  <a:fillRect l="-13636" r="-4545" b="-15556"/>
                 </a:stretch>
               </a:blipFill>
             </p:spPr>
@@ -6964,7 +6713,7 @@
             <p:spPr>
               <a:xfrm>
                 <a:off x="8523399" y="2255481"/>
-                <a:ext cx="260712" cy="276999"/>
+                <a:ext cx="264111" cy="276999"/>
               </a:xfrm>
               <a:prstGeom prst="rect">
                 <a:avLst/>
@@ -6987,7 +6736,7 @@
                       <m:sSub>
                         <m:sSubPr>
                           <m:ctrlPr>
-                            <a:rPr lang="fr-FR" i="1">
+                            <a:rPr lang="fr-FR" i="1" smtClean="0">
                               <a:latin typeface="Cambria Math" panose="02040503050406030204" pitchFamily="18" charset="0"/>
                             </a:rPr>
                           </m:ctrlPr>
@@ -7003,10 +6752,11 @@
                         </m:e>
                         <m:sub>
                           <m:r>
-                            <a:rPr lang="fr-FR" i="1">
-                              <a:latin typeface="Cambria Math" panose="02040503050406030204" pitchFamily="18" charset="0"/>
-                            </a:rPr>
-                            <m:t>1</m:t>
+                            <a:rPr lang="fr-FR" b="0" i="1" smtClean="0">
+                              <a:latin typeface="Cambria Math" panose="02040503050406030204" pitchFamily="18" charset="0"/>
+                              <a:ea typeface="Cambria Math" panose="02040503050406030204" pitchFamily="18" charset="0"/>
+                            </a:rPr>
+                            <m:t>𝐿</m:t>
                           </m:r>
                         </m:sub>
                       </m:sSub>
@@ -7036,7 +6786,7 @@
             <p:spPr>
               <a:xfrm>
                 <a:off x="8523399" y="2255481"/>
-                <a:ext cx="260712" cy="276999"/>
+                <a:ext cx="264111" cy="276999"/>
               </a:xfrm>
               <a:prstGeom prst="rect">
                 <a:avLst/>
@@ -7044,7 +6794,7 @@
               <a:blipFill>
                 <a:blip r:embed="rId21"/>
                 <a:stretch>
-                  <a:fillRect l="-13953" r="-6977" b="-15556"/>
+                  <a:fillRect l="-13636" r="-4545" b="-15556"/>
                 </a:stretch>
               </a:blipFill>
             </p:spPr>
@@ -7080,7 +6830,7 @@
             <p:spPr>
               <a:xfrm>
                 <a:off x="11489209" y="2255481"/>
-                <a:ext cx="260712" cy="276999"/>
+                <a:ext cx="264111" cy="276999"/>
               </a:xfrm>
               <a:prstGeom prst="rect">
                 <a:avLst/>
@@ -7103,7 +6853,7 @@
                       <m:sSub>
                         <m:sSubPr>
                           <m:ctrlPr>
-                            <a:rPr lang="fr-FR" i="1">
+                            <a:rPr lang="fr-FR" i="1" smtClean="0">
                               <a:latin typeface="Cambria Math" panose="02040503050406030204" pitchFamily="18" charset="0"/>
                             </a:rPr>
                           </m:ctrlPr>
@@ -7119,10 +6869,11 @@
                         </m:e>
                         <m:sub>
                           <m:r>
-                            <a:rPr lang="fr-FR" i="1">
-                              <a:latin typeface="Cambria Math" panose="02040503050406030204" pitchFamily="18" charset="0"/>
-                            </a:rPr>
-                            <m:t>1</m:t>
+                            <a:rPr lang="fr-FR" b="0" i="1" smtClean="0">
+                              <a:latin typeface="Cambria Math" panose="02040503050406030204" pitchFamily="18" charset="0"/>
+                              <a:ea typeface="Cambria Math" panose="02040503050406030204" pitchFamily="18" charset="0"/>
+                            </a:rPr>
+                            <m:t>𝐿</m:t>
                           </m:r>
                         </m:sub>
                       </m:sSub>
@@ -7152,7 +6903,7 @@
             <p:spPr>
               <a:xfrm>
                 <a:off x="11489209" y="2255481"/>
-                <a:ext cx="260712" cy="276999"/>
+                <a:ext cx="264111" cy="276999"/>
               </a:xfrm>
               <a:prstGeom prst="rect">
                 <a:avLst/>
@@ -7160,7 +6911,7 @@
               <a:blipFill>
                 <a:blip r:embed="rId22"/>
                 <a:stretch>
-                  <a:fillRect l="-14286" r="-7143" b="-15556"/>
+                  <a:fillRect l="-13953" r="-4651" b="-15556"/>
                 </a:stretch>
               </a:blipFill>
             </p:spPr>
@@ -7196,7 +6947,7 @@
             <p:spPr>
               <a:xfrm>
                 <a:off x="2511249" y="4333947"/>
-                <a:ext cx="266034" cy="276999"/>
+                <a:ext cx="242246" cy="296428"/>
               </a:xfrm>
               <a:prstGeom prst="rect">
                 <a:avLst/>
@@ -7219,7 +6970,7 @@
                       <m:sSub>
                         <m:sSubPr>
                           <m:ctrlPr>
-                            <a:rPr lang="fr-FR" i="1">
+                            <a:rPr lang="fr-FR" i="1" smtClean="0">
                               <a:latin typeface="Cambria Math" panose="02040503050406030204" pitchFamily="18" charset="0"/>
                             </a:rPr>
                           </m:ctrlPr>
@@ -7235,10 +6986,11 @@
                         </m:e>
                         <m:sub>
                           <m:r>
-                            <a:rPr lang="fr-FR" i="1">
-                              <a:latin typeface="Cambria Math" panose="02040503050406030204" pitchFamily="18" charset="0"/>
-                            </a:rPr>
-                            <m:t>2</m:t>
+                            <a:rPr lang="fr-FR" b="0" i="1" smtClean="0">
+                              <a:latin typeface="Cambria Math" panose="02040503050406030204" pitchFamily="18" charset="0"/>
+                              <a:ea typeface="Cambria Math" panose="02040503050406030204" pitchFamily="18" charset="0"/>
+                            </a:rPr>
+                            <m:t>𝐽</m:t>
                           </m:r>
                         </m:sub>
                       </m:sSub>
@@ -7268,7 +7020,7 @@
             <p:spPr>
               <a:xfrm>
                 <a:off x="2511249" y="4333947"/>
-                <a:ext cx="266034" cy="276999"/>
+                <a:ext cx="242246" cy="296428"/>
               </a:xfrm>
               <a:prstGeom prst="rect">
                 <a:avLst/>
@@ -7276,7 +7028,7 @@
               <a:blipFill>
                 <a:blip r:embed="rId23"/>
                 <a:stretch>
-                  <a:fillRect l="-13636" r="-4545" b="-15556"/>
+                  <a:fillRect l="-15000" r="-12500" b="-24490"/>
                 </a:stretch>
               </a:blipFill>
             </p:spPr>
@@ -7312,7 +7064,7 @@
             <p:spPr>
               <a:xfrm>
                 <a:off x="5488299" y="4333947"/>
-                <a:ext cx="266034" cy="276999"/>
+                <a:ext cx="242246" cy="296428"/>
               </a:xfrm>
               <a:prstGeom prst="rect">
                 <a:avLst/>
@@ -7335,7 +7087,7 @@
                       <m:sSub>
                         <m:sSubPr>
                           <m:ctrlPr>
-                            <a:rPr lang="fr-FR" i="1">
+                            <a:rPr lang="fr-FR" i="1" smtClean="0">
                               <a:latin typeface="Cambria Math" panose="02040503050406030204" pitchFamily="18" charset="0"/>
                             </a:rPr>
                           </m:ctrlPr>
@@ -7351,10 +7103,11 @@
                         </m:e>
                         <m:sub>
                           <m:r>
-                            <a:rPr lang="fr-FR" i="1">
-                              <a:latin typeface="Cambria Math" panose="02040503050406030204" pitchFamily="18" charset="0"/>
-                            </a:rPr>
-                            <m:t>2</m:t>
+                            <a:rPr lang="fr-FR" b="0" i="1" smtClean="0">
+                              <a:latin typeface="Cambria Math" panose="02040503050406030204" pitchFamily="18" charset="0"/>
+                              <a:ea typeface="Cambria Math" panose="02040503050406030204" pitchFamily="18" charset="0"/>
+                            </a:rPr>
+                            <m:t>𝐽</m:t>
                           </m:r>
                         </m:sub>
                       </m:sSub>
@@ -7384,7 +7137,7 @@
             <p:spPr>
               <a:xfrm>
                 <a:off x="5488299" y="4333947"/>
-                <a:ext cx="266034" cy="276999"/>
+                <a:ext cx="242246" cy="296428"/>
               </a:xfrm>
               <a:prstGeom prst="rect">
                 <a:avLst/>
@@ -7392,7 +7145,7 @@
               <a:blipFill>
                 <a:blip r:embed="rId24"/>
                 <a:stretch>
-                  <a:fillRect l="-13636" r="-6818" b="-15556"/>
+                  <a:fillRect l="-15000" r="-12500" b="-24490"/>
                 </a:stretch>
               </a:blipFill>
             </p:spPr>
@@ -7428,7 +7181,7 @@
             <p:spPr>
               <a:xfrm>
                 <a:off x="8534360" y="4349530"/>
-                <a:ext cx="266034" cy="276999"/>
+                <a:ext cx="242246" cy="296428"/>
               </a:xfrm>
               <a:prstGeom prst="rect">
                 <a:avLst/>
@@ -7451,7 +7204,7 @@
                       <m:sSub>
                         <m:sSubPr>
                           <m:ctrlPr>
-                            <a:rPr lang="fr-FR" i="1">
+                            <a:rPr lang="fr-FR" i="1" smtClean="0">
                               <a:latin typeface="Cambria Math" panose="02040503050406030204" pitchFamily="18" charset="0"/>
                             </a:rPr>
                           </m:ctrlPr>
@@ -7467,10 +7220,11 @@
                         </m:e>
                         <m:sub>
                           <m:r>
-                            <a:rPr lang="fr-FR" i="1">
-                              <a:latin typeface="Cambria Math" panose="02040503050406030204" pitchFamily="18" charset="0"/>
-                            </a:rPr>
-                            <m:t>2</m:t>
+                            <a:rPr lang="fr-FR" b="0" i="1" smtClean="0">
+                              <a:latin typeface="Cambria Math" panose="02040503050406030204" pitchFamily="18" charset="0"/>
+                              <a:ea typeface="Cambria Math" panose="02040503050406030204" pitchFamily="18" charset="0"/>
+                            </a:rPr>
+                            <m:t>𝐽</m:t>
                           </m:r>
                         </m:sub>
                       </m:sSub>
@@ -7500,7 +7254,7 @@
             <p:spPr>
               <a:xfrm>
                 <a:off x="8534360" y="4349530"/>
-                <a:ext cx="266034" cy="276999"/>
+                <a:ext cx="242246" cy="296428"/>
               </a:xfrm>
               <a:prstGeom prst="rect">
                 <a:avLst/>
@@ -7508,7 +7262,7 @@
               <a:blipFill>
                 <a:blip r:embed="rId25"/>
                 <a:stretch>
-                  <a:fillRect l="-13636" r="-4545" b="-15556"/>
+                  <a:fillRect l="-15000" r="-12500" b="-27083"/>
                 </a:stretch>
               </a:blipFill>
             </p:spPr>
@@ -7544,7 +7298,7 @@
             <p:spPr>
               <a:xfrm>
                 <a:off x="11515281" y="4333864"/>
-                <a:ext cx="266034" cy="276999"/>
+                <a:ext cx="242246" cy="296428"/>
               </a:xfrm>
               <a:prstGeom prst="rect">
                 <a:avLst/>
@@ -7567,7 +7321,7 @@
                       <m:sSub>
                         <m:sSubPr>
                           <m:ctrlPr>
-                            <a:rPr lang="fr-FR" i="1">
+                            <a:rPr lang="fr-FR" i="1" smtClean="0">
                               <a:latin typeface="Cambria Math" panose="02040503050406030204" pitchFamily="18" charset="0"/>
                             </a:rPr>
                           </m:ctrlPr>
@@ -7583,10 +7337,11 @@
                         </m:e>
                         <m:sub>
                           <m:r>
-                            <a:rPr lang="fr-FR" i="1">
-                              <a:latin typeface="Cambria Math" panose="02040503050406030204" pitchFamily="18" charset="0"/>
-                            </a:rPr>
-                            <m:t>2</m:t>
+                            <a:rPr lang="fr-FR" b="0" i="1" smtClean="0">
+                              <a:latin typeface="Cambria Math" panose="02040503050406030204" pitchFamily="18" charset="0"/>
+                              <a:ea typeface="Cambria Math" panose="02040503050406030204" pitchFamily="18" charset="0"/>
+                            </a:rPr>
+                            <m:t>𝐽</m:t>
                           </m:r>
                         </m:sub>
                       </m:sSub>
@@ -7616,7 +7371,7 @@
             <p:spPr>
               <a:xfrm>
                 <a:off x="11515281" y="4333864"/>
-                <a:ext cx="266034" cy="276999"/>
+                <a:ext cx="242246" cy="296428"/>
               </a:xfrm>
               <a:prstGeom prst="rect">
                 <a:avLst/>
@@ -7624,295 +7379,7 @@
               <a:blipFill>
                 <a:blip r:embed="rId26"/>
                 <a:stretch>
-                  <a:fillRect l="-13636" r="-4545" b="-15556"/>
-                </a:stretch>
-              </a:blipFill>
-            </p:spPr>
-            <p:txBody>
-              <a:bodyPr/>
-              <a:lstStyle/>
-              <a:p>
-                <a:r>
-                  <a:rPr lang="en-US">
-                    <a:noFill/>
-                  </a:rPr>
-                  <a:t> </a:t>
-                </a:r>
-              </a:p>
-            </p:txBody>
-          </p:sp>
-        </mc:Fallback>
-      </mc:AlternateContent>
-      <mc:AlternateContent xmlns:mc="http://schemas.openxmlformats.org/markup-compatibility/2006">
-        <mc:Choice xmlns:a14="http://schemas.microsoft.com/office/drawing/2010/main" Requires="a14">
-          <p:sp>
-            <p:nvSpPr>
-              <p:cNvPr id="121" name="TextBox 120">
-                <a:extLst>
-                  <a:ext uri="{FF2B5EF4-FFF2-40B4-BE49-F238E27FC236}">
-                    <a16:creationId xmlns:a16="http://schemas.microsoft.com/office/drawing/2014/main" id="{AA996222-4C93-85C0-37C6-4644DD592E23}"/>
-                  </a:ext>
-                </a:extLst>
-              </p:cNvPr>
-              <p:cNvSpPr txBox="1"/>
-              <p:nvPr/>
-            </p:nvSpPr>
-            <p:spPr>
-              <a:xfrm>
-                <a:off x="6341999" y="612043"/>
-                <a:ext cx="468013" cy="276999"/>
-              </a:xfrm>
-              <a:prstGeom prst="rect">
-                <a:avLst/>
-              </a:prstGeom>
-              <a:noFill/>
-            </p:spPr>
-            <p:txBody>
-              <a:bodyPr wrap="none" lIns="0" tIns="0" rIns="0" bIns="0" rtlCol="0">
-                <a:spAutoFit/>
-              </a:bodyPr>
-              <a:lstStyle/>
-              <a:p>
-                <a:pPr/>
-                <a14:m>
-                  <m:oMathPara xmlns:m="http://schemas.openxmlformats.org/officeDocument/2006/math">
-                    <m:oMathParaPr>
-                      <m:jc m:val="centerGroup"/>
-                    </m:oMathParaPr>
-                    <m:oMath xmlns:m="http://schemas.openxmlformats.org/officeDocument/2006/math">
-                      <m:r>
-                        <a:rPr lang="fr-FR" i="1">
-                          <a:latin typeface="Cambria Math" panose="02040503050406030204" pitchFamily="18" charset="0"/>
-                        </a:rPr>
-                        <m:t>𝑙𝑜𝑠𝑠</m:t>
-                      </m:r>
-                    </m:oMath>
-                  </m:oMathPara>
-                </a14:m>
-                <a:endParaRPr lang="en-US" dirty="0"/>
-              </a:p>
-            </p:txBody>
-          </p:sp>
-        </mc:Choice>
-        <mc:Fallback>
-          <p:sp>
-            <p:nvSpPr>
-              <p:cNvPr id="121" name="TextBox 120">
-                <a:extLst>
-                  <a:ext uri="{FF2B5EF4-FFF2-40B4-BE49-F238E27FC236}">
-                    <a16:creationId xmlns:a16="http://schemas.microsoft.com/office/drawing/2014/main" id="{AA996222-4C93-85C0-37C6-4644DD592E23}"/>
-                  </a:ext>
-                </a:extLst>
-              </p:cNvPr>
-              <p:cNvSpPr txBox="1">
-                <a:spLocks noRot="1" noChangeAspect="1" noMove="1" noResize="1" noEditPoints="1" noAdjustHandles="1" noChangeArrowheads="1" noChangeShapeType="1" noTextEdit="1"/>
-              </p:cNvSpPr>
-              <p:nvPr/>
-            </p:nvSpPr>
-            <p:spPr>
-              <a:xfrm>
-                <a:off x="6341999" y="612043"/>
-                <a:ext cx="468013" cy="276999"/>
-              </a:xfrm>
-              <a:prstGeom prst="rect">
-                <a:avLst/>
-              </a:prstGeom>
-              <a:blipFill>
-                <a:blip r:embed="rId27"/>
-                <a:stretch>
-                  <a:fillRect l="-11688" r="-11688" b="-6522"/>
-                </a:stretch>
-              </a:blipFill>
-            </p:spPr>
-            <p:txBody>
-              <a:bodyPr/>
-              <a:lstStyle/>
-              <a:p>
-                <a:r>
-                  <a:rPr lang="en-US">
-                    <a:noFill/>
-                  </a:rPr>
-                  <a:t> </a:t>
-                </a:r>
-              </a:p>
-            </p:txBody>
-          </p:sp>
-        </mc:Fallback>
-      </mc:AlternateContent>
-      <mc:AlternateContent xmlns:mc="http://schemas.openxmlformats.org/markup-compatibility/2006">
-        <mc:Choice xmlns:a14="http://schemas.microsoft.com/office/drawing/2010/main" Requires="a14">
-          <p:sp>
-            <p:nvSpPr>
-              <p:cNvPr id="122" name="TextBox 121">
-                <a:extLst>
-                  <a:ext uri="{FF2B5EF4-FFF2-40B4-BE49-F238E27FC236}">
-                    <a16:creationId xmlns:a16="http://schemas.microsoft.com/office/drawing/2014/main" id="{0CAE7732-7924-10AD-3E3C-F9CA02B9ECF2}"/>
-                  </a:ext>
-                </a:extLst>
-              </p:cNvPr>
-              <p:cNvSpPr txBox="1"/>
-              <p:nvPr/>
-            </p:nvSpPr>
-            <p:spPr>
-              <a:xfrm>
-                <a:off x="6341999" y="5725979"/>
-                <a:ext cx="468013" cy="276999"/>
-              </a:xfrm>
-              <a:prstGeom prst="rect">
-                <a:avLst/>
-              </a:prstGeom>
-              <a:noFill/>
-            </p:spPr>
-            <p:txBody>
-              <a:bodyPr wrap="none" lIns="0" tIns="0" rIns="0" bIns="0" rtlCol="0">
-                <a:spAutoFit/>
-              </a:bodyPr>
-              <a:lstStyle/>
-              <a:p>
-                <a:pPr/>
-                <a14:m>
-                  <m:oMathPara xmlns:m="http://schemas.openxmlformats.org/officeDocument/2006/math">
-                    <m:oMathParaPr>
-                      <m:jc m:val="centerGroup"/>
-                    </m:oMathParaPr>
-                    <m:oMath xmlns:m="http://schemas.openxmlformats.org/officeDocument/2006/math">
-                      <m:r>
-                        <a:rPr lang="fr-FR" i="1">
-                          <a:latin typeface="Cambria Math" panose="02040503050406030204" pitchFamily="18" charset="0"/>
-                        </a:rPr>
-                        <m:t>𝑙𝑜𝑠𝑠</m:t>
-                      </m:r>
-                    </m:oMath>
-                  </m:oMathPara>
-                </a14:m>
-                <a:endParaRPr lang="en-US" dirty="0"/>
-              </a:p>
-            </p:txBody>
-          </p:sp>
-        </mc:Choice>
-        <mc:Fallback>
-          <p:sp>
-            <p:nvSpPr>
-              <p:cNvPr id="122" name="TextBox 121">
-                <a:extLst>
-                  <a:ext uri="{FF2B5EF4-FFF2-40B4-BE49-F238E27FC236}">
-                    <a16:creationId xmlns:a16="http://schemas.microsoft.com/office/drawing/2014/main" id="{0CAE7732-7924-10AD-3E3C-F9CA02B9ECF2}"/>
-                  </a:ext>
-                </a:extLst>
-              </p:cNvPr>
-              <p:cNvSpPr txBox="1">
-                <a:spLocks noRot="1" noChangeAspect="1" noMove="1" noResize="1" noEditPoints="1" noAdjustHandles="1" noChangeArrowheads="1" noChangeShapeType="1" noTextEdit="1"/>
-              </p:cNvSpPr>
-              <p:nvPr/>
-            </p:nvSpPr>
-            <p:spPr>
-              <a:xfrm>
-                <a:off x="6341999" y="5725979"/>
-                <a:ext cx="468013" cy="276999"/>
-              </a:xfrm>
-              <a:prstGeom prst="rect">
-                <a:avLst/>
-              </a:prstGeom>
-              <a:blipFill>
-                <a:blip r:embed="rId28"/>
-                <a:stretch>
-                  <a:fillRect l="-11688" r="-11688" b="-6522"/>
-                </a:stretch>
-              </a:blipFill>
-            </p:spPr>
-            <p:txBody>
-              <a:bodyPr/>
-              <a:lstStyle/>
-              <a:p>
-                <a:r>
-                  <a:rPr lang="en-US">
-                    <a:noFill/>
-                  </a:rPr>
-                  <a:t> </a:t>
-                </a:r>
-              </a:p>
-            </p:txBody>
-          </p:sp>
-        </mc:Fallback>
-      </mc:AlternateContent>
-      <mc:AlternateContent xmlns:mc="http://schemas.openxmlformats.org/markup-compatibility/2006">
-        <mc:Choice xmlns:a14="http://schemas.microsoft.com/office/drawing/2010/main" Requires="a14">
-          <p:sp>
-            <p:nvSpPr>
-              <p:cNvPr id="123" name="TextBox 122">
-                <a:extLst>
-                  <a:ext uri="{FF2B5EF4-FFF2-40B4-BE49-F238E27FC236}">
-                    <a16:creationId xmlns:a16="http://schemas.microsoft.com/office/drawing/2014/main" id="{9CAF4CA9-80D1-1561-A755-E1B566911C15}"/>
-                  </a:ext>
-                </a:extLst>
-              </p:cNvPr>
-              <p:cNvSpPr txBox="1"/>
-              <p:nvPr/>
-            </p:nvSpPr>
-            <p:spPr>
-              <a:xfrm>
-                <a:off x="6345836" y="2600459"/>
-                <a:ext cx="468013" cy="276999"/>
-              </a:xfrm>
-              <a:prstGeom prst="rect">
-                <a:avLst/>
-              </a:prstGeom>
-              <a:noFill/>
-            </p:spPr>
-            <p:txBody>
-              <a:bodyPr wrap="none" lIns="0" tIns="0" rIns="0" bIns="0" rtlCol="0">
-                <a:spAutoFit/>
-              </a:bodyPr>
-              <a:lstStyle/>
-              <a:p>
-                <a:pPr/>
-                <a14:m>
-                  <m:oMathPara xmlns:m="http://schemas.openxmlformats.org/officeDocument/2006/math">
-                    <m:oMathParaPr>
-                      <m:jc m:val="centerGroup"/>
-                    </m:oMathParaPr>
-                    <m:oMath xmlns:m="http://schemas.openxmlformats.org/officeDocument/2006/math">
-                      <m:r>
-                        <a:rPr lang="fr-FR" i="1">
-                          <a:latin typeface="Cambria Math" panose="02040503050406030204" pitchFamily="18" charset="0"/>
-                        </a:rPr>
-                        <m:t>𝑙𝑜𝑠𝑠</m:t>
-                      </m:r>
-                    </m:oMath>
-                  </m:oMathPara>
-                </a14:m>
-                <a:endParaRPr lang="en-US" dirty="0"/>
-              </a:p>
-            </p:txBody>
-          </p:sp>
-        </mc:Choice>
-        <mc:Fallback>
-          <p:sp>
-            <p:nvSpPr>
-              <p:cNvPr id="123" name="TextBox 122">
-                <a:extLst>
-                  <a:ext uri="{FF2B5EF4-FFF2-40B4-BE49-F238E27FC236}">
-                    <a16:creationId xmlns:a16="http://schemas.microsoft.com/office/drawing/2014/main" id="{9CAF4CA9-80D1-1561-A755-E1B566911C15}"/>
-                  </a:ext>
-                </a:extLst>
-              </p:cNvPr>
-              <p:cNvSpPr txBox="1">
-                <a:spLocks noRot="1" noChangeAspect="1" noMove="1" noResize="1" noEditPoints="1" noAdjustHandles="1" noChangeArrowheads="1" noChangeShapeType="1" noTextEdit="1"/>
-              </p:cNvSpPr>
-              <p:nvPr/>
-            </p:nvSpPr>
-            <p:spPr>
-              <a:xfrm>
-                <a:off x="6345836" y="2600459"/>
-                <a:ext cx="468013" cy="276999"/>
-              </a:xfrm>
-              <a:prstGeom prst="rect">
-                <a:avLst/>
-              </a:prstGeom>
-              <a:blipFill>
-                <a:blip r:embed="rId29"/>
-                <a:stretch>
-                  <a:fillRect l="-11688" r="-11688" b="-8889"/>
+                  <a:fillRect l="-15000" r="-12500" b="-24490"/>
                 </a:stretch>
               </a:blipFill>
             </p:spPr>
@@ -8162,7 +7629,7 @@
             <p:spPr>
               <a:xfrm>
                 <a:off x="12599512" y="1188622"/>
-                <a:ext cx="348878" cy="276999"/>
+                <a:ext cx="352276" cy="276999"/>
               </a:xfrm>
               <a:prstGeom prst="rect">
                 <a:avLst/>
@@ -8185,7 +7652,7 @@
                       <m:sSub>
                         <m:sSubPr>
                           <m:ctrlPr>
-                            <a:rPr lang="fr-FR" i="1">
+                            <a:rPr lang="fr-FR" i="1" smtClean="0">
                               <a:latin typeface="Cambria Math" panose="02040503050406030204" pitchFamily="18" charset="0"/>
                             </a:rPr>
                           </m:ctrlPr>
@@ -8200,10 +7667,10 @@
                         </m:e>
                         <m:sub>
                           <m:r>
-                            <a:rPr lang="fr-FR" i="1">
-                              <a:latin typeface="Cambria Math" panose="02040503050406030204" pitchFamily="18" charset="0"/>
-                            </a:rPr>
-                            <m:t>1</m:t>
+                            <a:rPr lang="fr-FR" b="0" i="1" smtClean="0">
+                              <a:latin typeface="Cambria Math" panose="02040503050406030204" pitchFamily="18" charset="0"/>
+                            </a:rPr>
+                            <m:t>𝐿</m:t>
                           </m:r>
                         </m:sub>
                       </m:sSub>
@@ -8233,15 +7700,15 @@
             <p:spPr>
               <a:xfrm>
                 <a:off x="12599512" y="1188622"/>
-                <a:ext cx="348878" cy="276999"/>
+                <a:ext cx="352276" cy="276999"/>
               </a:xfrm>
               <a:prstGeom prst="rect">
                 <a:avLst/>
               </a:prstGeom>
               <a:blipFill>
-                <a:blip r:embed="rId30"/>
+                <a:blip r:embed="rId27"/>
                 <a:stretch>
-                  <a:fillRect l="-10526" r="-5263" b="-15556"/>
+                  <a:fillRect l="-10345" r="-3448" b="-15556"/>
                 </a:stretch>
               </a:blipFill>
             </p:spPr>
@@ -8277,7 +7744,7 @@
             <p:spPr>
               <a:xfrm>
                 <a:off x="12599512" y="3172309"/>
-                <a:ext cx="354200" cy="276999"/>
+                <a:ext cx="330410" cy="296428"/>
               </a:xfrm>
               <a:prstGeom prst="rect">
                 <a:avLst/>
@@ -8300,7 +7767,7 @@
                       <m:sSub>
                         <m:sSubPr>
                           <m:ctrlPr>
-                            <a:rPr lang="fr-FR" i="1">
+                            <a:rPr lang="fr-FR" i="1" smtClean="0">
                               <a:latin typeface="Cambria Math" panose="02040503050406030204" pitchFamily="18" charset="0"/>
                             </a:rPr>
                           </m:ctrlPr>
@@ -8315,10 +7782,10 @@
                         </m:e>
                         <m:sub>
                           <m:r>
-                            <a:rPr lang="fr-FR" i="1">
-                              <a:latin typeface="Cambria Math" panose="02040503050406030204" pitchFamily="18" charset="0"/>
-                            </a:rPr>
-                            <m:t>2</m:t>
+                            <a:rPr lang="fr-FR" b="0" i="1" smtClean="0">
+                              <a:latin typeface="Cambria Math" panose="02040503050406030204" pitchFamily="18" charset="0"/>
+                            </a:rPr>
+                            <m:t>𝐽</m:t>
                           </m:r>
                         </m:sub>
                       </m:sSub>
@@ -8348,15 +7815,15 @@
             <p:spPr>
               <a:xfrm>
                 <a:off x="12599512" y="3172309"/>
-                <a:ext cx="354200" cy="276999"/>
+                <a:ext cx="330410" cy="296428"/>
               </a:xfrm>
               <a:prstGeom prst="rect">
                 <a:avLst/>
               </a:prstGeom>
               <a:blipFill>
-                <a:blip r:embed="rId31"/>
+                <a:blip r:embed="rId28"/>
                 <a:stretch>
-                  <a:fillRect l="-8621" r="-6897" b="-15217"/>
+                  <a:fillRect l="-9259" r="-11111" b="-24490"/>
                 </a:stretch>
               </a:blipFill>
             </p:spPr>
@@ -8392,7 +7859,7 @@
             <p:spPr>
               <a:xfrm>
                 <a:off x="12594190" y="5156795"/>
-                <a:ext cx="354200" cy="276999"/>
+                <a:ext cx="358816" cy="276999"/>
               </a:xfrm>
               <a:prstGeom prst="rect">
                 <a:avLst/>
@@ -8415,7 +7882,7 @@
                       <m:sSub>
                         <m:sSubPr>
                           <m:ctrlPr>
-                            <a:rPr lang="fr-FR" i="1">
+                            <a:rPr lang="fr-FR" i="1" smtClean="0">
                               <a:latin typeface="Cambria Math" panose="02040503050406030204" pitchFamily="18" charset="0"/>
                             </a:rPr>
                           </m:ctrlPr>
@@ -8430,10 +7897,10 @@
                         </m:e>
                         <m:sub>
                           <m:r>
-                            <a:rPr lang="fr-FR" i="1">
-                              <a:latin typeface="Cambria Math" panose="02040503050406030204" pitchFamily="18" charset="0"/>
-                            </a:rPr>
-                            <m:t>3</m:t>
+                            <a:rPr lang="fr-FR" b="0" i="1" smtClean="0">
+                              <a:latin typeface="Cambria Math" panose="02040503050406030204" pitchFamily="18" charset="0"/>
+                            </a:rPr>
+                            <m:t>𝐴</m:t>
                           </m:r>
                         </m:sub>
                       </m:sSub>
@@ -8463,15 +7930,15 @@
             <p:spPr>
               <a:xfrm>
                 <a:off x="12594190" y="5156795"/>
-                <a:ext cx="354200" cy="276999"/>
+                <a:ext cx="358816" cy="276999"/>
               </a:xfrm>
               <a:prstGeom prst="rect">
                 <a:avLst/>
               </a:prstGeom>
               <a:blipFill>
-                <a:blip r:embed="rId32"/>
+                <a:blip r:embed="rId29"/>
                 <a:stretch>
-                  <a:fillRect l="-8621" r="-6897" b="-15556"/>
+                  <a:fillRect l="-8475" r="-5085" b="-15556"/>
                 </a:stretch>
               </a:blipFill>
             </p:spPr>
@@ -8614,8 +8081,8 @@
           </a:fontRef>
         </p:style>
       </p:cxnSp>
-      <mc:AlternateContent xmlns:mc="http://schemas.openxmlformats.org/markup-compatibility/2006">
-        <mc:Choice xmlns:a14="http://schemas.microsoft.com/office/drawing/2010/main" Requires="a14">
+      <mc:AlternateContent xmlns:mc="http://schemas.openxmlformats.org/markup-compatibility/2006" xmlns:a14="http://schemas.microsoft.com/office/drawing/2010/main">
+        <mc:Choice Requires="a14">
           <p:sp>
             <p:nvSpPr>
               <p:cNvPr id="59" name="TextBox 58">
@@ -8666,7 +8133,7 @@
             </p:txBody>
           </p:sp>
         </mc:Choice>
-        <mc:Fallback>
+        <mc:Fallback xmlns="">
           <p:sp>
             <p:nvSpPr>
               <p:cNvPr id="59" name="TextBox 58">
@@ -8856,8 +8323,8 @@
             </p:nvSpPr>
             <p:spPr>
               <a:xfrm rot="16200000">
-                <a:off x="-1393703" y="3361576"/>
-                <a:ext cx="4210896" cy="459421"/>
+                <a:off x="-1314547" y="3361576"/>
+                <a:ext cx="4052583" cy="459421"/>
               </a:xfrm>
               <a:prstGeom prst="rect">
                 <a:avLst/>
@@ -8881,7 +8348,7 @@
                         <m:rPr>
                           <m:sty m:val="p"/>
                         </m:rPr>
-                        <a:rPr lang="fr-FR" sz="1600">
+                        <a:rPr lang="fr-FR" sz="1600" smtClean="0">
                           <a:latin typeface="Cambria Math" panose="02040503050406030204" pitchFamily="18" charset="0"/>
                         </a:rPr>
                         <m:t>max</m:t>
@@ -8950,18 +8417,11 @@
                         </m:e>
                         <m:sub>
                           <m:r>
-                            <a:rPr lang="fr-FR" sz="1600" i="1">
+                            <a:rPr lang="fr-FR" sz="1600" b="0" i="1" smtClean="0">
                               <a:latin typeface="Cambria Math" panose="02040503050406030204" pitchFamily="18" charset="0"/>
                               <a:ea typeface="Cambria Math" panose="02040503050406030204" pitchFamily="18" charset="0"/>
                             </a:rPr>
-                            <m:t>𝐴</m:t>
-                          </m:r>
-                          <m:r>
-                            <a:rPr lang="fr-FR" sz="1600" i="1">
-                              <a:latin typeface="Cambria Math" panose="02040503050406030204" pitchFamily="18" charset="0"/>
-                              <a:ea typeface="Cambria Math" panose="02040503050406030204" pitchFamily="18" charset="0"/>
-                            </a:rPr>
-                            <m:t>1</m:t>
+                            <m:t>𝐽</m:t>
                           </m:r>
                         </m:sub>
                       </m:sSub>
@@ -8992,11 +8452,11 @@
                         </m:e>
                         <m:sub>
                           <m:r>
-                            <a:rPr lang="fr-FR" sz="1600" i="1">
+                            <a:rPr lang="fr-FR" sz="1600" b="0" i="1" smtClean="0">
                               <a:latin typeface="Cambria Math" panose="02040503050406030204" pitchFamily="18" charset="0"/>
                               <a:ea typeface="Cambria Math" panose="02040503050406030204" pitchFamily="18" charset="0"/>
                             </a:rPr>
-                            <m:t>2</m:t>
+                            <m:t>𝐽</m:t>
                           </m:r>
                         </m:sub>
                       </m:sSub>
@@ -9034,18 +8494,11 @@
                         </m:e>
                         <m:sub>
                           <m:r>
-                            <a:rPr lang="fr-FR" sz="1600" i="1">
+                            <a:rPr lang="fr-FR" sz="1600" b="0" i="1" smtClean="0">
                               <a:latin typeface="Cambria Math" panose="02040503050406030204" pitchFamily="18" charset="0"/>
                               <a:ea typeface="Cambria Math" panose="02040503050406030204" pitchFamily="18" charset="0"/>
                             </a:rPr>
                             <m:t>𝐴</m:t>
-                          </m:r>
-                          <m:r>
-                            <a:rPr lang="fr-FR" sz="1600" i="1">
-                              <a:latin typeface="Cambria Math" panose="02040503050406030204" pitchFamily="18" charset="0"/>
-                              <a:ea typeface="Cambria Math" panose="02040503050406030204" pitchFamily="18" charset="0"/>
-                            </a:rPr>
-                            <m:t>2</m:t>
                           </m:r>
                         </m:sub>
                       </m:sSub>
@@ -9076,11 +8529,11 @@
                         </m:e>
                         <m:sub>
                           <m:r>
-                            <a:rPr lang="fr-FR" sz="1600" i="1">
+                            <a:rPr lang="fr-FR" sz="1600" b="0" i="1" smtClean="0">
                               <a:latin typeface="Cambria Math" panose="02040503050406030204" pitchFamily="18" charset="0"/>
                               <a:ea typeface="Cambria Math" panose="02040503050406030204" pitchFamily="18" charset="0"/>
                             </a:rPr>
-                            <m:t>3</m:t>
+                            <m:t>𝐴</m:t>
                           </m:r>
                         </m:sub>
                       </m:sSub>
@@ -9151,8 +8604,8 @@
             </p:nvSpPr>
             <p:spPr>
               <a:xfrm rot="16200000">
-                <a:off x="-1393703" y="3361576"/>
-                <a:ext cx="4210896" cy="459421"/>
+                <a:off x="-1314547" y="3361576"/>
+                <a:ext cx="4052583" cy="459421"/>
               </a:xfrm>
               <a:prstGeom prst="rect">
                 <a:avLst/>
@@ -9179,8 +8632,8 @@
           </p:sp>
         </mc:Fallback>
       </mc:AlternateContent>
-      <mc:AlternateContent xmlns:mc="http://schemas.openxmlformats.org/markup-compatibility/2006">
-        <mc:Choice xmlns:a14="http://schemas.microsoft.com/office/drawing/2010/main" Requires="a14">
+      <mc:AlternateContent xmlns:mc="http://schemas.openxmlformats.org/markup-compatibility/2006" xmlns:a14="http://schemas.microsoft.com/office/drawing/2010/main">
+        <mc:Choice Requires="a14">
           <p:sp>
             <p:nvSpPr>
               <p:cNvPr id="2" name="TextBox 1">
@@ -9231,7 +8684,7 @@
             </p:txBody>
           </p:sp>
         </mc:Choice>
-        <mc:Fallback>
+        <mc:Fallback xmlns="">
           <p:sp>
             <p:nvSpPr>
               <p:cNvPr id="2" name="TextBox 1">
@@ -9276,8 +8729,8 @@
           </p:sp>
         </mc:Fallback>
       </mc:AlternateContent>
-      <mc:AlternateContent xmlns:mc="http://schemas.openxmlformats.org/markup-compatibility/2006">
-        <mc:Choice xmlns:a14="http://schemas.microsoft.com/office/drawing/2010/main" Requires="a14">
+      <mc:AlternateContent xmlns:mc="http://schemas.openxmlformats.org/markup-compatibility/2006" xmlns:a14="http://schemas.microsoft.com/office/drawing/2010/main">
+        <mc:Choice Requires="a14">
           <p:sp>
             <p:nvSpPr>
               <p:cNvPr id="8" name="TextBox 7">
@@ -9328,7 +8781,7 @@
             </p:txBody>
           </p:sp>
         </mc:Choice>
-        <mc:Fallback>
+        <mc:Fallback xmlns="">
           <p:sp>
             <p:nvSpPr>
               <p:cNvPr id="8" name="TextBox 7">
@@ -9373,8 +8826,8 @@
           </p:sp>
         </mc:Fallback>
       </mc:AlternateContent>
-      <mc:AlternateContent xmlns:mc="http://schemas.openxmlformats.org/markup-compatibility/2006">
-        <mc:Choice xmlns:a14="http://schemas.microsoft.com/office/drawing/2010/main" Requires="a14">
+      <mc:AlternateContent xmlns:mc="http://schemas.openxmlformats.org/markup-compatibility/2006" xmlns:a14="http://schemas.microsoft.com/office/drawing/2010/main">
+        <mc:Choice Requires="a14">
           <p:sp>
             <p:nvSpPr>
               <p:cNvPr id="26" name="TextBox 25">
@@ -9425,7 +8878,7 @@
             </p:txBody>
           </p:sp>
         </mc:Choice>
-        <mc:Fallback>
+        <mc:Fallback xmlns="">
           <p:sp>
             <p:nvSpPr>
               <p:cNvPr id="26" name="TextBox 25">
@@ -9470,8 +8923,8 @@
           </p:sp>
         </mc:Fallback>
       </mc:AlternateContent>
-      <mc:AlternateContent xmlns:mc="http://schemas.openxmlformats.org/markup-compatibility/2006">
-        <mc:Choice xmlns:a14="http://schemas.microsoft.com/office/drawing/2010/main" Requires="a14">
+      <mc:AlternateContent xmlns:mc="http://schemas.openxmlformats.org/markup-compatibility/2006" xmlns:a14="http://schemas.microsoft.com/office/drawing/2010/main">
+        <mc:Choice Requires="a14">
           <p:sp>
             <p:nvSpPr>
               <p:cNvPr id="27" name="TextBox 26">
@@ -9522,7 +8975,7 @@
             </p:txBody>
           </p:sp>
         </mc:Choice>
-        <mc:Fallback>
+        <mc:Fallback xmlns="">
           <p:sp>
             <p:nvSpPr>
               <p:cNvPr id="27" name="TextBox 26">
@@ -9801,7 +9254,7 @@
         </p:nvSpPr>
         <p:spPr>
           <a:xfrm>
-            <a:off x="6987195" y="7509098"/>
+            <a:off x="6987195" y="7204298"/>
             <a:ext cx="655783" cy="655783"/>
           </a:xfrm>
           <a:prstGeom prst="ellipse">
@@ -9852,7 +9305,7 @@
             </p:nvSpPr>
             <p:spPr>
               <a:xfrm>
-                <a:off x="7029768" y="7606156"/>
+                <a:off x="7029768" y="7301356"/>
                 <a:ext cx="535419" cy="461665"/>
               </a:xfrm>
               <a:prstGeom prst="rect">
@@ -9911,7 +9364,7 @@
             </p:nvSpPr>
             <p:spPr>
               <a:xfrm>
-                <a:off x="7029768" y="7606156"/>
+                <a:off x="7029768" y="7301356"/>
                 <a:ext cx="535419" cy="461665"/>
               </a:xfrm>
               <a:prstGeom prst="rect">
@@ -9956,12 +9409,12 @@
         </p:nvCxnSpPr>
         <p:spPr>
           <a:xfrm rot="5400000">
-            <a:off x="5051666" y="3986354"/>
-            <a:ext cx="5786166" cy="1259323"/>
+            <a:off x="5204066" y="3833954"/>
+            <a:ext cx="5481366" cy="1259323"/>
           </a:xfrm>
           <a:prstGeom prst="bentConnector3">
             <a:avLst>
-              <a:gd name="adj1" fmla="val 51"/>
+              <a:gd name="adj1" fmla="val 47"/>
             </a:avLst>
           </a:prstGeom>
           <a:ln w="19050" cap="flat" cmpd="sng" algn="ctr">
@@ -10093,7 +9546,7 @@
         </p:nvCxnSpPr>
         <p:spPr>
           <a:xfrm flipH="1">
-            <a:off x="2099471" y="7653872"/>
+            <a:off x="2099471" y="7349072"/>
             <a:ext cx="4953447" cy="0"/>
           </a:xfrm>
           <a:prstGeom prst="line">
@@ -10138,7 +9591,7 @@
         <p:spPr>
           <a:xfrm flipH="1" flipV="1">
             <a:off x="2087285" y="1730840"/>
-            <a:ext cx="12186" cy="5923032"/>
+            <a:ext cx="11559" cy="5618232"/>
           </a:xfrm>
           <a:prstGeom prst="line">
             <a:avLst/>
@@ -10303,50 +9756,6 @@
       </p:cxnSp>
       <p:cxnSp>
         <p:nvCxnSpPr>
-          <p:cNvPr id="129" name="Straight Arrow Connector 128">
-            <a:extLst>
-              <a:ext uri="{FF2B5EF4-FFF2-40B4-BE49-F238E27FC236}">
-                <a16:creationId xmlns:a16="http://schemas.microsoft.com/office/drawing/2014/main" id="{C26F0852-DAC1-5AE6-82EA-1BDA69DC4F43}"/>
-              </a:ext>
-            </a:extLst>
-          </p:cNvPr>
-          <p:cNvCxnSpPr>
-            <a:cxnSpLocks/>
-          </p:cNvCxnSpPr>
-          <p:nvPr/>
-        </p:nvCxnSpPr>
-        <p:spPr>
-          <a:xfrm>
-            <a:off x="7646862" y="7836988"/>
-            <a:ext cx="1908740" cy="0"/>
-          </a:xfrm>
-          <a:prstGeom prst="straightConnector1">
-            <a:avLst/>
-          </a:prstGeom>
-          <a:ln w="19050">
-            <a:solidFill>
-              <a:srgbClr val="C00000"/>
-            </a:solidFill>
-            <a:tailEnd type="triangle"/>
-          </a:ln>
-        </p:spPr>
-        <p:style>
-          <a:lnRef idx="1">
-            <a:schemeClr val="dk1"/>
-          </a:lnRef>
-          <a:fillRef idx="0">
-            <a:schemeClr val="dk1"/>
-          </a:fillRef>
-          <a:effectRef idx="0">
-            <a:schemeClr val="dk1"/>
-          </a:effectRef>
-          <a:fontRef idx="minor">
-            <a:schemeClr val="tx1"/>
-          </a:fontRef>
-        </p:style>
-      </p:cxnSp>
-      <p:cxnSp>
-        <p:nvCxnSpPr>
           <p:cNvPr id="130" name="Straight Arrow Connector 129">
             <a:extLst>
               <a:ext uri="{FF2B5EF4-FFF2-40B4-BE49-F238E27FC236}">
@@ -10361,8 +9770,8 @@
         </p:nvCxnSpPr>
         <p:spPr>
           <a:xfrm>
-            <a:off x="5073914" y="7836988"/>
-            <a:ext cx="1908740" cy="0"/>
+            <a:off x="4028440" y="7532188"/>
+            <a:ext cx="2954214" cy="0"/>
           </a:xfrm>
           <a:prstGeom prst="straightConnector1">
             <a:avLst/>
@@ -10389,6 +9798,1287 @@
           </a:fontRef>
         </p:style>
       </p:cxnSp>
+      <mc:AlternateContent xmlns:mc="http://schemas.openxmlformats.org/markup-compatibility/2006">
+        <mc:Choice xmlns:a14="http://schemas.microsoft.com/office/drawing/2010/main" Requires="a14">
+          <p:sp>
+            <p:nvSpPr>
+              <p:cNvPr id="36" name="TextBox 35">
+                <a:extLst>
+                  <a:ext uri="{FF2B5EF4-FFF2-40B4-BE49-F238E27FC236}">
+                    <a16:creationId xmlns:a16="http://schemas.microsoft.com/office/drawing/2014/main" id="{E66DB42B-1444-FF81-AC14-5FF2411F997D}"/>
+                  </a:ext>
+                </a:extLst>
+              </p:cNvPr>
+              <p:cNvSpPr txBox="1"/>
+              <p:nvPr/>
+            </p:nvSpPr>
+            <p:spPr>
+              <a:xfrm>
+                <a:off x="6479725" y="626172"/>
+                <a:ext cx="177100" cy="276999"/>
+              </a:xfrm>
+              <a:prstGeom prst="rect">
+                <a:avLst/>
+              </a:prstGeom>
+              <a:noFill/>
+            </p:spPr>
+            <p:txBody>
+              <a:bodyPr wrap="none" lIns="0" tIns="0" rIns="0" bIns="0" rtlCol="0">
+                <a:spAutoFit/>
+              </a:bodyPr>
+              <a:lstStyle/>
+              <a:p>
+                <a:pPr/>
+                <a14:m>
+                  <m:oMathPara xmlns:m="http://schemas.openxmlformats.org/officeDocument/2006/math">
+                    <m:oMathParaPr>
+                      <m:jc m:val="centerGroup"/>
+                    </m:oMathParaPr>
+                    <m:oMath xmlns:m="http://schemas.openxmlformats.org/officeDocument/2006/math">
+                      <m:r>
+                        <a:rPr lang="fr-FR" i="1" smtClean="0">
+                          <a:latin typeface="Cambria Math" panose="02040503050406030204" pitchFamily="18" charset="0"/>
+                          <a:ea typeface="Cambria Math" panose="02040503050406030204" pitchFamily="18" charset="0"/>
+                        </a:rPr>
+                        <m:t>𝜆</m:t>
+                      </m:r>
+                    </m:oMath>
+                  </m:oMathPara>
+                </a14:m>
+                <a:endParaRPr lang="en-US" dirty="0"/>
+              </a:p>
+            </p:txBody>
+          </p:sp>
+        </mc:Choice>
+        <mc:Fallback>
+          <p:sp>
+            <p:nvSpPr>
+              <p:cNvPr id="36" name="TextBox 35">
+                <a:extLst>
+                  <a:ext uri="{FF2B5EF4-FFF2-40B4-BE49-F238E27FC236}">
+                    <a16:creationId xmlns:a16="http://schemas.microsoft.com/office/drawing/2014/main" id="{E66DB42B-1444-FF81-AC14-5FF2411F997D}"/>
+                  </a:ext>
+                </a:extLst>
+              </p:cNvPr>
+              <p:cNvSpPr txBox="1">
+                <a:spLocks noRot="1" noChangeAspect="1" noMove="1" noResize="1" noEditPoints="1" noAdjustHandles="1" noChangeArrowheads="1" noChangeShapeType="1" noTextEdit="1"/>
+              </p:cNvSpPr>
+              <p:nvPr/>
+            </p:nvSpPr>
+            <p:spPr>
+              <a:xfrm>
+                <a:off x="6479725" y="626172"/>
+                <a:ext cx="177100" cy="276999"/>
+              </a:xfrm>
+              <a:prstGeom prst="rect">
+                <a:avLst/>
+              </a:prstGeom>
+              <a:blipFill>
+                <a:blip r:embed="rId40"/>
+                <a:stretch>
+                  <a:fillRect l="-34483" r="-31034" b="-8889"/>
+                </a:stretch>
+              </a:blipFill>
+            </p:spPr>
+            <p:txBody>
+              <a:bodyPr/>
+              <a:lstStyle/>
+              <a:p>
+                <a:r>
+                  <a:rPr lang="en-US">
+                    <a:noFill/>
+                  </a:rPr>
+                  <a:t> </a:t>
+                </a:r>
+              </a:p>
+            </p:txBody>
+          </p:sp>
+        </mc:Fallback>
+      </mc:AlternateContent>
+      <mc:AlternateContent xmlns:mc="http://schemas.openxmlformats.org/markup-compatibility/2006">
+        <mc:Choice xmlns:a14="http://schemas.microsoft.com/office/drawing/2010/main" Requires="a14">
+          <p:sp>
+            <p:nvSpPr>
+              <p:cNvPr id="38" name="TextBox 37">
+                <a:extLst>
+                  <a:ext uri="{FF2B5EF4-FFF2-40B4-BE49-F238E27FC236}">
+                    <a16:creationId xmlns:a16="http://schemas.microsoft.com/office/drawing/2014/main" id="{8AB0686A-017E-2DBE-BCF5-A9ACD35714E2}"/>
+                  </a:ext>
+                </a:extLst>
+              </p:cNvPr>
+              <p:cNvSpPr txBox="1"/>
+              <p:nvPr/>
+            </p:nvSpPr>
+            <p:spPr>
+              <a:xfrm>
+                <a:off x="6472215" y="2641138"/>
+                <a:ext cx="177100" cy="276999"/>
+              </a:xfrm>
+              <a:prstGeom prst="rect">
+                <a:avLst/>
+              </a:prstGeom>
+              <a:noFill/>
+            </p:spPr>
+            <p:txBody>
+              <a:bodyPr wrap="none" lIns="0" tIns="0" rIns="0" bIns="0" rtlCol="0">
+                <a:spAutoFit/>
+              </a:bodyPr>
+              <a:lstStyle/>
+              <a:p>
+                <a:pPr/>
+                <a14:m>
+                  <m:oMathPara xmlns:m="http://schemas.openxmlformats.org/officeDocument/2006/math">
+                    <m:oMathParaPr>
+                      <m:jc m:val="centerGroup"/>
+                    </m:oMathParaPr>
+                    <m:oMath xmlns:m="http://schemas.openxmlformats.org/officeDocument/2006/math">
+                      <m:r>
+                        <a:rPr lang="fr-FR" i="1" smtClean="0">
+                          <a:latin typeface="Cambria Math" panose="02040503050406030204" pitchFamily="18" charset="0"/>
+                          <a:ea typeface="Cambria Math" panose="02040503050406030204" pitchFamily="18" charset="0"/>
+                        </a:rPr>
+                        <m:t>𝜆</m:t>
+                      </m:r>
+                    </m:oMath>
+                  </m:oMathPara>
+                </a14:m>
+                <a:endParaRPr lang="en-US" dirty="0"/>
+              </a:p>
+            </p:txBody>
+          </p:sp>
+        </mc:Choice>
+        <mc:Fallback>
+          <p:sp>
+            <p:nvSpPr>
+              <p:cNvPr id="38" name="TextBox 37">
+                <a:extLst>
+                  <a:ext uri="{FF2B5EF4-FFF2-40B4-BE49-F238E27FC236}">
+                    <a16:creationId xmlns:a16="http://schemas.microsoft.com/office/drawing/2014/main" id="{8AB0686A-017E-2DBE-BCF5-A9ACD35714E2}"/>
+                  </a:ext>
+                </a:extLst>
+              </p:cNvPr>
+              <p:cNvSpPr txBox="1">
+                <a:spLocks noRot="1" noChangeAspect="1" noMove="1" noResize="1" noEditPoints="1" noAdjustHandles="1" noChangeArrowheads="1" noChangeShapeType="1" noTextEdit="1"/>
+              </p:cNvSpPr>
+              <p:nvPr/>
+            </p:nvSpPr>
+            <p:spPr>
+              <a:xfrm>
+                <a:off x="6472215" y="2641138"/>
+                <a:ext cx="177100" cy="276999"/>
+              </a:xfrm>
+              <a:prstGeom prst="rect">
+                <a:avLst/>
+              </a:prstGeom>
+              <a:blipFill>
+                <a:blip r:embed="rId41"/>
+                <a:stretch>
+                  <a:fillRect l="-34483" r="-31034" b="-6522"/>
+                </a:stretch>
+              </a:blipFill>
+            </p:spPr>
+            <p:txBody>
+              <a:bodyPr/>
+              <a:lstStyle/>
+              <a:p>
+                <a:r>
+                  <a:rPr lang="en-US">
+                    <a:noFill/>
+                  </a:rPr>
+                  <a:t> </a:t>
+                </a:r>
+              </a:p>
+            </p:txBody>
+          </p:sp>
+        </mc:Fallback>
+      </mc:AlternateContent>
+      <mc:AlternateContent xmlns:mc="http://schemas.openxmlformats.org/markup-compatibility/2006">
+        <mc:Choice xmlns:a14="http://schemas.microsoft.com/office/drawing/2010/main" Requires="a14">
+          <p:sp>
+            <p:nvSpPr>
+              <p:cNvPr id="47" name="TextBox 46">
+                <a:extLst>
+                  <a:ext uri="{FF2B5EF4-FFF2-40B4-BE49-F238E27FC236}">
+                    <a16:creationId xmlns:a16="http://schemas.microsoft.com/office/drawing/2014/main" id="{0CBCEEE4-555F-52E1-CDD3-B3CB432035B6}"/>
+                  </a:ext>
+                </a:extLst>
+              </p:cNvPr>
+              <p:cNvSpPr txBox="1"/>
+              <p:nvPr/>
+            </p:nvSpPr>
+            <p:spPr>
+              <a:xfrm>
+                <a:off x="6475599" y="5753042"/>
+                <a:ext cx="177100" cy="276999"/>
+              </a:xfrm>
+              <a:prstGeom prst="rect">
+                <a:avLst/>
+              </a:prstGeom>
+              <a:noFill/>
+            </p:spPr>
+            <p:txBody>
+              <a:bodyPr wrap="none" lIns="0" tIns="0" rIns="0" bIns="0" rtlCol="0">
+                <a:spAutoFit/>
+              </a:bodyPr>
+              <a:lstStyle/>
+              <a:p>
+                <a:pPr/>
+                <a14:m>
+                  <m:oMathPara xmlns:m="http://schemas.openxmlformats.org/officeDocument/2006/math">
+                    <m:oMathParaPr>
+                      <m:jc m:val="centerGroup"/>
+                    </m:oMathParaPr>
+                    <m:oMath xmlns:m="http://schemas.openxmlformats.org/officeDocument/2006/math">
+                      <m:r>
+                        <a:rPr lang="fr-FR" i="1" smtClean="0">
+                          <a:latin typeface="Cambria Math" panose="02040503050406030204" pitchFamily="18" charset="0"/>
+                          <a:ea typeface="Cambria Math" panose="02040503050406030204" pitchFamily="18" charset="0"/>
+                        </a:rPr>
+                        <m:t>𝜆</m:t>
+                      </m:r>
+                    </m:oMath>
+                  </m:oMathPara>
+                </a14:m>
+                <a:endParaRPr lang="en-US" dirty="0"/>
+              </a:p>
+            </p:txBody>
+          </p:sp>
+        </mc:Choice>
+        <mc:Fallback>
+          <p:sp>
+            <p:nvSpPr>
+              <p:cNvPr id="47" name="TextBox 46">
+                <a:extLst>
+                  <a:ext uri="{FF2B5EF4-FFF2-40B4-BE49-F238E27FC236}">
+                    <a16:creationId xmlns:a16="http://schemas.microsoft.com/office/drawing/2014/main" id="{0CBCEEE4-555F-52E1-CDD3-B3CB432035B6}"/>
+                  </a:ext>
+                </a:extLst>
+              </p:cNvPr>
+              <p:cNvSpPr txBox="1">
+                <a:spLocks noRot="1" noChangeAspect="1" noMove="1" noResize="1" noEditPoints="1" noAdjustHandles="1" noChangeArrowheads="1" noChangeShapeType="1" noTextEdit="1"/>
+              </p:cNvSpPr>
+              <p:nvPr/>
+            </p:nvSpPr>
+            <p:spPr>
+              <a:xfrm>
+                <a:off x="6475599" y="5753042"/>
+                <a:ext cx="177100" cy="276999"/>
+              </a:xfrm>
+              <a:prstGeom prst="rect">
+                <a:avLst/>
+              </a:prstGeom>
+              <a:blipFill>
+                <a:blip r:embed="rId42"/>
+                <a:stretch>
+                  <a:fillRect l="-34483" r="-31034" b="-8889"/>
+                </a:stretch>
+              </a:blipFill>
+            </p:spPr>
+            <p:txBody>
+              <a:bodyPr/>
+              <a:lstStyle/>
+              <a:p>
+                <a:r>
+                  <a:rPr lang="en-US">
+                    <a:noFill/>
+                  </a:rPr>
+                  <a:t> </a:t>
+                </a:r>
+              </a:p>
+            </p:txBody>
+          </p:sp>
+        </mc:Fallback>
+      </mc:AlternateContent>
+      <mc:AlternateContent xmlns:mc="http://schemas.openxmlformats.org/markup-compatibility/2006">
+        <mc:Choice xmlns:a14="http://schemas.microsoft.com/office/drawing/2010/main" Requires="a14">
+          <p:sp>
+            <p:nvSpPr>
+              <p:cNvPr id="55" name="TextBox 54">
+                <a:extLst>
+                  <a:ext uri="{FF2B5EF4-FFF2-40B4-BE49-F238E27FC236}">
+                    <a16:creationId xmlns:a16="http://schemas.microsoft.com/office/drawing/2014/main" id="{BFE385B8-CDAC-7A23-0A1A-2C8A6A715860}"/>
+                  </a:ext>
+                </a:extLst>
+              </p:cNvPr>
+              <p:cNvSpPr txBox="1"/>
+              <p:nvPr/>
+            </p:nvSpPr>
+            <p:spPr>
+              <a:xfrm>
+                <a:off x="8930933" y="7632805"/>
+                <a:ext cx="517642" cy="276999"/>
+              </a:xfrm>
+              <a:prstGeom prst="rect">
+                <a:avLst/>
+              </a:prstGeom>
+              <a:noFill/>
+            </p:spPr>
+            <p:txBody>
+              <a:bodyPr wrap="none" lIns="0" tIns="0" rIns="0" bIns="0" rtlCol="0">
+                <a:spAutoFit/>
+              </a:bodyPr>
+              <a:lstStyle/>
+              <a:p>
+                <a:pPr/>
+                <a14:m>
+                  <m:oMathPara xmlns:m="http://schemas.openxmlformats.org/officeDocument/2006/math">
+                    <m:oMathParaPr>
+                      <m:jc m:val="centerGroup"/>
+                    </m:oMathParaPr>
+                    <m:oMath xmlns:m="http://schemas.openxmlformats.org/officeDocument/2006/math">
+                      <m:sSub>
+                        <m:sSubPr>
+                          <m:ctrlPr>
+                            <a:rPr lang="fr-FR" b="0" i="1" smtClean="0">
+                              <a:solidFill>
+                                <a:srgbClr val="C00000"/>
+                              </a:solidFill>
+                              <a:latin typeface="Cambria Math" panose="02040503050406030204" pitchFamily="18" charset="0"/>
+                              <a:ea typeface="Cambria Math" panose="02040503050406030204" pitchFamily="18" charset="0"/>
+                            </a:rPr>
+                          </m:ctrlPr>
+                        </m:sSubPr>
+                        <m:e>
+                          <m:r>
+                            <a:rPr lang="fr-FR" b="0" i="1" smtClean="0">
+                              <a:solidFill>
+                                <a:srgbClr val="C00000"/>
+                              </a:solidFill>
+                              <a:latin typeface="Cambria Math" panose="02040503050406030204" pitchFamily="18" charset="0"/>
+                              <a:ea typeface="Cambria Math" panose="02040503050406030204" pitchFamily="18" charset="0"/>
+                            </a:rPr>
+                            <m:t>𝑚</m:t>
+                          </m:r>
+                        </m:e>
+                        <m:sub>
+                          <m:r>
+                            <a:rPr lang="fr-FR" b="0" i="1" smtClean="0">
+                              <a:solidFill>
+                                <a:srgbClr val="C00000"/>
+                              </a:solidFill>
+                              <a:latin typeface="Cambria Math" panose="02040503050406030204" pitchFamily="18" charset="0"/>
+                              <a:ea typeface="Cambria Math" panose="02040503050406030204" pitchFamily="18" charset="0"/>
+                            </a:rPr>
+                            <m:t>𝑃</m:t>
+                          </m:r>
+                        </m:sub>
+                      </m:sSub>
+                      <m:r>
+                        <a:rPr lang="fr-FR" b="0" i="1" smtClean="0">
+                          <a:solidFill>
+                            <a:srgbClr val="C00000"/>
+                          </a:solidFill>
+                          <a:latin typeface="Cambria Math" panose="02040503050406030204" pitchFamily="18" charset="0"/>
+                          <a:ea typeface="Cambria Math" panose="02040503050406030204" pitchFamily="18" charset="0"/>
+                        </a:rPr>
+                        <m:t>𝑃</m:t>
+                      </m:r>
+                    </m:oMath>
+                  </m:oMathPara>
+                </a14:m>
+                <a:endParaRPr lang="en-US" dirty="0">
+                  <a:solidFill>
+                    <a:srgbClr val="C00000"/>
+                  </a:solidFill>
+                </a:endParaRPr>
+              </a:p>
+            </p:txBody>
+          </p:sp>
+        </mc:Choice>
+        <mc:Fallback>
+          <p:sp>
+            <p:nvSpPr>
+              <p:cNvPr id="55" name="TextBox 54">
+                <a:extLst>
+                  <a:ext uri="{FF2B5EF4-FFF2-40B4-BE49-F238E27FC236}">
+                    <a16:creationId xmlns:a16="http://schemas.microsoft.com/office/drawing/2014/main" id="{BFE385B8-CDAC-7A23-0A1A-2C8A6A715860}"/>
+                  </a:ext>
+                </a:extLst>
+              </p:cNvPr>
+              <p:cNvSpPr txBox="1">
+                <a:spLocks noRot="1" noChangeAspect="1" noMove="1" noResize="1" noEditPoints="1" noAdjustHandles="1" noChangeArrowheads="1" noChangeShapeType="1" noTextEdit="1"/>
+              </p:cNvSpPr>
+              <p:nvPr/>
+            </p:nvSpPr>
+            <p:spPr>
+              <a:xfrm>
+                <a:off x="8930933" y="7632805"/>
+                <a:ext cx="517642" cy="276999"/>
+              </a:xfrm>
+              <a:prstGeom prst="rect">
+                <a:avLst/>
+              </a:prstGeom>
+              <a:blipFill>
+                <a:blip r:embed="rId43"/>
+                <a:stretch>
+                  <a:fillRect l="-5882" r="-10588" b="-15217"/>
+                </a:stretch>
+              </a:blipFill>
+            </p:spPr>
+            <p:txBody>
+              <a:bodyPr/>
+              <a:lstStyle/>
+              <a:p>
+                <a:r>
+                  <a:rPr lang="en-US">
+                    <a:noFill/>
+                  </a:rPr>
+                  <a:t> </a:t>
+                </a:r>
+              </a:p>
+            </p:txBody>
+          </p:sp>
+        </mc:Fallback>
+      </mc:AlternateContent>
+      <mc:AlternateContent xmlns:mc="http://schemas.openxmlformats.org/markup-compatibility/2006">
+        <mc:Choice xmlns:a14="http://schemas.microsoft.com/office/drawing/2010/main" Requires="a14">
+          <p:sp>
+            <p:nvSpPr>
+              <p:cNvPr id="57" name="TextBox 56">
+                <a:extLst>
+                  <a:ext uri="{FF2B5EF4-FFF2-40B4-BE49-F238E27FC236}">
+                    <a16:creationId xmlns:a16="http://schemas.microsoft.com/office/drawing/2014/main" id="{A825EC0E-1BEE-0369-41EA-6E7D4D381848}"/>
+                  </a:ext>
+                </a:extLst>
+              </p:cNvPr>
+              <p:cNvSpPr txBox="1"/>
+              <p:nvPr/>
+            </p:nvSpPr>
+            <p:spPr>
+              <a:xfrm>
+                <a:off x="4637962" y="7614807"/>
+                <a:ext cx="1662635" cy="296428"/>
+              </a:xfrm>
+              <a:prstGeom prst="rect">
+                <a:avLst/>
+              </a:prstGeom>
+              <a:noFill/>
+            </p:spPr>
+            <p:txBody>
+              <a:bodyPr wrap="none" lIns="0" tIns="0" rIns="0" bIns="0" rtlCol="0">
+                <a:spAutoFit/>
+              </a:bodyPr>
+              <a:lstStyle/>
+              <a:p>
+                <a:pPr/>
+                <a14:m>
+                  <m:oMathPara xmlns:m="http://schemas.openxmlformats.org/officeDocument/2006/math">
+                    <m:oMathParaPr>
+                      <m:jc m:val="centerGroup"/>
+                    </m:oMathParaPr>
+                    <m:oMath xmlns:m="http://schemas.openxmlformats.org/officeDocument/2006/math">
+                      <m:sSub>
+                        <m:sSubPr>
+                          <m:ctrlPr>
+                            <a:rPr lang="fr-FR" b="0" i="1" smtClean="0">
+                              <a:solidFill>
+                                <a:srgbClr val="C00000"/>
+                              </a:solidFill>
+                              <a:latin typeface="Cambria Math" panose="02040503050406030204" pitchFamily="18" charset="0"/>
+                              <a:ea typeface="Cambria Math" panose="02040503050406030204" pitchFamily="18" charset="0"/>
+                            </a:rPr>
+                          </m:ctrlPr>
+                        </m:sSubPr>
+                        <m:e>
+                          <m:r>
+                            <a:rPr lang="en-US" i="1" smtClean="0">
+                              <a:solidFill>
+                                <a:srgbClr val="C00000"/>
+                              </a:solidFill>
+                              <a:latin typeface="Cambria Math" panose="02040503050406030204" pitchFamily="18" charset="0"/>
+                              <a:ea typeface="Cambria Math" panose="02040503050406030204" pitchFamily="18" charset="0"/>
+                            </a:rPr>
+                            <m:t>𝜂</m:t>
+                          </m:r>
+                        </m:e>
+                        <m:sub>
+                          <m:r>
+                            <a:rPr lang="fr-FR" b="0" i="1" smtClean="0">
+                              <a:solidFill>
+                                <a:srgbClr val="C00000"/>
+                              </a:solidFill>
+                              <a:latin typeface="Cambria Math" panose="02040503050406030204" pitchFamily="18" charset="0"/>
+                              <a:ea typeface="Cambria Math" panose="02040503050406030204" pitchFamily="18" charset="0"/>
+                            </a:rPr>
+                            <m:t>𝐿</m:t>
+                          </m:r>
+                        </m:sub>
+                      </m:sSub>
+                      <m:r>
+                        <a:rPr lang="fr-FR" b="0" i="1" smtClean="0">
+                          <a:solidFill>
+                            <a:srgbClr val="C00000"/>
+                          </a:solidFill>
+                          <a:latin typeface="Cambria Math" panose="02040503050406030204" pitchFamily="18" charset="0"/>
+                          <a:ea typeface="Cambria Math" panose="02040503050406030204" pitchFamily="18" charset="0"/>
+                        </a:rPr>
+                        <m:t>𝐿</m:t>
+                      </m:r>
+                      <m:r>
+                        <a:rPr lang="fr-FR" b="0" i="1" smtClean="0">
+                          <a:solidFill>
+                            <a:srgbClr val="C00000"/>
+                          </a:solidFill>
+                          <a:latin typeface="Cambria Math" panose="02040503050406030204" pitchFamily="18" charset="0"/>
+                          <a:ea typeface="Cambria Math" panose="02040503050406030204" pitchFamily="18" charset="0"/>
+                        </a:rPr>
+                        <m:t>+</m:t>
+                      </m:r>
+                      <m:sSub>
+                        <m:sSubPr>
+                          <m:ctrlPr>
+                            <a:rPr lang="fr-FR" b="0" i="1" smtClean="0">
+                              <a:solidFill>
+                                <a:srgbClr val="C00000"/>
+                              </a:solidFill>
+                              <a:latin typeface="Cambria Math" panose="02040503050406030204" pitchFamily="18" charset="0"/>
+                              <a:ea typeface="Cambria Math" panose="02040503050406030204" pitchFamily="18" charset="0"/>
+                            </a:rPr>
+                          </m:ctrlPr>
+                        </m:sSubPr>
+                        <m:e>
+                          <m:r>
+                            <a:rPr lang="fr-FR" b="0" i="1" smtClean="0">
+                              <a:solidFill>
+                                <a:srgbClr val="C00000"/>
+                              </a:solidFill>
+                              <a:latin typeface="Cambria Math" panose="02040503050406030204" pitchFamily="18" charset="0"/>
+                              <a:ea typeface="Cambria Math" panose="02040503050406030204" pitchFamily="18" charset="0"/>
+                            </a:rPr>
+                            <m:t>𝜂</m:t>
+                          </m:r>
+                        </m:e>
+                        <m:sub>
+                          <m:r>
+                            <a:rPr lang="fr-FR" b="0" i="1" smtClean="0">
+                              <a:solidFill>
+                                <a:srgbClr val="C00000"/>
+                              </a:solidFill>
+                              <a:latin typeface="Cambria Math" panose="02040503050406030204" pitchFamily="18" charset="0"/>
+                              <a:ea typeface="Cambria Math" panose="02040503050406030204" pitchFamily="18" charset="0"/>
+                            </a:rPr>
+                            <m:t>𝐽</m:t>
+                          </m:r>
+                        </m:sub>
+                      </m:sSub>
+                      <m:r>
+                        <a:rPr lang="fr-FR" b="0" i="1" smtClean="0">
+                          <a:solidFill>
+                            <a:srgbClr val="C00000"/>
+                          </a:solidFill>
+                          <a:latin typeface="Cambria Math" panose="02040503050406030204" pitchFamily="18" charset="0"/>
+                          <a:ea typeface="Cambria Math" panose="02040503050406030204" pitchFamily="18" charset="0"/>
+                        </a:rPr>
+                        <m:t>𝐽</m:t>
+                      </m:r>
+                      <m:r>
+                        <a:rPr lang="fr-FR" b="0" i="1" smtClean="0">
+                          <a:solidFill>
+                            <a:srgbClr val="C00000"/>
+                          </a:solidFill>
+                          <a:latin typeface="Cambria Math" panose="02040503050406030204" pitchFamily="18" charset="0"/>
+                          <a:ea typeface="Cambria Math" panose="02040503050406030204" pitchFamily="18" charset="0"/>
+                        </a:rPr>
+                        <m:t>+</m:t>
+                      </m:r>
+                      <m:sSub>
+                        <m:sSubPr>
+                          <m:ctrlPr>
+                            <a:rPr lang="fr-FR" b="0" i="1" smtClean="0">
+                              <a:solidFill>
+                                <a:srgbClr val="C00000"/>
+                              </a:solidFill>
+                              <a:latin typeface="Cambria Math" panose="02040503050406030204" pitchFamily="18" charset="0"/>
+                              <a:ea typeface="Cambria Math" panose="02040503050406030204" pitchFamily="18" charset="0"/>
+                            </a:rPr>
+                          </m:ctrlPr>
+                        </m:sSubPr>
+                        <m:e>
+                          <m:r>
+                            <a:rPr lang="fr-FR" b="0" i="1" smtClean="0">
+                              <a:solidFill>
+                                <a:srgbClr val="C00000"/>
+                              </a:solidFill>
+                              <a:latin typeface="Cambria Math" panose="02040503050406030204" pitchFamily="18" charset="0"/>
+                              <a:ea typeface="Cambria Math" panose="02040503050406030204" pitchFamily="18" charset="0"/>
+                            </a:rPr>
+                            <m:t>𝜂</m:t>
+                          </m:r>
+                        </m:e>
+                        <m:sub>
+                          <m:r>
+                            <a:rPr lang="fr-FR" b="0" i="1" smtClean="0">
+                              <a:solidFill>
+                                <a:srgbClr val="C00000"/>
+                              </a:solidFill>
+                              <a:latin typeface="Cambria Math" panose="02040503050406030204" pitchFamily="18" charset="0"/>
+                              <a:ea typeface="Cambria Math" panose="02040503050406030204" pitchFamily="18" charset="0"/>
+                            </a:rPr>
+                            <m:t>𝐴</m:t>
+                          </m:r>
+                        </m:sub>
+                      </m:sSub>
+                      <m:r>
+                        <a:rPr lang="fr-FR" b="0" i="1" smtClean="0">
+                          <a:solidFill>
+                            <a:srgbClr val="C00000"/>
+                          </a:solidFill>
+                          <a:latin typeface="Cambria Math" panose="02040503050406030204" pitchFamily="18" charset="0"/>
+                          <a:ea typeface="Cambria Math" panose="02040503050406030204" pitchFamily="18" charset="0"/>
+                        </a:rPr>
+                        <m:t>𝐴</m:t>
+                      </m:r>
+                    </m:oMath>
+                  </m:oMathPara>
+                </a14:m>
+                <a:endParaRPr lang="en-US" dirty="0">
+                  <a:solidFill>
+                    <a:srgbClr val="C00000"/>
+                  </a:solidFill>
+                </a:endParaRPr>
+              </a:p>
+            </p:txBody>
+          </p:sp>
+        </mc:Choice>
+        <mc:Fallback>
+          <p:sp>
+            <p:nvSpPr>
+              <p:cNvPr id="57" name="TextBox 56">
+                <a:extLst>
+                  <a:ext uri="{FF2B5EF4-FFF2-40B4-BE49-F238E27FC236}">
+                    <a16:creationId xmlns:a16="http://schemas.microsoft.com/office/drawing/2014/main" id="{A825EC0E-1BEE-0369-41EA-6E7D4D381848}"/>
+                  </a:ext>
+                </a:extLst>
+              </p:cNvPr>
+              <p:cNvSpPr txBox="1">
+                <a:spLocks noRot="1" noChangeAspect="1" noMove="1" noResize="1" noEditPoints="1" noAdjustHandles="1" noChangeArrowheads="1" noChangeShapeType="1" noTextEdit="1"/>
+              </p:cNvSpPr>
+              <p:nvPr/>
+            </p:nvSpPr>
+            <p:spPr>
+              <a:xfrm>
+                <a:off x="4637962" y="7614807"/>
+                <a:ext cx="1662635" cy="296428"/>
+              </a:xfrm>
+              <a:prstGeom prst="rect">
+                <a:avLst/>
+              </a:prstGeom>
+              <a:blipFill>
+                <a:blip r:embed="rId44"/>
+                <a:stretch>
+                  <a:fillRect l="-2930" r="-2930" b="-24490"/>
+                </a:stretch>
+              </a:blipFill>
+            </p:spPr>
+            <p:txBody>
+              <a:bodyPr/>
+              <a:lstStyle/>
+              <a:p>
+                <a:r>
+                  <a:rPr lang="en-US">
+                    <a:noFill/>
+                  </a:rPr>
+                  <a:t> </a:t>
+                </a:r>
+              </a:p>
+            </p:txBody>
+          </p:sp>
+        </mc:Fallback>
+      </mc:AlternateContent>
+      <p:cxnSp>
+        <p:nvCxnSpPr>
+          <p:cNvPr id="67" name="Straight Arrow Connector 66">
+            <a:extLst>
+              <a:ext uri="{FF2B5EF4-FFF2-40B4-BE49-F238E27FC236}">
+                <a16:creationId xmlns:a16="http://schemas.microsoft.com/office/drawing/2014/main" id="{53407C9F-DE48-05D0-ECDA-3B4AF64EC304}"/>
+              </a:ext>
+            </a:extLst>
+          </p:cNvPr>
+          <p:cNvCxnSpPr>
+            <a:cxnSpLocks/>
+          </p:cNvCxnSpPr>
+          <p:nvPr/>
+        </p:nvCxnSpPr>
+        <p:spPr>
+          <a:xfrm flipV="1">
+            <a:off x="7655560" y="7532188"/>
+            <a:ext cx="3068389" cy="5080"/>
+          </a:xfrm>
+          <a:prstGeom prst="straightConnector1">
+            <a:avLst/>
+          </a:prstGeom>
+          <a:ln w="19050">
+            <a:solidFill>
+              <a:srgbClr val="C00000"/>
+            </a:solidFill>
+            <a:tailEnd type="triangle"/>
+          </a:ln>
+        </p:spPr>
+        <p:style>
+          <a:lnRef idx="1">
+            <a:schemeClr val="dk1"/>
+          </a:lnRef>
+          <a:fillRef idx="0">
+            <a:schemeClr val="dk1"/>
+          </a:fillRef>
+          <a:effectRef idx="0">
+            <a:schemeClr val="dk1"/>
+          </a:effectRef>
+          <a:fontRef idx="minor">
+            <a:schemeClr val="tx1"/>
+          </a:fontRef>
+        </p:style>
+      </p:cxnSp>
+      <mc:AlternateContent xmlns:mc="http://schemas.openxmlformats.org/markup-compatibility/2006">
+        <mc:Choice xmlns:a14="http://schemas.microsoft.com/office/drawing/2010/main" Requires="a14">
+          <p:sp>
+            <p:nvSpPr>
+              <p:cNvPr id="72" name="TextBox 71">
+                <a:extLst>
+                  <a:ext uri="{FF2B5EF4-FFF2-40B4-BE49-F238E27FC236}">
+                    <a16:creationId xmlns:a16="http://schemas.microsoft.com/office/drawing/2014/main" id="{7578770A-5070-5BC3-7980-A583608C368A}"/>
+                  </a:ext>
+                </a:extLst>
+              </p:cNvPr>
+              <p:cNvSpPr txBox="1"/>
+              <p:nvPr/>
+            </p:nvSpPr>
+            <p:spPr>
+              <a:xfrm>
+                <a:off x="3441029" y="3628597"/>
+                <a:ext cx="1719253" cy="459421"/>
+              </a:xfrm>
+              <a:prstGeom prst="rect">
+                <a:avLst/>
+              </a:prstGeom>
+              <a:noFill/>
+            </p:spPr>
+            <p:txBody>
+              <a:bodyPr wrap="none" lIns="0" tIns="0" rIns="0" bIns="0" rtlCol="0">
+                <a:spAutoFit/>
+              </a:bodyPr>
+              <a:lstStyle/>
+              <a:p>
+                <a:pPr/>
+                <a14:m>
+                  <m:oMathPara xmlns:m="http://schemas.openxmlformats.org/officeDocument/2006/math">
+                    <m:oMathParaPr>
+                      <m:jc m:val="centerGroup"/>
+                    </m:oMathParaPr>
+                    <m:oMath xmlns:m="http://schemas.openxmlformats.org/officeDocument/2006/math">
+                      <m:sSub>
+                        <m:sSubPr>
+                          <m:ctrlPr>
+                            <a:rPr lang="fr-FR" sz="1600" b="0" i="1" smtClean="0">
+                              <a:latin typeface="Cambria Math" panose="02040503050406030204" pitchFamily="18" charset="0"/>
+                              <a:ea typeface="Cambria Math" panose="02040503050406030204" pitchFamily="18" charset="0"/>
+                            </a:rPr>
+                          </m:ctrlPr>
+                        </m:sSubPr>
+                        <m:e>
+                          <m:r>
+                            <a:rPr lang="fr-FR" sz="1600" i="1" smtClean="0">
+                              <a:latin typeface="Cambria Math" panose="02040503050406030204" pitchFamily="18" charset="0"/>
+                              <a:ea typeface="Cambria Math" panose="02040503050406030204" pitchFamily="18" charset="0"/>
+                            </a:rPr>
+                            <m:t>𝛽</m:t>
+                          </m:r>
+                        </m:e>
+                        <m:sub>
+                          <m:r>
+                            <a:rPr lang="fr-FR" sz="1600" b="0" i="1" smtClean="0">
+                              <a:latin typeface="Cambria Math" panose="02040503050406030204" pitchFamily="18" charset="0"/>
+                              <a:ea typeface="Cambria Math" panose="02040503050406030204" pitchFamily="18" charset="0"/>
+                            </a:rPr>
+                            <m:t>1</m:t>
+                          </m:r>
+                        </m:sub>
+                      </m:sSub>
+                      <m:r>
+                        <a:rPr lang="fr-FR" sz="1600" i="1">
+                          <a:latin typeface="Cambria Math" panose="02040503050406030204" pitchFamily="18" charset="0"/>
+                          <a:ea typeface="Cambria Math" panose="02040503050406030204" pitchFamily="18" charset="0"/>
+                        </a:rPr>
+                        <m:t>∙ </m:t>
+                      </m:r>
+                      <m:f>
+                        <m:fPr>
+                          <m:ctrlPr>
+                            <a:rPr lang="fr-FR" sz="1600" i="1">
+                              <a:latin typeface="Cambria Math" panose="02040503050406030204" pitchFamily="18" charset="0"/>
+                              <a:ea typeface="Cambria Math" panose="02040503050406030204" pitchFamily="18" charset="0"/>
+                            </a:rPr>
+                          </m:ctrlPr>
+                        </m:fPr>
+                        <m:num>
+                          <m:r>
+                            <a:rPr lang="fr-FR" sz="1600" i="1">
+                              <a:latin typeface="Cambria Math" panose="02040503050406030204" pitchFamily="18" charset="0"/>
+                              <a:ea typeface="Cambria Math" panose="02040503050406030204" pitchFamily="18" charset="0"/>
+                            </a:rPr>
+                            <m:t>𝑇𝑜</m:t>
+                          </m:r>
+                          <m:sSub>
+                            <m:sSubPr>
+                              <m:ctrlPr>
+                                <a:rPr lang="fr-FR" sz="1600" i="1">
+                                  <a:latin typeface="Cambria Math" panose="02040503050406030204" pitchFamily="18" charset="0"/>
+                                  <a:ea typeface="Cambria Math" panose="02040503050406030204" pitchFamily="18" charset="0"/>
+                                </a:rPr>
+                              </m:ctrlPr>
+                            </m:sSubPr>
+                            <m:e>
+                              <m:r>
+                                <a:rPr lang="fr-FR" sz="1600" i="1">
+                                  <a:latin typeface="Cambria Math" panose="02040503050406030204" pitchFamily="18" charset="0"/>
+                                  <a:ea typeface="Cambria Math" panose="02040503050406030204" pitchFamily="18" charset="0"/>
+                                </a:rPr>
+                                <m:t>𝑡</m:t>
+                              </m:r>
+                            </m:e>
+                            <m:sub>
+                              <m:r>
+                                <a:rPr lang="fr-FR" sz="1600" i="1">
+                                  <a:latin typeface="Cambria Math" panose="02040503050406030204" pitchFamily="18" charset="0"/>
+                                  <a:ea typeface="Cambria Math" panose="02040503050406030204" pitchFamily="18" charset="0"/>
+                                </a:rPr>
+                                <m:t>𝐼</m:t>
+                              </m:r>
+                            </m:sub>
+                          </m:sSub>
+                        </m:num>
+                        <m:den>
+                          <m:r>
+                            <a:rPr lang="fr-FR" sz="1600" i="1">
+                              <a:latin typeface="Cambria Math" panose="02040503050406030204" pitchFamily="18" charset="0"/>
+                              <a:ea typeface="Cambria Math" panose="02040503050406030204" pitchFamily="18" charset="0"/>
+                            </a:rPr>
+                            <m:t>𝑁</m:t>
+                          </m:r>
+                        </m:den>
+                      </m:f>
+                      <m:r>
+                        <a:rPr lang="fr-FR" sz="1600" b="0" i="1" smtClean="0">
+                          <a:solidFill>
+                            <a:srgbClr val="C00000"/>
+                          </a:solidFill>
+                          <a:latin typeface="Cambria Math" panose="02040503050406030204" pitchFamily="18" charset="0"/>
+                          <a:ea typeface="Cambria Math" panose="02040503050406030204" pitchFamily="18" charset="0"/>
+                        </a:rPr>
+                        <m:t>+</m:t>
+                      </m:r>
+                      <m:sSub>
+                        <m:sSubPr>
+                          <m:ctrlPr>
+                            <a:rPr lang="fr-FR" sz="1600" b="0" i="1" smtClean="0">
+                              <a:solidFill>
+                                <a:srgbClr val="C00000"/>
+                              </a:solidFill>
+                              <a:latin typeface="Cambria Math" panose="02040503050406030204" pitchFamily="18" charset="0"/>
+                              <a:ea typeface="Cambria Math" panose="02040503050406030204" pitchFamily="18" charset="0"/>
+                            </a:rPr>
+                          </m:ctrlPr>
+                        </m:sSubPr>
+                        <m:e>
+                          <m:r>
+                            <a:rPr lang="fr-FR" sz="1600" b="0" i="1" smtClean="0">
+                              <a:solidFill>
+                                <a:srgbClr val="C00000"/>
+                              </a:solidFill>
+                              <a:latin typeface="Cambria Math" panose="02040503050406030204" pitchFamily="18" charset="0"/>
+                              <a:ea typeface="Cambria Math" panose="02040503050406030204" pitchFamily="18" charset="0"/>
+                            </a:rPr>
+                            <m:t>𝛼</m:t>
+                          </m:r>
+                        </m:e>
+                        <m:sub>
+                          <m:r>
+                            <a:rPr lang="fr-FR" sz="1600" b="0" i="1" smtClean="0">
+                              <a:solidFill>
+                                <a:srgbClr val="C00000"/>
+                              </a:solidFill>
+                              <a:latin typeface="Cambria Math" panose="02040503050406030204" pitchFamily="18" charset="0"/>
+                              <a:ea typeface="Cambria Math" panose="02040503050406030204" pitchFamily="18" charset="0"/>
+                            </a:rPr>
+                            <m:t>𝐽</m:t>
+                          </m:r>
+                        </m:sub>
+                      </m:sSub>
+                      <m:sSub>
+                        <m:sSubPr>
+                          <m:ctrlPr>
+                            <a:rPr lang="fr-FR" sz="1600" b="0" i="1" smtClean="0">
+                              <a:solidFill>
+                                <a:srgbClr val="C00000"/>
+                              </a:solidFill>
+                              <a:latin typeface="Cambria Math" panose="02040503050406030204" pitchFamily="18" charset="0"/>
+                              <a:ea typeface="Cambria Math" panose="02040503050406030204" pitchFamily="18" charset="0"/>
+                            </a:rPr>
+                          </m:ctrlPr>
+                        </m:sSubPr>
+                        <m:e>
+                          <m:r>
+                            <a:rPr lang="fr-FR" sz="1600" b="0" i="1" smtClean="0">
+                              <a:solidFill>
+                                <a:srgbClr val="C00000"/>
+                              </a:solidFill>
+                              <a:latin typeface="Cambria Math" panose="02040503050406030204" pitchFamily="18" charset="0"/>
+                              <a:ea typeface="Cambria Math" panose="02040503050406030204" pitchFamily="18" charset="0"/>
+                            </a:rPr>
+                            <m:t>𝛽</m:t>
+                          </m:r>
+                        </m:e>
+                        <m:sub>
+                          <m:r>
+                            <a:rPr lang="fr-FR" sz="1600" b="0" i="1" smtClean="0">
+                              <a:solidFill>
+                                <a:srgbClr val="C00000"/>
+                              </a:solidFill>
+                              <a:latin typeface="Cambria Math" panose="02040503050406030204" pitchFamily="18" charset="0"/>
+                              <a:ea typeface="Cambria Math" panose="02040503050406030204" pitchFamily="18" charset="0"/>
+                            </a:rPr>
+                            <m:t>2</m:t>
+                          </m:r>
+                        </m:sub>
+                      </m:sSub>
+                      <m:r>
+                        <a:rPr lang="fr-FR" sz="1600" b="0" i="1" smtClean="0">
+                          <a:solidFill>
+                            <a:srgbClr val="C00000"/>
+                          </a:solidFill>
+                          <a:latin typeface="Cambria Math" panose="02040503050406030204" pitchFamily="18" charset="0"/>
+                          <a:ea typeface="Cambria Math" panose="02040503050406030204" pitchFamily="18" charset="0"/>
+                        </a:rPr>
+                        <m:t>𝑆𝑃</m:t>
+                      </m:r>
+                    </m:oMath>
+                  </m:oMathPara>
+                </a14:m>
+                <a:endParaRPr lang="en-US" sz="1600" dirty="0"/>
+              </a:p>
+            </p:txBody>
+          </p:sp>
+        </mc:Choice>
+        <mc:Fallback>
+          <p:sp>
+            <p:nvSpPr>
+              <p:cNvPr id="72" name="TextBox 71">
+                <a:extLst>
+                  <a:ext uri="{FF2B5EF4-FFF2-40B4-BE49-F238E27FC236}">
+                    <a16:creationId xmlns:a16="http://schemas.microsoft.com/office/drawing/2014/main" id="{7578770A-5070-5BC3-7980-A583608C368A}"/>
+                  </a:ext>
+                </a:extLst>
+              </p:cNvPr>
+              <p:cNvSpPr txBox="1">
+                <a:spLocks noRot="1" noChangeAspect="1" noMove="1" noResize="1" noEditPoints="1" noAdjustHandles="1" noChangeArrowheads="1" noChangeShapeType="1" noTextEdit="1"/>
+              </p:cNvSpPr>
+              <p:nvPr/>
+            </p:nvSpPr>
+            <p:spPr>
+              <a:xfrm>
+                <a:off x="3441029" y="3628597"/>
+                <a:ext cx="1719253" cy="459421"/>
+              </a:xfrm>
+              <a:prstGeom prst="rect">
+                <a:avLst/>
+              </a:prstGeom>
+              <a:blipFill>
+                <a:blip r:embed="rId45"/>
+                <a:stretch>
+                  <a:fillRect/>
+                </a:stretch>
+              </a:blipFill>
+            </p:spPr>
+            <p:txBody>
+              <a:bodyPr/>
+              <a:lstStyle/>
+              <a:p>
+                <a:r>
+                  <a:rPr lang="en-US">
+                    <a:noFill/>
+                  </a:rPr>
+                  <a:t> </a:t>
+                </a:r>
+              </a:p>
+            </p:txBody>
+          </p:sp>
+        </mc:Fallback>
+      </mc:AlternateContent>
+      <mc:AlternateContent xmlns:mc="http://schemas.openxmlformats.org/markup-compatibility/2006">
+        <mc:Choice xmlns:a14="http://schemas.microsoft.com/office/drawing/2010/main" Requires="a14">
+          <p:sp>
+            <p:nvSpPr>
+              <p:cNvPr id="75" name="TextBox 74">
+                <a:extLst>
+                  <a:ext uri="{FF2B5EF4-FFF2-40B4-BE49-F238E27FC236}">
+                    <a16:creationId xmlns:a16="http://schemas.microsoft.com/office/drawing/2014/main" id="{74F9DA43-2892-F06B-7FD1-5BE1A543BDA2}"/>
+                  </a:ext>
+                </a:extLst>
+              </p:cNvPr>
+              <p:cNvSpPr txBox="1"/>
+              <p:nvPr/>
+            </p:nvSpPr>
+            <p:spPr>
+              <a:xfrm>
+                <a:off x="3452518" y="4964567"/>
+                <a:ext cx="1791901" cy="459421"/>
+              </a:xfrm>
+              <a:prstGeom prst="rect">
+                <a:avLst/>
+              </a:prstGeom>
+              <a:noFill/>
+            </p:spPr>
+            <p:txBody>
+              <a:bodyPr wrap="none" lIns="0" tIns="0" rIns="0" bIns="0" rtlCol="0">
+                <a:spAutoFit/>
+              </a:bodyPr>
+              <a:lstStyle/>
+              <a:p>
+                <a:pPr/>
+                <a14:m>
+                  <m:oMathPara xmlns:m="http://schemas.openxmlformats.org/officeDocument/2006/math">
+                    <m:oMathParaPr>
+                      <m:jc m:val="centerGroup"/>
+                    </m:oMathParaPr>
+                    <m:oMath xmlns:m="http://schemas.openxmlformats.org/officeDocument/2006/math">
+                      <m:sSub>
+                        <m:sSubPr>
+                          <m:ctrlPr>
+                            <a:rPr lang="fr-FR" sz="1600" b="0" i="1" smtClean="0">
+                              <a:latin typeface="Cambria Math" panose="02040503050406030204" pitchFamily="18" charset="0"/>
+                              <a:ea typeface="Cambria Math" panose="02040503050406030204" pitchFamily="18" charset="0"/>
+                            </a:rPr>
+                          </m:ctrlPr>
+                        </m:sSubPr>
+                        <m:e>
+                          <m:r>
+                            <a:rPr lang="fr-FR" sz="1600" i="1" smtClean="0">
+                              <a:latin typeface="Cambria Math" panose="02040503050406030204" pitchFamily="18" charset="0"/>
+                              <a:ea typeface="Cambria Math" panose="02040503050406030204" pitchFamily="18" charset="0"/>
+                            </a:rPr>
+                            <m:t>𝛽</m:t>
+                          </m:r>
+                        </m:e>
+                        <m:sub>
+                          <m:r>
+                            <a:rPr lang="fr-FR" sz="1600" b="0" i="1" smtClean="0">
+                              <a:latin typeface="Cambria Math" panose="02040503050406030204" pitchFamily="18" charset="0"/>
+                              <a:ea typeface="Cambria Math" panose="02040503050406030204" pitchFamily="18" charset="0"/>
+                            </a:rPr>
+                            <m:t>1</m:t>
+                          </m:r>
+                        </m:sub>
+                      </m:sSub>
+                      <m:r>
+                        <a:rPr lang="fr-FR" sz="1600" i="1">
+                          <a:latin typeface="Cambria Math" panose="02040503050406030204" pitchFamily="18" charset="0"/>
+                          <a:ea typeface="Cambria Math" panose="02040503050406030204" pitchFamily="18" charset="0"/>
+                        </a:rPr>
+                        <m:t>∙ </m:t>
+                      </m:r>
+                      <m:f>
+                        <m:fPr>
+                          <m:ctrlPr>
+                            <a:rPr lang="fr-FR" sz="1600" i="1">
+                              <a:latin typeface="Cambria Math" panose="02040503050406030204" pitchFamily="18" charset="0"/>
+                              <a:ea typeface="Cambria Math" panose="02040503050406030204" pitchFamily="18" charset="0"/>
+                            </a:rPr>
+                          </m:ctrlPr>
+                        </m:fPr>
+                        <m:num>
+                          <m:r>
+                            <a:rPr lang="fr-FR" sz="1600" i="1">
+                              <a:latin typeface="Cambria Math" panose="02040503050406030204" pitchFamily="18" charset="0"/>
+                              <a:ea typeface="Cambria Math" panose="02040503050406030204" pitchFamily="18" charset="0"/>
+                            </a:rPr>
+                            <m:t>𝑇𝑜</m:t>
+                          </m:r>
+                          <m:sSub>
+                            <m:sSubPr>
+                              <m:ctrlPr>
+                                <a:rPr lang="fr-FR" sz="1600" i="1">
+                                  <a:latin typeface="Cambria Math" panose="02040503050406030204" pitchFamily="18" charset="0"/>
+                                  <a:ea typeface="Cambria Math" panose="02040503050406030204" pitchFamily="18" charset="0"/>
+                                </a:rPr>
+                              </m:ctrlPr>
+                            </m:sSubPr>
+                            <m:e>
+                              <m:r>
+                                <a:rPr lang="fr-FR" sz="1600" i="1">
+                                  <a:latin typeface="Cambria Math" panose="02040503050406030204" pitchFamily="18" charset="0"/>
+                                  <a:ea typeface="Cambria Math" panose="02040503050406030204" pitchFamily="18" charset="0"/>
+                                </a:rPr>
+                                <m:t>𝑡</m:t>
+                              </m:r>
+                            </m:e>
+                            <m:sub>
+                              <m:r>
+                                <a:rPr lang="fr-FR" sz="1600" i="1">
+                                  <a:latin typeface="Cambria Math" panose="02040503050406030204" pitchFamily="18" charset="0"/>
+                                  <a:ea typeface="Cambria Math" panose="02040503050406030204" pitchFamily="18" charset="0"/>
+                                </a:rPr>
+                                <m:t>𝐼</m:t>
+                              </m:r>
+                            </m:sub>
+                          </m:sSub>
+                        </m:num>
+                        <m:den>
+                          <m:r>
+                            <a:rPr lang="fr-FR" sz="1600" i="1">
+                              <a:latin typeface="Cambria Math" panose="02040503050406030204" pitchFamily="18" charset="0"/>
+                              <a:ea typeface="Cambria Math" panose="02040503050406030204" pitchFamily="18" charset="0"/>
+                            </a:rPr>
+                            <m:t>𝑁</m:t>
+                          </m:r>
+                        </m:den>
+                      </m:f>
+                      <m:r>
+                        <a:rPr lang="fr-FR" sz="1600" b="0" i="1" smtClean="0">
+                          <a:solidFill>
+                            <a:srgbClr val="C00000"/>
+                          </a:solidFill>
+                          <a:latin typeface="Cambria Math" panose="02040503050406030204" pitchFamily="18" charset="0"/>
+                          <a:ea typeface="Cambria Math" panose="02040503050406030204" pitchFamily="18" charset="0"/>
+                        </a:rPr>
+                        <m:t>+</m:t>
+                      </m:r>
+                      <m:sSub>
+                        <m:sSubPr>
+                          <m:ctrlPr>
+                            <a:rPr lang="fr-FR" sz="1600" b="0" i="1" smtClean="0">
+                              <a:solidFill>
+                                <a:srgbClr val="C00000"/>
+                              </a:solidFill>
+                              <a:latin typeface="Cambria Math" panose="02040503050406030204" pitchFamily="18" charset="0"/>
+                              <a:ea typeface="Cambria Math" panose="02040503050406030204" pitchFamily="18" charset="0"/>
+                            </a:rPr>
+                          </m:ctrlPr>
+                        </m:sSubPr>
+                        <m:e>
+                          <m:r>
+                            <a:rPr lang="fr-FR" sz="1600" b="0" i="1" smtClean="0">
+                              <a:solidFill>
+                                <a:srgbClr val="C00000"/>
+                              </a:solidFill>
+                              <a:latin typeface="Cambria Math" panose="02040503050406030204" pitchFamily="18" charset="0"/>
+                              <a:ea typeface="Cambria Math" panose="02040503050406030204" pitchFamily="18" charset="0"/>
+                            </a:rPr>
+                            <m:t>𝛼</m:t>
+                          </m:r>
+                        </m:e>
+                        <m:sub>
+                          <m:r>
+                            <a:rPr lang="fr-FR" sz="1600" b="0" i="1" smtClean="0">
+                              <a:solidFill>
+                                <a:srgbClr val="C00000"/>
+                              </a:solidFill>
+                              <a:latin typeface="Cambria Math" panose="02040503050406030204" pitchFamily="18" charset="0"/>
+                              <a:ea typeface="Cambria Math" panose="02040503050406030204" pitchFamily="18" charset="0"/>
+                            </a:rPr>
+                            <m:t>𝐴</m:t>
+                          </m:r>
+                        </m:sub>
+                      </m:sSub>
+                      <m:sSub>
+                        <m:sSubPr>
+                          <m:ctrlPr>
+                            <a:rPr lang="fr-FR" sz="1600" b="0" i="1" smtClean="0">
+                              <a:solidFill>
+                                <a:srgbClr val="C00000"/>
+                              </a:solidFill>
+                              <a:latin typeface="Cambria Math" panose="02040503050406030204" pitchFamily="18" charset="0"/>
+                              <a:ea typeface="Cambria Math" panose="02040503050406030204" pitchFamily="18" charset="0"/>
+                            </a:rPr>
+                          </m:ctrlPr>
+                        </m:sSubPr>
+                        <m:e>
+                          <m:r>
+                            <a:rPr lang="fr-FR" sz="1600" b="0" i="1" smtClean="0">
+                              <a:solidFill>
+                                <a:srgbClr val="C00000"/>
+                              </a:solidFill>
+                              <a:latin typeface="Cambria Math" panose="02040503050406030204" pitchFamily="18" charset="0"/>
+                              <a:ea typeface="Cambria Math" panose="02040503050406030204" pitchFamily="18" charset="0"/>
+                            </a:rPr>
+                            <m:t>𝛽</m:t>
+                          </m:r>
+                        </m:e>
+                        <m:sub>
+                          <m:r>
+                            <a:rPr lang="fr-FR" sz="1600" b="0" i="1" smtClean="0">
+                              <a:solidFill>
+                                <a:srgbClr val="C00000"/>
+                              </a:solidFill>
+                              <a:latin typeface="Cambria Math" panose="02040503050406030204" pitchFamily="18" charset="0"/>
+                              <a:ea typeface="Cambria Math" panose="02040503050406030204" pitchFamily="18" charset="0"/>
+                            </a:rPr>
+                            <m:t>2</m:t>
+                          </m:r>
+                        </m:sub>
+                      </m:sSub>
+                      <m:r>
+                        <a:rPr lang="fr-FR" sz="1600" b="0" i="1" smtClean="0">
+                          <a:solidFill>
+                            <a:srgbClr val="C00000"/>
+                          </a:solidFill>
+                          <a:latin typeface="Cambria Math" panose="02040503050406030204" pitchFamily="18" charset="0"/>
+                          <a:ea typeface="Cambria Math" panose="02040503050406030204" pitchFamily="18" charset="0"/>
+                        </a:rPr>
+                        <m:t>𝑆𝑃</m:t>
+                      </m:r>
+                    </m:oMath>
+                  </m:oMathPara>
+                </a14:m>
+                <a:endParaRPr lang="en-US" sz="1600" dirty="0"/>
+              </a:p>
+            </p:txBody>
+          </p:sp>
+        </mc:Choice>
+        <mc:Fallback>
+          <p:sp>
+            <p:nvSpPr>
+              <p:cNvPr id="75" name="TextBox 74">
+                <a:extLst>
+                  <a:ext uri="{FF2B5EF4-FFF2-40B4-BE49-F238E27FC236}">
+                    <a16:creationId xmlns:a16="http://schemas.microsoft.com/office/drawing/2014/main" id="{74F9DA43-2892-F06B-7FD1-5BE1A543BDA2}"/>
+                  </a:ext>
+                </a:extLst>
+              </p:cNvPr>
+              <p:cNvSpPr txBox="1">
+                <a:spLocks noRot="1" noChangeAspect="1" noMove="1" noResize="1" noEditPoints="1" noAdjustHandles="1" noChangeArrowheads="1" noChangeShapeType="1" noTextEdit="1"/>
+              </p:cNvSpPr>
+              <p:nvPr/>
+            </p:nvSpPr>
+            <p:spPr>
+              <a:xfrm>
+                <a:off x="3452518" y="4964567"/>
+                <a:ext cx="1791901" cy="459421"/>
+              </a:xfrm>
+              <a:prstGeom prst="rect">
+                <a:avLst/>
+              </a:prstGeom>
+              <a:blipFill>
+                <a:blip r:embed="rId46"/>
+                <a:stretch>
+                  <a:fillRect/>
+                </a:stretch>
+              </a:blipFill>
+            </p:spPr>
+            <p:txBody>
+              <a:bodyPr/>
+              <a:lstStyle/>
+              <a:p>
+                <a:r>
+                  <a:rPr lang="en-US">
+                    <a:noFill/>
+                  </a:rPr>
+                  <a:t> </a:t>
+                </a:r>
+              </a:p>
+            </p:txBody>
+          </p:sp>
+        </mc:Fallback>
+      </mc:AlternateContent>
     </p:spTree>
     <p:extLst>
       <p:ext uri="{BB962C8B-B14F-4D97-AF65-F5344CB8AC3E}">

</xml_diff>

<commit_message>
Articles supplémentaires & schéma actualisé
</commit_message>
<xml_diff>
--- a/Schéma MEPI modifications.pptx
+++ b/Schéma MEPI modifications.pptx
@@ -197,7 +197,7 @@
           <a:p>
             <a:fld id="{A63BCDBA-15DF-4AE0-9D6F-BF720B3E0252}" type="datetimeFigureOut">
               <a:rPr lang="en-US" smtClean="0"/>
-              <a:t>10/12/2023</a:t>
+              <a:t>10/21/2023</a:t>
             </a:fld>
             <a:endParaRPr lang="en-US"/>
           </a:p>
@@ -356,7 +356,7 @@
           <a:p>
             <a:fld id="{2DC1BF5D-8FAD-4431-B21D-257DB0FF1772}" type="slidenum">
               <a:rPr lang="en-US" smtClean="0"/>
-              <a:t>‹#›</a:t>
+              <a:t>‹N°›</a:t>
             </a:fld>
             <a:endParaRPr lang="en-US"/>
           </a:p>
@@ -596,7 +596,7 @@
           <a:p>
             <a:fld id="{A5AF9A6A-1F81-4236-8DE6-52D7EE79203B}" type="datetimeFigureOut">
               <a:rPr lang="en-US" smtClean="0"/>
-              <a:t>10/12/2023</a:t>
+              <a:t>10/21/2023</a:t>
             </a:fld>
             <a:endParaRPr lang="en-US"/>
           </a:p>
@@ -638,7 +638,7 @@
           <a:p>
             <a:fld id="{9405D096-5188-40F8-836F-C4D4998A82EC}" type="slidenum">
               <a:rPr lang="en-US" smtClean="0"/>
-              <a:t>‹#›</a:t>
+              <a:t>‹N°›</a:t>
             </a:fld>
             <a:endParaRPr lang="en-US"/>
           </a:p>
@@ -766,7 +766,7 @@
           <a:p>
             <a:fld id="{A5AF9A6A-1F81-4236-8DE6-52D7EE79203B}" type="datetimeFigureOut">
               <a:rPr lang="en-US" smtClean="0"/>
-              <a:t>10/12/2023</a:t>
+              <a:t>10/21/2023</a:t>
             </a:fld>
             <a:endParaRPr lang="en-US"/>
           </a:p>
@@ -808,7 +808,7 @@
           <a:p>
             <a:fld id="{9405D096-5188-40F8-836F-C4D4998A82EC}" type="slidenum">
               <a:rPr lang="en-US" smtClean="0"/>
-              <a:t>‹#›</a:t>
+              <a:t>‹N°›</a:t>
             </a:fld>
             <a:endParaRPr lang="en-US"/>
           </a:p>
@@ -946,7 +946,7 @@
           <a:p>
             <a:fld id="{A5AF9A6A-1F81-4236-8DE6-52D7EE79203B}" type="datetimeFigureOut">
               <a:rPr lang="en-US" smtClean="0"/>
-              <a:t>10/12/2023</a:t>
+              <a:t>10/21/2023</a:t>
             </a:fld>
             <a:endParaRPr lang="en-US"/>
           </a:p>
@@ -988,7 +988,7 @@
           <a:p>
             <a:fld id="{9405D096-5188-40F8-836F-C4D4998A82EC}" type="slidenum">
               <a:rPr lang="en-US" smtClean="0"/>
-              <a:t>‹#›</a:t>
+              <a:t>‹N°›</a:t>
             </a:fld>
             <a:endParaRPr lang="en-US"/>
           </a:p>
@@ -1116,7 +1116,7 @@
           <a:p>
             <a:fld id="{A5AF9A6A-1F81-4236-8DE6-52D7EE79203B}" type="datetimeFigureOut">
               <a:rPr lang="en-US" smtClean="0"/>
-              <a:t>10/12/2023</a:t>
+              <a:t>10/21/2023</a:t>
             </a:fld>
             <a:endParaRPr lang="en-US"/>
           </a:p>
@@ -1158,7 +1158,7 @@
           <a:p>
             <a:fld id="{9405D096-5188-40F8-836F-C4D4998A82EC}" type="slidenum">
               <a:rPr lang="en-US" smtClean="0"/>
-              <a:t>‹#›</a:t>
+              <a:t>‹N°›</a:t>
             </a:fld>
             <a:endParaRPr lang="en-US"/>
           </a:p>
@@ -1360,7 +1360,7 @@
           <a:p>
             <a:fld id="{A5AF9A6A-1F81-4236-8DE6-52D7EE79203B}" type="datetimeFigureOut">
               <a:rPr lang="en-US" smtClean="0"/>
-              <a:t>10/12/2023</a:t>
+              <a:t>10/21/2023</a:t>
             </a:fld>
             <a:endParaRPr lang="en-US"/>
           </a:p>
@@ -1402,7 +1402,7 @@
           <a:p>
             <a:fld id="{9405D096-5188-40F8-836F-C4D4998A82EC}" type="slidenum">
               <a:rPr lang="en-US" smtClean="0"/>
-              <a:t>‹#›</a:t>
+              <a:t>‹N°›</a:t>
             </a:fld>
             <a:endParaRPr lang="en-US"/>
           </a:p>
@@ -1592,7 +1592,7 @@
           <a:p>
             <a:fld id="{A5AF9A6A-1F81-4236-8DE6-52D7EE79203B}" type="datetimeFigureOut">
               <a:rPr lang="en-US" smtClean="0"/>
-              <a:t>10/12/2023</a:t>
+              <a:t>10/21/2023</a:t>
             </a:fld>
             <a:endParaRPr lang="en-US"/>
           </a:p>
@@ -1634,7 +1634,7 @@
           <a:p>
             <a:fld id="{9405D096-5188-40F8-836F-C4D4998A82EC}" type="slidenum">
               <a:rPr lang="en-US" smtClean="0"/>
-              <a:t>‹#›</a:t>
+              <a:t>‹N°›</a:t>
             </a:fld>
             <a:endParaRPr lang="en-US"/>
           </a:p>
@@ -1959,7 +1959,7 @@
           <a:p>
             <a:fld id="{A5AF9A6A-1F81-4236-8DE6-52D7EE79203B}" type="datetimeFigureOut">
               <a:rPr lang="en-US" smtClean="0"/>
-              <a:t>10/12/2023</a:t>
+              <a:t>10/21/2023</a:t>
             </a:fld>
             <a:endParaRPr lang="en-US"/>
           </a:p>
@@ -2001,7 +2001,7 @@
           <a:p>
             <a:fld id="{9405D096-5188-40F8-836F-C4D4998A82EC}" type="slidenum">
               <a:rPr lang="en-US" smtClean="0"/>
-              <a:t>‹#›</a:t>
+              <a:t>‹N°›</a:t>
             </a:fld>
             <a:endParaRPr lang="en-US"/>
           </a:p>
@@ -2077,7 +2077,7 @@
           <a:p>
             <a:fld id="{A5AF9A6A-1F81-4236-8DE6-52D7EE79203B}" type="datetimeFigureOut">
               <a:rPr lang="en-US" smtClean="0"/>
-              <a:t>10/12/2023</a:t>
+              <a:t>10/21/2023</a:t>
             </a:fld>
             <a:endParaRPr lang="en-US"/>
           </a:p>
@@ -2119,7 +2119,7 @@
           <a:p>
             <a:fld id="{9405D096-5188-40F8-836F-C4D4998A82EC}" type="slidenum">
               <a:rPr lang="en-US" smtClean="0"/>
-              <a:t>‹#›</a:t>
+              <a:t>‹N°›</a:t>
             </a:fld>
             <a:endParaRPr lang="en-US"/>
           </a:p>
@@ -2172,7 +2172,7 @@
           <a:p>
             <a:fld id="{A5AF9A6A-1F81-4236-8DE6-52D7EE79203B}" type="datetimeFigureOut">
               <a:rPr lang="en-US" smtClean="0"/>
-              <a:t>10/12/2023</a:t>
+              <a:t>10/21/2023</a:t>
             </a:fld>
             <a:endParaRPr lang="en-US"/>
           </a:p>
@@ -2214,7 +2214,7 @@
           <a:p>
             <a:fld id="{9405D096-5188-40F8-836F-C4D4998A82EC}" type="slidenum">
               <a:rPr lang="en-US" smtClean="0"/>
-              <a:t>‹#›</a:t>
+              <a:t>‹N°›</a:t>
             </a:fld>
             <a:endParaRPr lang="en-US"/>
           </a:p>
@@ -2449,7 +2449,7 @@
           <a:p>
             <a:fld id="{A5AF9A6A-1F81-4236-8DE6-52D7EE79203B}" type="datetimeFigureOut">
               <a:rPr lang="en-US" smtClean="0"/>
-              <a:t>10/12/2023</a:t>
+              <a:t>10/21/2023</a:t>
             </a:fld>
             <a:endParaRPr lang="en-US"/>
           </a:p>
@@ -2491,7 +2491,7 @@
           <a:p>
             <a:fld id="{9405D096-5188-40F8-836F-C4D4998A82EC}" type="slidenum">
               <a:rPr lang="en-US" smtClean="0"/>
-              <a:t>‹#›</a:t>
+              <a:t>‹N°›</a:t>
             </a:fld>
             <a:endParaRPr lang="en-US"/>
           </a:p>
@@ -2706,7 +2706,7 @@
           <a:p>
             <a:fld id="{A5AF9A6A-1F81-4236-8DE6-52D7EE79203B}" type="datetimeFigureOut">
               <a:rPr lang="en-US" smtClean="0"/>
-              <a:t>10/12/2023</a:t>
+              <a:t>10/21/2023</a:t>
             </a:fld>
             <a:endParaRPr lang="en-US"/>
           </a:p>
@@ -2748,7 +2748,7 @@
           <a:p>
             <a:fld id="{9405D096-5188-40F8-836F-C4D4998A82EC}" type="slidenum">
               <a:rPr lang="en-US" smtClean="0"/>
-              <a:t>‹#›</a:t>
+              <a:t>‹N°›</a:t>
             </a:fld>
             <a:endParaRPr lang="en-US"/>
           </a:p>
@@ -2919,7 +2919,7 @@
           <a:p>
             <a:fld id="{A5AF9A6A-1F81-4236-8DE6-52D7EE79203B}" type="datetimeFigureOut">
               <a:rPr lang="en-US" smtClean="0"/>
-              <a:t>10/12/2023</a:t>
+              <a:t>10/21/2023</a:t>
             </a:fld>
             <a:endParaRPr lang="en-US"/>
           </a:p>
@@ -2997,7 +2997,7 @@
           <a:p>
             <a:fld id="{9405D096-5188-40F8-836F-C4D4998A82EC}" type="slidenum">
               <a:rPr lang="en-US" smtClean="0"/>
-              <a:t>‹#›</a:t>
+              <a:t>‹N°›</a:t>
             </a:fld>
             <a:endParaRPr lang="en-US"/>
           </a:p>
@@ -5993,8 +5993,8 @@
           </p:sp>
         </mc:Fallback>
       </mc:AlternateContent>
-      <mc:AlternateContent xmlns:mc="http://schemas.openxmlformats.org/markup-compatibility/2006">
-        <mc:Choice xmlns:a14="http://schemas.microsoft.com/office/drawing/2010/main" Requires="a14">
+      <mc:AlternateContent xmlns:mc="http://schemas.openxmlformats.org/markup-compatibility/2006" xmlns:a14="http://schemas.microsoft.com/office/drawing/2010/main">
+        <mc:Choice Requires="a14">
           <p:sp>
             <p:nvSpPr>
               <p:cNvPr id="94" name="TextBox 93">
@@ -6223,7 +6223,7 @@
             </p:txBody>
           </p:sp>
         </mc:Choice>
-        <mc:Fallback>
+        <mc:Fallback xmlns="">
           <p:sp>
             <p:nvSpPr>
               <p:cNvPr id="94" name="TextBox 93">
@@ -9770,8 +9770,8 @@
         </p:nvCxnSpPr>
         <p:spPr>
           <a:xfrm>
-            <a:off x="4028440" y="7532188"/>
-            <a:ext cx="2954214" cy="0"/>
+            <a:off x="3129940" y="7532188"/>
+            <a:ext cx="3850500" cy="0"/>
           </a:xfrm>
           <a:prstGeom prst="straightConnector1">
             <a:avLst/>
@@ -10105,8 +10105,8 @@
             </p:nvSpPr>
             <p:spPr>
               <a:xfrm>
-                <a:off x="8930933" y="7632805"/>
-                <a:ext cx="369332" cy="276999"/>
+                <a:off x="7921283" y="7632805"/>
+                <a:ext cx="3598614" cy="573427"/>
               </a:xfrm>
               <a:prstGeom prst="rect">
                 <a:avLst/>
@@ -10121,56 +10121,459 @@
               <a:p>
                 <a:pPr/>
                 <a14:m>
-                  <m:oMathPara xmlns:m="http://schemas.openxmlformats.org/officeDocument/2006/math">
-                    <m:oMathParaPr>
-                      <m:jc m:val="centerGroup"/>
-                    </m:oMathParaPr>
-                    <m:oMath xmlns:m="http://schemas.openxmlformats.org/officeDocument/2006/math">
-                      <m:sSub>
-                        <m:sSubPr>
-                          <m:ctrlPr>
-                            <a:rPr lang="fr-FR" b="0" i="1" smtClean="0">
-                              <a:solidFill>
-                                <a:srgbClr val="C00000"/>
-                              </a:solidFill>
-                              <a:latin typeface="Cambria Math" panose="02040503050406030204" pitchFamily="18" charset="0"/>
-                              <a:ea typeface="Cambria Math" panose="02040503050406030204" pitchFamily="18" charset="0"/>
-                            </a:rPr>
-                          </m:ctrlPr>
-                        </m:sSubPr>
-                        <m:e>
-                          <m:r>
-                            <a:rPr lang="fr-FR" b="0" i="1" smtClean="0">
-                              <a:solidFill>
-                                <a:srgbClr val="C00000"/>
-                              </a:solidFill>
-                              <a:latin typeface="Cambria Math" panose="02040503050406030204" pitchFamily="18" charset="0"/>
-                              <a:ea typeface="Cambria Math" panose="02040503050406030204" pitchFamily="18" charset="0"/>
-                            </a:rPr>
-                            <m:t>𝑚</m:t>
-                          </m:r>
-                        </m:e>
-                        <m:sub>
-                          <m:r>
-                            <a:rPr lang="fr-FR" b="0" i="1" smtClean="0">
-                              <a:solidFill>
-                                <a:srgbClr val="C00000"/>
-                              </a:solidFill>
-                              <a:latin typeface="Cambria Math" panose="02040503050406030204" pitchFamily="18" charset="0"/>
-                              <a:ea typeface="Cambria Math" panose="02040503050406030204" pitchFamily="18" charset="0"/>
-                            </a:rPr>
-                            <m:t>𝑃</m:t>
-                          </m:r>
-                        </m:sub>
-                      </m:sSub>
-                    </m:oMath>
-                  </m:oMathPara>
+                  <m:oMath xmlns:m="http://schemas.openxmlformats.org/officeDocument/2006/math">
+                    <m:sSub>
+                      <m:sSubPr>
+                        <m:ctrlPr>
+                          <a:rPr lang="fr-FR" b="0" i="1" smtClean="0">
+                            <a:solidFill>
+                              <a:srgbClr val="C00000"/>
+                            </a:solidFill>
+                            <a:latin typeface="Cambria Math" panose="02040503050406030204" pitchFamily="18" charset="0"/>
+                            <a:ea typeface="Cambria Math" panose="02040503050406030204" pitchFamily="18" charset="0"/>
+                          </a:rPr>
+                        </m:ctrlPr>
+                      </m:sSubPr>
+                      <m:e>
+                        <m:r>
+                          <a:rPr lang="fr-FR" b="0" i="1" smtClean="0">
+                            <a:solidFill>
+                              <a:srgbClr val="C00000"/>
+                            </a:solidFill>
+                            <a:latin typeface="Cambria Math" panose="02040503050406030204" pitchFamily="18" charset="0"/>
+                            <a:ea typeface="Cambria Math" panose="02040503050406030204" pitchFamily="18" charset="0"/>
+                          </a:rPr>
+                          <m:t>𝑚</m:t>
+                        </m:r>
+                      </m:e>
+                      <m:sub>
+                        <m:r>
+                          <a:rPr lang="fr-FR" b="0" i="1" smtClean="0">
+                            <a:solidFill>
+                              <a:srgbClr val="C00000"/>
+                            </a:solidFill>
+                            <a:latin typeface="Cambria Math" panose="02040503050406030204" pitchFamily="18" charset="0"/>
+                            <a:ea typeface="Cambria Math" panose="02040503050406030204" pitchFamily="18" charset="0"/>
+                          </a:rPr>
+                          <m:t>𝑃</m:t>
+                        </m:r>
+                      </m:sub>
+                    </m:sSub>
+                  </m:oMath>
                 </a14:m>
-                <a:endParaRPr lang="en-US" dirty="0">
+                <a:r>
+                  <a:rPr lang="en-US" dirty="0">
+                    <a:solidFill>
+                      <a:srgbClr val="C00000"/>
+                    </a:solidFill>
+                  </a:rPr>
+                  <a:t> + </a:t>
+                </a:r>
+                <a14:m>
+                  <m:oMath xmlns:m="http://schemas.openxmlformats.org/officeDocument/2006/math">
+                    <m:sSub>
+                      <m:sSubPr>
+                        <m:ctrlPr>
+                          <a:rPr lang="fr-FR" i="1">
+                            <a:solidFill>
+                              <a:srgbClr val="C00000"/>
+                            </a:solidFill>
+                            <a:latin typeface="Cambria Math" panose="02040503050406030204" pitchFamily="18" charset="0"/>
+                            <a:ea typeface="Cambria Math" panose="02040503050406030204" pitchFamily="18" charset="0"/>
+                          </a:rPr>
+                        </m:ctrlPr>
+                      </m:sSubPr>
+                      <m:e>
+                        <m:r>
+                          <a:rPr lang="fr-FR" i="1">
+                            <a:solidFill>
+                              <a:srgbClr val="C00000"/>
+                            </a:solidFill>
+                            <a:latin typeface="Cambria Math" panose="02040503050406030204" pitchFamily="18" charset="0"/>
+                            <a:ea typeface="Cambria Math" panose="02040503050406030204" pitchFamily="18" charset="0"/>
+                          </a:rPr>
+                          <m:t>𝛼</m:t>
+                        </m:r>
+                      </m:e>
+                      <m:sub>
+                        <m:r>
+                          <a:rPr lang="fr-FR" i="1">
+                            <a:solidFill>
+                              <a:srgbClr val="C00000"/>
+                            </a:solidFill>
+                            <a:latin typeface="Cambria Math" panose="02040503050406030204" pitchFamily="18" charset="0"/>
+                            <a:ea typeface="Cambria Math" panose="02040503050406030204" pitchFamily="18" charset="0"/>
+                          </a:rPr>
+                          <m:t>𝐿</m:t>
+                        </m:r>
+                      </m:sub>
+                    </m:sSub>
+                    <m:sSub>
+                      <m:sSubPr>
+                        <m:ctrlPr>
+                          <a:rPr lang="fr-FR" i="1">
+                            <a:solidFill>
+                              <a:srgbClr val="C00000"/>
+                            </a:solidFill>
+                            <a:latin typeface="Cambria Math" panose="02040503050406030204" pitchFamily="18" charset="0"/>
+                            <a:ea typeface="Cambria Math" panose="02040503050406030204" pitchFamily="18" charset="0"/>
+                          </a:rPr>
+                        </m:ctrlPr>
+                      </m:sSubPr>
+                      <m:e>
+                        <m:r>
+                          <a:rPr lang="fr-FR" i="1">
+                            <a:solidFill>
+                              <a:srgbClr val="C00000"/>
+                            </a:solidFill>
+                            <a:latin typeface="Cambria Math" panose="02040503050406030204" pitchFamily="18" charset="0"/>
+                            <a:ea typeface="Cambria Math" panose="02040503050406030204" pitchFamily="18" charset="0"/>
+                          </a:rPr>
+                          <m:t>𝛽</m:t>
+                        </m:r>
+                      </m:e>
+                      <m:sub>
+                        <m:r>
+                          <a:rPr lang="fr-FR" i="1">
+                            <a:solidFill>
+                              <a:srgbClr val="C00000"/>
+                            </a:solidFill>
+                            <a:latin typeface="Cambria Math" panose="02040503050406030204" pitchFamily="18" charset="0"/>
+                            <a:ea typeface="Cambria Math" panose="02040503050406030204" pitchFamily="18" charset="0"/>
+                          </a:rPr>
+                          <m:t>2</m:t>
+                        </m:r>
+                      </m:sub>
+                    </m:sSub>
+                    <m:r>
+                      <a:rPr lang="fr-FR" b="0" i="1" smtClean="0">
+                        <a:solidFill>
+                          <a:srgbClr val="C00000"/>
+                        </a:solidFill>
+                        <a:latin typeface="Cambria Math" panose="02040503050406030204" pitchFamily="18" charset="0"/>
+                        <a:ea typeface="Cambria Math" panose="02040503050406030204" pitchFamily="18" charset="0"/>
+                      </a:rPr>
+                      <m:t>⋅</m:t>
+                    </m:r>
+                    <m:sSub>
+                      <m:sSubPr>
+                        <m:ctrlPr>
+                          <a:rPr lang="fr-FR" b="0" i="1" smtClean="0">
+                            <a:solidFill>
+                              <a:srgbClr val="C00000"/>
+                            </a:solidFill>
+                            <a:latin typeface="Cambria Math" panose="02040503050406030204" pitchFamily="18" charset="0"/>
+                            <a:ea typeface="Cambria Math" panose="02040503050406030204" pitchFamily="18" charset="0"/>
+                          </a:rPr>
+                        </m:ctrlPr>
+                      </m:sSubPr>
+                      <m:e>
+                        <m:r>
+                          <a:rPr lang="fr-FR" b="0" i="1" smtClean="0">
+                            <a:solidFill>
+                              <a:srgbClr val="C00000"/>
+                            </a:solidFill>
+                            <a:latin typeface="Cambria Math" panose="02040503050406030204" pitchFamily="18" charset="0"/>
+                            <a:ea typeface="Cambria Math" panose="02040503050406030204" pitchFamily="18" charset="0"/>
+                          </a:rPr>
+                          <m:t>𝐿</m:t>
+                        </m:r>
+                      </m:e>
+                      <m:sub>
+                        <m:r>
+                          <a:rPr lang="fr-FR" b="0" i="1" smtClean="0">
+                            <a:solidFill>
+                              <a:srgbClr val="C00000"/>
+                            </a:solidFill>
+                            <a:latin typeface="Cambria Math" panose="02040503050406030204" pitchFamily="18" charset="0"/>
+                            <a:ea typeface="Cambria Math" panose="02040503050406030204" pitchFamily="18" charset="0"/>
+                          </a:rPr>
+                          <m:t>𝑆</m:t>
+                        </m:r>
+                      </m:sub>
+                    </m:sSub>
+                    <m:r>
+                      <a:rPr lang="fr-FR" b="0" i="1" smtClean="0">
+                        <a:solidFill>
+                          <a:srgbClr val="C00000"/>
+                        </a:solidFill>
+                        <a:latin typeface="Cambria Math" panose="02040503050406030204" pitchFamily="18" charset="0"/>
+                        <a:ea typeface="Cambria Math" panose="02040503050406030204" pitchFamily="18" charset="0"/>
+                      </a:rPr>
+                      <m:t>+</m:t>
+                    </m:r>
+                    <m:sSub>
+                      <m:sSubPr>
+                        <m:ctrlPr>
+                          <a:rPr lang="fr-FR" i="1">
+                            <a:solidFill>
+                              <a:srgbClr val="C00000"/>
+                            </a:solidFill>
+                            <a:latin typeface="Cambria Math" panose="02040503050406030204" pitchFamily="18" charset="0"/>
+                            <a:ea typeface="Cambria Math" panose="02040503050406030204" pitchFamily="18" charset="0"/>
+                          </a:rPr>
+                        </m:ctrlPr>
+                      </m:sSubPr>
+                      <m:e>
+                        <m:r>
+                          <a:rPr lang="fr-FR" i="1">
+                            <a:solidFill>
+                              <a:srgbClr val="C00000"/>
+                            </a:solidFill>
+                            <a:latin typeface="Cambria Math" panose="02040503050406030204" pitchFamily="18" charset="0"/>
+                            <a:ea typeface="Cambria Math" panose="02040503050406030204" pitchFamily="18" charset="0"/>
+                          </a:rPr>
+                          <m:t>𝛼</m:t>
+                        </m:r>
+                      </m:e>
+                      <m:sub>
+                        <m:r>
+                          <a:rPr lang="fr-FR" b="0" i="1" smtClean="0">
+                            <a:solidFill>
+                              <a:srgbClr val="C00000"/>
+                            </a:solidFill>
+                            <a:latin typeface="Cambria Math" panose="02040503050406030204" pitchFamily="18" charset="0"/>
+                            <a:ea typeface="Cambria Math" panose="02040503050406030204" pitchFamily="18" charset="0"/>
+                          </a:rPr>
+                          <m:t>𝐽</m:t>
+                        </m:r>
+                      </m:sub>
+                    </m:sSub>
+                    <m:sSub>
+                      <m:sSubPr>
+                        <m:ctrlPr>
+                          <a:rPr lang="fr-FR" i="1">
+                            <a:solidFill>
+                              <a:srgbClr val="C00000"/>
+                            </a:solidFill>
+                            <a:latin typeface="Cambria Math" panose="02040503050406030204" pitchFamily="18" charset="0"/>
+                            <a:ea typeface="Cambria Math" panose="02040503050406030204" pitchFamily="18" charset="0"/>
+                          </a:rPr>
+                        </m:ctrlPr>
+                      </m:sSubPr>
+                      <m:e>
+                        <m:r>
+                          <a:rPr lang="fr-FR" i="1">
+                            <a:solidFill>
+                              <a:srgbClr val="C00000"/>
+                            </a:solidFill>
+                            <a:latin typeface="Cambria Math" panose="02040503050406030204" pitchFamily="18" charset="0"/>
+                            <a:ea typeface="Cambria Math" panose="02040503050406030204" pitchFamily="18" charset="0"/>
+                          </a:rPr>
+                          <m:t>𝛽</m:t>
+                        </m:r>
+                      </m:e>
+                      <m:sub>
+                        <m:r>
+                          <a:rPr lang="fr-FR" i="1">
+                            <a:solidFill>
+                              <a:srgbClr val="C00000"/>
+                            </a:solidFill>
+                            <a:latin typeface="Cambria Math" panose="02040503050406030204" pitchFamily="18" charset="0"/>
+                            <a:ea typeface="Cambria Math" panose="02040503050406030204" pitchFamily="18" charset="0"/>
+                          </a:rPr>
+                          <m:t>2</m:t>
+                        </m:r>
+                      </m:sub>
+                    </m:sSub>
+                    <m:r>
+                      <a:rPr lang="fr-FR" i="1">
+                        <a:solidFill>
+                          <a:srgbClr val="C00000"/>
+                        </a:solidFill>
+                        <a:latin typeface="Cambria Math" panose="02040503050406030204" pitchFamily="18" charset="0"/>
+                        <a:ea typeface="Cambria Math" panose="02040503050406030204" pitchFamily="18" charset="0"/>
+                      </a:rPr>
+                      <m:t>⋅</m:t>
+                    </m:r>
+                    <m:sSub>
+                      <m:sSubPr>
+                        <m:ctrlPr>
+                          <a:rPr lang="fr-FR" i="1">
+                            <a:solidFill>
+                              <a:srgbClr val="C00000"/>
+                            </a:solidFill>
+                            <a:latin typeface="Cambria Math" panose="02040503050406030204" pitchFamily="18" charset="0"/>
+                            <a:ea typeface="Cambria Math" panose="02040503050406030204" pitchFamily="18" charset="0"/>
+                          </a:rPr>
+                        </m:ctrlPr>
+                      </m:sSubPr>
+                      <m:e>
+                        <m:r>
+                          <a:rPr lang="fr-FR" b="0" i="1" smtClean="0">
+                            <a:solidFill>
+                              <a:srgbClr val="C00000"/>
+                            </a:solidFill>
+                            <a:latin typeface="Cambria Math" panose="02040503050406030204" pitchFamily="18" charset="0"/>
+                            <a:ea typeface="Cambria Math" panose="02040503050406030204" pitchFamily="18" charset="0"/>
+                          </a:rPr>
+                          <m:t>𝐽</m:t>
+                        </m:r>
+                      </m:e>
+                      <m:sub>
+                        <m:r>
+                          <a:rPr lang="fr-FR" i="1">
+                            <a:solidFill>
+                              <a:srgbClr val="C00000"/>
+                            </a:solidFill>
+                            <a:latin typeface="Cambria Math" panose="02040503050406030204" pitchFamily="18" charset="0"/>
+                            <a:ea typeface="Cambria Math" panose="02040503050406030204" pitchFamily="18" charset="0"/>
+                          </a:rPr>
+                          <m:t>𝑆</m:t>
+                        </m:r>
+                      </m:sub>
+                    </m:sSub>
+                  </m:oMath>
+                </a14:m>
+                <a:r>
+                  <a:rPr lang="fr-FR" b="0" dirty="0">
+                    <a:solidFill>
+                      <a:srgbClr val="C00000"/>
+                    </a:solidFill>
+                  </a:rPr>
+                  <a:t> + </a:t>
+                </a:r>
+                <a14:m>
+                  <m:oMath xmlns:m="http://schemas.openxmlformats.org/officeDocument/2006/math">
+                    <m:sSub>
+                      <m:sSubPr>
+                        <m:ctrlPr>
+                          <a:rPr lang="fr-FR" i="1">
+                            <a:solidFill>
+                              <a:srgbClr val="C00000"/>
+                            </a:solidFill>
+                            <a:latin typeface="Cambria Math" panose="02040503050406030204" pitchFamily="18" charset="0"/>
+                            <a:ea typeface="Cambria Math" panose="02040503050406030204" pitchFamily="18" charset="0"/>
+                          </a:rPr>
+                        </m:ctrlPr>
+                      </m:sSubPr>
+                      <m:e>
+                        <m:r>
+                          <a:rPr lang="fr-FR" i="1">
+                            <a:solidFill>
+                              <a:srgbClr val="C00000"/>
+                            </a:solidFill>
+                            <a:latin typeface="Cambria Math" panose="02040503050406030204" pitchFamily="18" charset="0"/>
+                            <a:ea typeface="Cambria Math" panose="02040503050406030204" pitchFamily="18" charset="0"/>
+                          </a:rPr>
+                          <m:t>𝛼</m:t>
+                        </m:r>
+                      </m:e>
+                      <m:sub>
+                        <m:r>
+                          <a:rPr lang="fr-FR" b="0" i="1" smtClean="0">
+                            <a:solidFill>
+                              <a:srgbClr val="C00000"/>
+                            </a:solidFill>
+                            <a:latin typeface="Cambria Math" panose="02040503050406030204" pitchFamily="18" charset="0"/>
+                            <a:ea typeface="Cambria Math" panose="02040503050406030204" pitchFamily="18" charset="0"/>
+                          </a:rPr>
+                          <m:t>𝐴</m:t>
+                        </m:r>
+                      </m:sub>
+                    </m:sSub>
+                    <m:sSub>
+                      <m:sSubPr>
+                        <m:ctrlPr>
+                          <a:rPr lang="fr-FR" i="1">
+                            <a:solidFill>
+                              <a:srgbClr val="C00000"/>
+                            </a:solidFill>
+                            <a:latin typeface="Cambria Math" panose="02040503050406030204" pitchFamily="18" charset="0"/>
+                            <a:ea typeface="Cambria Math" panose="02040503050406030204" pitchFamily="18" charset="0"/>
+                          </a:rPr>
+                        </m:ctrlPr>
+                      </m:sSubPr>
+                      <m:e>
+                        <m:r>
+                          <a:rPr lang="fr-FR" i="1">
+                            <a:solidFill>
+                              <a:srgbClr val="C00000"/>
+                            </a:solidFill>
+                            <a:latin typeface="Cambria Math" panose="02040503050406030204" pitchFamily="18" charset="0"/>
+                            <a:ea typeface="Cambria Math" panose="02040503050406030204" pitchFamily="18" charset="0"/>
+                          </a:rPr>
+                          <m:t>𝛽</m:t>
+                        </m:r>
+                      </m:e>
+                      <m:sub>
+                        <m:r>
+                          <a:rPr lang="fr-FR" i="1">
+                            <a:solidFill>
+                              <a:srgbClr val="C00000"/>
+                            </a:solidFill>
+                            <a:latin typeface="Cambria Math" panose="02040503050406030204" pitchFamily="18" charset="0"/>
+                            <a:ea typeface="Cambria Math" panose="02040503050406030204" pitchFamily="18" charset="0"/>
+                          </a:rPr>
+                          <m:t>2</m:t>
+                        </m:r>
+                      </m:sub>
+                    </m:sSub>
+                    <m:r>
+                      <a:rPr lang="fr-FR" i="1">
+                        <a:solidFill>
+                          <a:srgbClr val="C00000"/>
+                        </a:solidFill>
+                        <a:latin typeface="Cambria Math" panose="02040503050406030204" pitchFamily="18" charset="0"/>
+                        <a:ea typeface="Cambria Math" panose="02040503050406030204" pitchFamily="18" charset="0"/>
+                      </a:rPr>
+                      <m:t>⋅</m:t>
+                    </m:r>
+                    <m:sSub>
+                      <m:sSubPr>
+                        <m:ctrlPr>
+                          <a:rPr lang="fr-FR" i="1">
+                            <a:solidFill>
+                              <a:srgbClr val="C00000"/>
+                            </a:solidFill>
+                            <a:latin typeface="Cambria Math" panose="02040503050406030204" pitchFamily="18" charset="0"/>
+                            <a:ea typeface="Cambria Math" panose="02040503050406030204" pitchFamily="18" charset="0"/>
+                          </a:rPr>
+                        </m:ctrlPr>
+                      </m:sSubPr>
+                      <m:e>
+                        <m:r>
+                          <a:rPr lang="fr-FR" b="0" i="1" smtClean="0">
+                            <a:solidFill>
+                              <a:srgbClr val="C00000"/>
+                            </a:solidFill>
+                            <a:latin typeface="Cambria Math" panose="02040503050406030204" pitchFamily="18" charset="0"/>
+                            <a:ea typeface="Cambria Math" panose="02040503050406030204" pitchFamily="18" charset="0"/>
+                          </a:rPr>
+                          <m:t>𝐴</m:t>
+                        </m:r>
+                      </m:e>
+                      <m:sub>
+                        <m:r>
+                          <a:rPr lang="fr-FR" i="1">
+                            <a:solidFill>
+                              <a:srgbClr val="C00000"/>
+                            </a:solidFill>
+                            <a:latin typeface="Cambria Math" panose="02040503050406030204" pitchFamily="18" charset="0"/>
+                            <a:ea typeface="Cambria Math" panose="02040503050406030204" pitchFamily="18" charset="0"/>
+                          </a:rPr>
+                          <m:t>𝑆</m:t>
+                        </m:r>
+                      </m:sub>
+                    </m:sSub>
+                  </m:oMath>
+                </a14:m>
+                <a:endParaRPr lang="fr-FR" b="0" dirty="0">
                   <a:solidFill>
                     <a:srgbClr val="C00000"/>
                   </a:solidFill>
                 </a:endParaRPr>
+              </a:p>
+              <a:p>
+                <a:pPr/>
+                <a:r>
+                  <a:rPr lang="en-US" dirty="0">
+                    <a:solidFill>
+                      <a:srgbClr val="C00000"/>
+                    </a:solidFill>
+                  </a:rPr>
+                  <a:t> </a:t>
+                </a:r>
               </a:p>
             </p:txBody>
           </p:sp>
@@ -10192,8 +10595,8 @@
             </p:nvSpPr>
             <p:spPr>
               <a:xfrm>
-                <a:off x="8930933" y="7632805"/>
-                <a:ext cx="369332" cy="276999"/>
+                <a:off x="7921283" y="7632805"/>
+                <a:ext cx="3598614" cy="573427"/>
               </a:xfrm>
               <a:prstGeom prst="rect">
                 <a:avLst/>
@@ -10201,7 +10604,7 @@
               <a:blipFill>
                 <a:blip r:embed="rId43"/>
                 <a:stretch>
-                  <a:fillRect l="-8197" r="-6557" b="-15217"/>
+                  <a:fillRect l="-1692" t="-12766" r="-338"/>
                 </a:stretch>
               </a:blipFill>
             </p:spPr>
@@ -10210,7 +10613,7 @@
               <a:lstStyle/>
               <a:p>
                 <a:r>
-                  <a:rPr lang="en-US">
+                  <a:rPr lang="fr-FR">
                     <a:noFill/>
                   </a:rPr>
                   <a:t> </a:t>
@@ -10236,7 +10639,7 @@
             </p:nvSpPr>
             <p:spPr>
               <a:xfrm>
-                <a:off x="4637962" y="7614807"/>
+                <a:off x="4089322" y="7614807"/>
                 <a:ext cx="1879425" cy="296428"/>
               </a:xfrm>
               <a:prstGeom prst="rect">
@@ -10528,7 +10931,7 @@
             </p:nvSpPr>
             <p:spPr>
               <a:xfrm>
-                <a:off x="4637962" y="7614807"/>
+                <a:off x="4089322" y="7614807"/>
                 <a:ext cx="1879425" cy="296428"/>
               </a:xfrm>
               <a:prstGeom prst="rect">
@@ -10546,7 +10949,7 @@
               <a:lstStyle/>
               <a:p>
                 <a:r>
-                  <a:rPr lang="en-US">
+                  <a:rPr lang="fr-FR">
                     <a:noFill/>
                   </a:rPr>
                   <a:t> </a:t>
@@ -10571,9 +10974,9 @@
           <p:nvPr/>
         </p:nvCxnSpPr>
         <p:spPr>
-          <a:xfrm flipV="1">
-            <a:off x="7655560" y="7532188"/>
-            <a:ext cx="3068389" cy="5080"/>
+          <a:xfrm>
+            <a:off x="7655560" y="7537268"/>
+            <a:ext cx="3824918" cy="0"/>
           </a:xfrm>
           <a:prstGeom prst="straightConnector1">
             <a:avLst/>
@@ -10600,8 +11003,8 @@
           </a:fontRef>
         </p:style>
       </p:cxnSp>
-      <mc:AlternateContent xmlns:mc="http://schemas.openxmlformats.org/markup-compatibility/2006">
-        <mc:Choice xmlns:a14="http://schemas.microsoft.com/office/drawing/2010/main" Requires="a14">
+      <mc:AlternateContent xmlns:mc="http://schemas.openxmlformats.org/markup-compatibility/2006" xmlns:a14="http://schemas.microsoft.com/office/drawing/2010/main">
+        <mc:Choice Requires="a14">
           <p:sp>
             <p:nvSpPr>
               <p:cNvPr id="72" name="TextBox 71">
@@ -10830,7 +11233,7 @@
             </p:txBody>
           </p:sp>
         </mc:Choice>
-        <mc:Fallback>
+        <mc:Fallback xmlns="">
           <p:sp>
             <p:nvSpPr>
               <p:cNvPr id="72" name="TextBox 71">
@@ -10875,8 +11278,8 @@
           </p:sp>
         </mc:Fallback>
       </mc:AlternateContent>
-      <mc:AlternateContent xmlns:mc="http://schemas.openxmlformats.org/markup-compatibility/2006">
-        <mc:Choice xmlns:a14="http://schemas.microsoft.com/office/drawing/2010/main" Requires="a14">
+      <mc:AlternateContent xmlns:mc="http://schemas.openxmlformats.org/markup-compatibility/2006" xmlns:a14="http://schemas.microsoft.com/office/drawing/2010/main">
+        <mc:Choice Requires="a14">
           <p:sp>
             <p:nvSpPr>
               <p:cNvPr id="75" name="TextBox 74">
@@ -11105,7 +11508,7 @@
             </p:txBody>
           </p:sp>
         </mc:Choice>
-        <mc:Fallback>
+        <mc:Fallback xmlns="">
           <p:sp>
             <p:nvSpPr>
               <p:cNvPr id="75" name="TextBox 74">

</xml_diff>